<commit_message>
Tidying up DSL talk
</commit_message>
<xml_diff>
--- a/BuildingExternalDSLs/Building External DSLs.pptx
+++ b/BuildingExternalDSLs/Building External DSLs.pptx
@@ -5,29 +5,26 @@
     <p:sldMasterId id="2147483648" r:id="rId1"/>
   </p:sldMasterIdLst>
   <p:notesMasterIdLst>
-    <p:notesMasterId r:id="rId19"/>
+    <p:notesMasterId r:id="rId16"/>
   </p:notesMasterIdLst>
   <p:handoutMasterIdLst>
-    <p:handoutMasterId r:id="rId20"/>
+    <p:handoutMasterId r:id="rId17"/>
   </p:handoutMasterIdLst>
   <p:sldIdLst>
     <p:sldId id="256" r:id="rId2"/>
     <p:sldId id="260" r:id="rId3"/>
     <p:sldId id="261" r:id="rId4"/>
-    <p:sldId id="262" r:id="rId5"/>
-    <p:sldId id="263" r:id="rId6"/>
-    <p:sldId id="264" r:id="rId7"/>
-    <p:sldId id="265" r:id="rId8"/>
-    <p:sldId id="266" r:id="rId9"/>
-    <p:sldId id="267" r:id="rId10"/>
-    <p:sldId id="268" r:id="rId11"/>
-    <p:sldId id="269" r:id="rId12"/>
-    <p:sldId id="270" r:id="rId13"/>
-    <p:sldId id="271" r:id="rId14"/>
-    <p:sldId id="272" r:id="rId15"/>
-    <p:sldId id="275" r:id="rId16"/>
-    <p:sldId id="273" r:id="rId17"/>
-    <p:sldId id="274" r:id="rId18"/>
+    <p:sldId id="264" r:id="rId5"/>
+    <p:sldId id="266" r:id="rId6"/>
+    <p:sldId id="269" r:id="rId7"/>
+    <p:sldId id="276" r:id="rId8"/>
+    <p:sldId id="270" r:id="rId9"/>
+    <p:sldId id="277" r:id="rId10"/>
+    <p:sldId id="271" r:id="rId11"/>
+    <p:sldId id="272" r:id="rId12"/>
+    <p:sldId id="275" r:id="rId13"/>
+    <p:sldId id="273" r:id="rId14"/>
+    <p:sldId id="274" r:id="rId15"/>
   </p:sldIdLst>
   <p:sldSz cx="9144000" cy="6858000" type="screen4x3"/>
   <p:notesSz cx="6858000" cy="9144000"/>
@@ -3853,7 +3850,7 @@
           <a:p>
             <a:fld id="{07B9A7F0-4EAA-4868-A40D-08B60601842D}" type="datetimeFigureOut">
               <a:rPr lang="en-US" smtClean="0"/>
-              <a:t>5/16/2012</a:t>
+              <a:t>6/5/2012</a:t>
             </a:fld>
             <a:endParaRPr lang="en-US"/>
           </a:p>
@@ -4018,7 +4015,7 @@
           <a:p>
             <a:fld id="{0643DBBB-5741-4F25-B406-E7BFD0A29909}" type="datetimeFigureOut">
               <a:rPr lang="en-US" smtClean="0"/>
-              <a:t>5/16/2012</a:t>
+              <a:t>6/5/2012</a:t>
             </a:fld>
             <a:endParaRPr lang="en-US"/>
           </a:p>
@@ -4284,6 +4281,270 @@
     </a:lvl9pPr>
   </p:notesStyle>
 </p:notesMaster>
+</file>
+
+<file path=ppt/notesSlides/notesSlide1.xml><?xml version="1.0" encoding="utf-8"?>
+<p:notes xmlns:a="http://schemas.openxmlformats.org/drawingml/2006/main" xmlns:r="http://schemas.openxmlformats.org/officeDocument/2006/relationships" xmlns:p="http://schemas.openxmlformats.org/presentationml/2006/main">
+  <p:cSld>
+    <p:spTree>
+      <p:nvGrpSpPr>
+        <p:cNvPr id="1" name=""/>
+        <p:cNvGrpSpPr/>
+        <p:nvPr/>
+      </p:nvGrpSpPr>
+      <p:grpSpPr>
+        <a:xfrm>
+          <a:off x="0" y="0"/>
+          <a:ext cx="0" cy="0"/>
+          <a:chOff x="0" y="0"/>
+          <a:chExt cx="0" cy="0"/>
+        </a:xfrm>
+      </p:grpSpPr>
+      <p:sp>
+        <p:nvSpPr>
+          <p:cNvPr id="2" name="Slide Image Placeholder 1"/>
+          <p:cNvSpPr>
+            <a:spLocks noGrp="1" noRot="1" noChangeAspect="1"/>
+          </p:cNvSpPr>
+          <p:nvPr>
+            <p:ph type="sldImg"/>
+          </p:nvPr>
+        </p:nvSpPr>
+        <p:spPr/>
+      </p:sp>
+      <p:sp>
+        <p:nvSpPr>
+          <p:cNvPr id="3" name="Notes Placeholder 2"/>
+          <p:cNvSpPr>
+            <a:spLocks noGrp="1"/>
+          </p:cNvSpPr>
+          <p:nvPr>
+            <p:ph type="body" idx="1"/>
+          </p:nvPr>
+        </p:nvSpPr>
+        <p:spPr/>
+        <p:txBody>
+          <a:bodyPr/>
+          <a:lstStyle/>
+          <a:p>
+            <a:r>
+              <a:rPr lang="en-US" dirty="0" smtClean="0"/>
+              <a:t>Written in a general-purpose language</a:t>
+            </a:r>
+          </a:p>
+          <a:p>
+            <a:r>
+              <a:rPr lang="en-US" dirty="0" smtClean="0"/>
+              <a:t>Uses subset of language’s features</a:t>
+            </a:r>
+          </a:p>
+          <a:p>
+            <a:r>
+              <a:rPr lang="en-US" dirty="0" smtClean="0"/>
+              <a:t>Built to handle one small aspect of the overall system</a:t>
+            </a:r>
+          </a:p>
+          <a:p>
+            <a:r>
+              <a:rPr lang="en-US" dirty="0" smtClean="0"/>
+              <a:t>Written Ruby, C#, Boo etc.</a:t>
+            </a:r>
+          </a:p>
+          <a:p>
+            <a:endParaRPr lang="en-US" dirty="0" smtClean="0"/>
+          </a:p>
+          <a:p>
+            <a:r>
+              <a:rPr lang="en-US" dirty="0" smtClean="0"/>
+              <a:t>When to use Internal DSLs?</a:t>
+            </a:r>
+          </a:p>
+          <a:p>
+            <a:endParaRPr lang="en-US" dirty="0" smtClean="0"/>
+          </a:p>
+          <a:p>
+            <a:r>
+              <a:rPr lang="en-US" dirty="0" smtClean="0"/>
+              <a:t>Good for when coders are using the DSL</a:t>
+            </a:r>
+          </a:p>
+          <a:p>
+            <a:r>
+              <a:rPr lang="en-US" dirty="0" smtClean="0"/>
+              <a:t>More static in nature</a:t>
+            </a:r>
+          </a:p>
+          <a:p>
+            <a:endParaRPr lang="en-US" dirty="0"/>
+          </a:p>
+        </p:txBody>
+      </p:sp>
+      <p:sp>
+        <p:nvSpPr>
+          <p:cNvPr id="4" name="Slide Number Placeholder 3"/>
+          <p:cNvSpPr>
+            <a:spLocks noGrp="1"/>
+          </p:cNvSpPr>
+          <p:nvPr>
+            <p:ph type="sldNum" sz="quarter" idx="10"/>
+          </p:nvPr>
+        </p:nvSpPr>
+        <p:spPr/>
+        <p:txBody>
+          <a:bodyPr/>
+          <a:lstStyle/>
+          <a:p>
+            <a:fld id="{B475A8DE-51A0-46AD-87A4-8B9153DD75AB}" type="slidenum">
+              <a:rPr lang="en-US" smtClean="0"/>
+              <a:t>4</a:t>
+            </a:fld>
+            <a:endParaRPr lang="en-US"/>
+          </a:p>
+        </p:txBody>
+      </p:sp>
+    </p:spTree>
+    <p:extLst>
+      <p:ext uri="{BB962C8B-B14F-4D97-AF65-F5344CB8AC3E}">
+        <p14:creationId xmlns:p14="http://schemas.microsoft.com/office/powerpoint/2010/main" val="3841546837"/>
+      </p:ext>
+    </p:extLst>
+  </p:cSld>
+  <p:clrMapOvr>
+    <a:masterClrMapping/>
+  </p:clrMapOvr>
+</p:notes>
+</file>
+
+<file path=ppt/notesSlides/notesSlide2.xml><?xml version="1.0" encoding="utf-8"?>
+<p:notes xmlns:a="http://schemas.openxmlformats.org/drawingml/2006/main" xmlns:r="http://schemas.openxmlformats.org/officeDocument/2006/relationships" xmlns:p="http://schemas.openxmlformats.org/presentationml/2006/main">
+  <p:cSld>
+    <p:spTree>
+      <p:nvGrpSpPr>
+        <p:cNvPr id="1" name=""/>
+        <p:cNvGrpSpPr/>
+        <p:nvPr/>
+      </p:nvGrpSpPr>
+      <p:grpSpPr>
+        <a:xfrm>
+          <a:off x="0" y="0"/>
+          <a:ext cx="0" cy="0"/>
+          <a:chOff x="0" y="0"/>
+          <a:chExt cx="0" cy="0"/>
+        </a:xfrm>
+      </p:grpSpPr>
+      <p:sp>
+        <p:nvSpPr>
+          <p:cNvPr id="2" name="Slide Image Placeholder 1"/>
+          <p:cNvSpPr>
+            <a:spLocks noGrp="1" noRot="1" noChangeAspect="1"/>
+          </p:cNvSpPr>
+          <p:nvPr>
+            <p:ph type="sldImg"/>
+          </p:nvPr>
+        </p:nvSpPr>
+        <p:spPr/>
+      </p:sp>
+      <p:sp>
+        <p:nvSpPr>
+          <p:cNvPr id="3" name="Notes Placeholder 2"/>
+          <p:cNvSpPr>
+            <a:spLocks noGrp="1"/>
+          </p:cNvSpPr>
+          <p:nvPr>
+            <p:ph type="body" idx="1"/>
+          </p:nvPr>
+        </p:nvSpPr>
+        <p:spPr/>
+        <p:txBody>
+          <a:bodyPr/>
+          <a:lstStyle/>
+          <a:p>
+            <a:r>
+              <a:rPr lang="en-US" dirty="0" smtClean="0"/>
+              <a:t>Language separate from the main language of the application it works with</a:t>
+            </a:r>
+          </a:p>
+          <a:p>
+            <a:r>
+              <a:rPr lang="en-US" dirty="0" smtClean="0"/>
+              <a:t>Custom syntax, common to borrow other syntax</a:t>
+            </a:r>
+          </a:p>
+          <a:p>
+            <a:r>
+              <a:rPr lang="en-US" dirty="0" smtClean="0"/>
+              <a:t>Parsed in the host code using text parsing techniques</a:t>
+            </a:r>
+          </a:p>
+          <a:p>
+            <a:endParaRPr lang="en-US" dirty="0" smtClean="0"/>
+          </a:p>
+          <a:p>
+            <a:r>
+              <a:rPr lang="en-US" dirty="0" smtClean="0"/>
+              <a:t>When to use External DSLs?</a:t>
+            </a:r>
+          </a:p>
+          <a:p>
+            <a:endParaRPr lang="en-US" dirty="0" smtClean="0"/>
+          </a:p>
+          <a:p>
+            <a:r>
+              <a:rPr lang="en-US" dirty="0" smtClean="0"/>
+              <a:t>Good for when non-coders are using the DSL</a:t>
+            </a:r>
+          </a:p>
+          <a:p>
+            <a:r>
+              <a:rPr lang="en-US" dirty="0" smtClean="0"/>
+              <a:t>Not compiled in to the application</a:t>
+            </a:r>
+          </a:p>
+          <a:p>
+            <a:r>
+              <a:rPr lang="en-US" dirty="0" smtClean="0"/>
+              <a:t>More dynamic/flexible in nature</a:t>
+            </a:r>
+          </a:p>
+          <a:p>
+            <a:endParaRPr lang="en-US" dirty="0"/>
+          </a:p>
+        </p:txBody>
+      </p:sp>
+      <p:sp>
+        <p:nvSpPr>
+          <p:cNvPr id="4" name="Slide Number Placeholder 3"/>
+          <p:cNvSpPr>
+            <a:spLocks noGrp="1"/>
+          </p:cNvSpPr>
+          <p:nvPr>
+            <p:ph type="sldNum" sz="quarter" idx="10"/>
+          </p:nvPr>
+        </p:nvSpPr>
+        <p:spPr/>
+        <p:txBody>
+          <a:bodyPr/>
+          <a:lstStyle/>
+          <a:p>
+            <a:fld id="{B475A8DE-51A0-46AD-87A4-8B9153DD75AB}" type="slidenum">
+              <a:rPr lang="en-US" smtClean="0"/>
+              <a:t>5</a:t>
+            </a:fld>
+            <a:endParaRPr lang="en-US"/>
+          </a:p>
+        </p:txBody>
+      </p:sp>
+    </p:spTree>
+    <p:extLst>
+      <p:ext uri="{BB962C8B-B14F-4D97-AF65-F5344CB8AC3E}">
+        <p14:creationId xmlns:p14="http://schemas.microsoft.com/office/powerpoint/2010/main" val="1301973439"/>
+      </p:ext>
+    </p:extLst>
+  </p:cSld>
+  <p:clrMapOvr>
+    <a:masterClrMapping/>
+  </p:clrMapOvr>
+</p:notes>
 </file>
 
 <file path=ppt/slideLayouts/slideLayout1.xml><?xml version="1.0" encoding="utf-8"?>
@@ -6028,7 +6289,7 @@
           <a:p>
             <a:r>
               <a:rPr lang="en-US" dirty="0" smtClean="0"/>
-              <a:t>jimmy@headspring.com</a:t>
+              <a:t>Jimmybogard.lostechies.com</a:t>
             </a:r>
             <a:endParaRPr lang="en-US" dirty="0" smtClean="0"/>
           </a:p>
@@ -6051,541 +6312,6 @@
 </file>
 
 <file path=ppt/slides/slide10.xml><?xml version="1.0" encoding="utf-8"?>
-<p:sld xmlns:a="http://schemas.openxmlformats.org/drawingml/2006/main" xmlns:r="http://schemas.openxmlformats.org/officeDocument/2006/relationships" xmlns:p="http://schemas.openxmlformats.org/presentationml/2006/main">
-  <p:cSld>
-    <p:spTree>
-      <p:nvGrpSpPr>
-        <p:cNvPr id="1" name=""/>
-        <p:cNvGrpSpPr/>
-        <p:nvPr/>
-      </p:nvGrpSpPr>
-      <p:grpSpPr>
-        <a:xfrm>
-          <a:off x="0" y="0"/>
-          <a:ext cx="0" cy="0"/>
-          <a:chOff x="0" y="0"/>
-          <a:chExt cx="0" cy="0"/>
-        </a:xfrm>
-      </p:grpSpPr>
-      <p:sp>
-        <p:nvSpPr>
-          <p:cNvPr id="2" name="Title 1"/>
-          <p:cNvSpPr>
-            <a:spLocks noGrp="1"/>
-          </p:cNvSpPr>
-          <p:nvPr>
-            <p:ph type="title"/>
-            <p:custDataLst>
-              <p:tags r:id="rId2"/>
-            </p:custDataLst>
-          </p:nvPr>
-        </p:nvSpPr>
-        <p:spPr/>
-        <p:txBody>
-          <a:bodyPr/>
-          <a:lstStyle/>
-          <a:p>
-            <a:r>
-              <a:rPr lang="en-US" dirty="0" smtClean="0"/>
-              <a:t>When to use External DSLs?</a:t>
-            </a:r>
-            <a:endParaRPr lang="en-US" dirty="0"/>
-          </a:p>
-        </p:txBody>
-      </p:sp>
-      <p:sp>
-        <p:nvSpPr>
-          <p:cNvPr id="3" name="Content Placeholder 2"/>
-          <p:cNvSpPr>
-            <a:spLocks noGrp="1"/>
-          </p:cNvSpPr>
-          <p:nvPr>
-            <p:ph idx="1"/>
-            <p:custDataLst>
-              <p:tags r:id="rId3"/>
-            </p:custDataLst>
-          </p:nvPr>
-        </p:nvSpPr>
-        <p:spPr/>
-        <p:txBody>
-          <a:bodyPr/>
-          <a:lstStyle/>
-          <a:p>
-            <a:r>
-              <a:rPr lang="en-US" dirty="0" smtClean="0"/>
-              <a:t>Good for when non-coders are using the DSL</a:t>
-            </a:r>
-          </a:p>
-          <a:p>
-            <a:r>
-              <a:rPr lang="en-US" dirty="0" smtClean="0"/>
-              <a:t>Not compiled in to the application</a:t>
-            </a:r>
-          </a:p>
-          <a:p>
-            <a:r>
-              <a:rPr lang="en-US" dirty="0" smtClean="0"/>
-              <a:t>More dynamic/flexible in nature</a:t>
-            </a:r>
-            <a:endParaRPr lang="en-US" dirty="0"/>
-          </a:p>
-        </p:txBody>
-      </p:sp>
-    </p:spTree>
-    <p:custDataLst>
-      <p:tags r:id="rId1"/>
-    </p:custDataLst>
-    <p:extLst>
-      <p:ext uri="{BB962C8B-B14F-4D97-AF65-F5344CB8AC3E}">
-        <p14:creationId xmlns:p14="http://schemas.microsoft.com/office/powerpoint/2010/main" val="4008158302"/>
-      </p:ext>
-    </p:extLst>
-  </p:cSld>
-  <p:clrMapOvr>
-    <a:masterClrMapping/>
-  </p:clrMapOvr>
-</p:sld>
-</file>
-
-<file path=ppt/slides/slide11.xml><?xml version="1.0" encoding="utf-8"?>
-<p:sld xmlns:a="http://schemas.openxmlformats.org/drawingml/2006/main" xmlns:r="http://schemas.openxmlformats.org/officeDocument/2006/relationships" xmlns:p="http://schemas.openxmlformats.org/presentationml/2006/main">
-  <p:cSld>
-    <p:spTree>
-      <p:nvGrpSpPr>
-        <p:cNvPr id="1" name=""/>
-        <p:cNvGrpSpPr/>
-        <p:nvPr/>
-      </p:nvGrpSpPr>
-      <p:grpSpPr>
-        <a:xfrm>
-          <a:off x="0" y="0"/>
-          <a:ext cx="0" cy="0"/>
-          <a:chOff x="0" y="0"/>
-          <a:chExt cx="0" cy="0"/>
-        </a:xfrm>
-      </p:grpSpPr>
-      <p:sp>
-        <p:nvSpPr>
-          <p:cNvPr id="2" name="Title 1"/>
-          <p:cNvSpPr>
-            <a:spLocks noGrp="1"/>
-          </p:cNvSpPr>
-          <p:nvPr>
-            <p:ph type="title"/>
-            <p:custDataLst>
-              <p:tags r:id="rId2"/>
-            </p:custDataLst>
-          </p:nvPr>
-        </p:nvSpPr>
-        <p:spPr/>
-        <p:txBody>
-          <a:bodyPr/>
-          <a:lstStyle/>
-          <a:p>
-            <a:r>
-              <a:rPr lang="en-US" dirty="0" smtClean="0"/>
-              <a:t>External DSL Processing</a:t>
-            </a:r>
-            <a:endParaRPr lang="en-US" dirty="0"/>
-          </a:p>
-        </p:txBody>
-      </p:sp>
-      <p:sp>
-        <p:nvSpPr>
-          <p:cNvPr id="3" name="Content Placeholder 2"/>
-          <p:cNvSpPr>
-            <a:spLocks noGrp="1"/>
-          </p:cNvSpPr>
-          <p:nvPr>
-            <p:ph idx="1"/>
-            <p:custDataLst>
-              <p:tags r:id="rId3"/>
-            </p:custDataLst>
-          </p:nvPr>
-        </p:nvSpPr>
-        <p:spPr/>
-        <p:txBody>
-          <a:bodyPr/>
-          <a:lstStyle/>
-          <a:p>
-            <a:endParaRPr lang="en-US" dirty="0"/>
-          </a:p>
-        </p:txBody>
-      </p:sp>
-      <p:sp>
-        <p:nvSpPr>
-          <p:cNvPr id="4" name="Rectangle 3"/>
-          <p:cNvSpPr/>
-          <p:nvPr>
-            <p:custDataLst>
-              <p:tags r:id="rId4"/>
-            </p:custDataLst>
-          </p:nvPr>
-        </p:nvSpPr>
-        <p:spPr>
-          <a:xfrm>
-            <a:off x="609600" y="2971800"/>
-            <a:ext cx="1371600" cy="914400"/>
-          </a:xfrm>
-          <a:prstGeom prst="rect">
-            <a:avLst/>
-          </a:prstGeom>
-        </p:spPr>
-        <p:style>
-          <a:lnRef idx="2">
-            <a:schemeClr val="accent1">
-              <a:shade val="50000"/>
-            </a:schemeClr>
-          </a:lnRef>
-          <a:fillRef idx="1">
-            <a:schemeClr val="accent1"/>
-          </a:fillRef>
-          <a:effectRef idx="0">
-            <a:schemeClr val="accent1"/>
-          </a:effectRef>
-          <a:fontRef idx="minor">
-            <a:schemeClr val="lt1"/>
-          </a:fontRef>
-        </p:style>
-        <p:txBody>
-          <a:bodyPr rtlCol="0" anchor="ctr"/>
-          <a:lstStyle/>
-          <a:p>
-            <a:pPr algn="ctr"/>
-            <a:r>
-              <a:rPr lang="en-US" dirty="0" smtClean="0"/>
-              <a:t>DSL script</a:t>
-            </a:r>
-            <a:endParaRPr lang="en-US" dirty="0"/>
-          </a:p>
-        </p:txBody>
-      </p:sp>
-      <p:sp>
-        <p:nvSpPr>
-          <p:cNvPr id="6" name="Rectangle 5"/>
-          <p:cNvSpPr/>
-          <p:nvPr>
-            <p:custDataLst>
-              <p:tags r:id="rId5"/>
-            </p:custDataLst>
-          </p:nvPr>
-        </p:nvSpPr>
-        <p:spPr>
-          <a:xfrm>
-            <a:off x="3810000" y="2971800"/>
-            <a:ext cx="1371600" cy="914400"/>
-          </a:xfrm>
-          <a:prstGeom prst="rect">
-            <a:avLst/>
-          </a:prstGeom>
-        </p:spPr>
-        <p:style>
-          <a:lnRef idx="2">
-            <a:schemeClr val="accent1">
-              <a:shade val="50000"/>
-            </a:schemeClr>
-          </a:lnRef>
-          <a:fillRef idx="1">
-            <a:schemeClr val="accent1"/>
-          </a:fillRef>
-          <a:effectRef idx="0">
-            <a:schemeClr val="accent1"/>
-          </a:effectRef>
-          <a:fontRef idx="minor">
-            <a:schemeClr val="lt1"/>
-          </a:fontRef>
-        </p:style>
-        <p:txBody>
-          <a:bodyPr rtlCol="0" anchor="ctr"/>
-          <a:lstStyle/>
-          <a:p>
-            <a:pPr algn="ctr"/>
-            <a:r>
-              <a:rPr lang="en-US" dirty="0" smtClean="0"/>
-              <a:t>Semantic Model</a:t>
-            </a:r>
-            <a:endParaRPr lang="en-US" dirty="0"/>
-          </a:p>
-        </p:txBody>
-      </p:sp>
-      <p:sp>
-        <p:nvSpPr>
-          <p:cNvPr id="8" name="Rectangle 7"/>
-          <p:cNvSpPr/>
-          <p:nvPr>
-            <p:custDataLst>
-              <p:tags r:id="rId6"/>
-            </p:custDataLst>
-          </p:nvPr>
-        </p:nvSpPr>
-        <p:spPr>
-          <a:xfrm>
-            <a:off x="6934200" y="3000375"/>
-            <a:ext cx="1371600" cy="914400"/>
-          </a:xfrm>
-          <a:prstGeom prst="rect">
-            <a:avLst/>
-          </a:prstGeom>
-        </p:spPr>
-        <p:style>
-          <a:lnRef idx="2">
-            <a:schemeClr val="accent1">
-              <a:shade val="50000"/>
-            </a:schemeClr>
-          </a:lnRef>
-          <a:fillRef idx="1">
-            <a:schemeClr val="accent1"/>
-          </a:fillRef>
-          <a:effectRef idx="0">
-            <a:schemeClr val="accent1"/>
-          </a:effectRef>
-          <a:fontRef idx="minor">
-            <a:schemeClr val="lt1"/>
-          </a:fontRef>
-        </p:style>
-        <p:txBody>
-          <a:bodyPr rtlCol="0" anchor="ctr"/>
-          <a:lstStyle/>
-          <a:p>
-            <a:pPr algn="ctr"/>
-            <a:r>
-              <a:rPr lang="en-US" dirty="0" smtClean="0"/>
-              <a:t>Target Code</a:t>
-            </a:r>
-            <a:endParaRPr lang="en-US" dirty="0"/>
-          </a:p>
-        </p:txBody>
-      </p:sp>
-      <p:sp>
-        <p:nvSpPr>
-          <p:cNvPr id="9" name="Right Arrow 8"/>
-          <p:cNvSpPr/>
-          <p:nvPr>
-            <p:custDataLst>
-              <p:tags r:id="rId7"/>
-            </p:custDataLst>
-          </p:nvPr>
-        </p:nvSpPr>
-        <p:spPr>
-          <a:xfrm>
-            <a:off x="2286000" y="3200400"/>
-            <a:ext cx="1219200" cy="457200"/>
-          </a:xfrm>
-          <a:prstGeom prst="rightArrow">
-            <a:avLst/>
-          </a:prstGeom>
-        </p:spPr>
-        <p:style>
-          <a:lnRef idx="2">
-            <a:schemeClr val="accent1">
-              <a:shade val="50000"/>
-            </a:schemeClr>
-          </a:lnRef>
-          <a:fillRef idx="1">
-            <a:schemeClr val="accent1"/>
-          </a:fillRef>
-          <a:effectRef idx="0">
-            <a:schemeClr val="accent1"/>
-          </a:effectRef>
-          <a:fontRef idx="minor">
-            <a:schemeClr val="lt1"/>
-          </a:fontRef>
-        </p:style>
-        <p:txBody>
-          <a:bodyPr rtlCol="0" anchor="ctr"/>
-          <a:lstStyle/>
-          <a:p>
-            <a:pPr algn="ctr"/>
-            <a:r>
-              <a:rPr lang="en-US" dirty="0" smtClean="0"/>
-              <a:t>Parse</a:t>
-            </a:r>
-            <a:endParaRPr lang="en-US" dirty="0"/>
-          </a:p>
-        </p:txBody>
-      </p:sp>
-      <p:sp>
-        <p:nvSpPr>
-          <p:cNvPr id="11" name="Right Arrow 10"/>
-          <p:cNvSpPr/>
-          <p:nvPr>
-            <p:custDataLst>
-              <p:tags r:id="rId8"/>
-            </p:custDataLst>
-          </p:nvPr>
-        </p:nvSpPr>
-        <p:spPr>
-          <a:xfrm>
-            <a:off x="5486400" y="3228975"/>
-            <a:ext cx="1219200" cy="457200"/>
-          </a:xfrm>
-          <a:prstGeom prst="rightArrow">
-            <a:avLst/>
-          </a:prstGeom>
-        </p:spPr>
-        <p:style>
-          <a:lnRef idx="2">
-            <a:schemeClr val="accent1">
-              <a:shade val="50000"/>
-            </a:schemeClr>
-          </a:lnRef>
-          <a:fillRef idx="1">
-            <a:schemeClr val="accent1"/>
-          </a:fillRef>
-          <a:effectRef idx="0">
-            <a:schemeClr val="accent1"/>
-          </a:effectRef>
-          <a:fontRef idx="minor">
-            <a:schemeClr val="lt1"/>
-          </a:fontRef>
-        </p:style>
-        <p:txBody>
-          <a:bodyPr rtlCol="0" anchor="ctr"/>
-          <a:lstStyle/>
-          <a:p>
-            <a:pPr algn="ctr"/>
-            <a:r>
-              <a:rPr lang="en-US" dirty="0" smtClean="0"/>
-              <a:t>Generate</a:t>
-            </a:r>
-            <a:endParaRPr lang="en-US" dirty="0"/>
-          </a:p>
-        </p:txBody>
-      </p:sp>
-    </p:spTree>
-    <p:custDataLst>
-      <p:tags r:id="rId1"/>
-    </p:custDataLst>
-    <p:extLst>
-      <p:ext uri="{BB962C8B-B14F-4D97-AF65-F5344CB8AC3E}">
-        <p14:creationId xmlns:p14="http://schemas.microsoft.com/office/powerpoint/2010/main" val="2727538279"/>
-      </p:ext>
-    </p:extLst>
-  </p:cSld>
-  <p:clrMapOvr>
-    <a:masterClrMapping/>
-  </p:clrMapOvr>
-</p:sld>
-</file>
-
-<file path=ppt/slides/slide12.xml><?xml version="1.0" encoding="utf-8"?>
-<p:sld xmlns:a="http://schemas.openxmlformats.org/drawingml/2006/main" xmlns:r="http://schemas.openxmlformats.org/officeDocument/2006/relationships" xmlns:p="http://schemas.openxmlformats.org/presentationml/2006/main">
-  <p:cSld>
-    <p:spTree>
-      <p:nvGrpSpPr>
-        <p:cNvPr id="1" name=""/>
-        <p:cNvGrpSpPr/>
-        <p:nvPr/>
-      </p:nvGrpSpPr>
-      <p:grpSpPr>
-        <a:xfrm>
-          <a:off x="0" y="0"/>
-          <a:ext cx="0" cy="0"/>
-          <a:chOff x="0" y="0"/>
-          <a:chExt cx="0" cy="0"/>
-        </a:xfrm>
-      </p:grpSpPr>
-      <p:sp>
-        <p:nvSpPr>
-          <p:cNvPr id="2" name="Title 1"/>
-          <p:cNvSpPr>
-            <a:spLocks noGrp="1"/>
-          </p:cNvSpPr>
-          <p:nvPr>
-            <p:ph type="title"/>
-            <p:custDataLst>
-              <p:tags r:id="rId2"/>
-            </p:custDataLst>
-          </p:nvPr>
-        </p:nvSpPr>
-        <p:spPr/>
-        <p:txBody>
-          <a:bodyPr/>
-          <a:lstStyle/>
-          <a:p>
-            <a:r>
-              <a:rPr lang="en-US" dirty="0" smtClean="0"/>
-              <a:t>Parsing</a:t>
-            </a:r>
-            <a:endParaRPr lang="en-US" dirty="0"/>
-          </a:p>
-        </p:txBody>
-      </p:sp>
-      <p:sp>
-        <p:nvSpPr>
-          <p:cNvPr id="3" name="Content Placeholder 2"/>
-          <p:cNvSpPr>
-            <a:spLocks noGrp="1"/>
-          </p:cNvSpPr>
-          <p:nvPr>
-            <p:ph idx="1"/>
-            <p:custDataLst>
-              <p:tags r:id="rId3"/>
-            </p:custDataLst>
-          </p:nvPr>
-        </p:nvSpPr>
-        <p:spPr/>
-        <p:txBody>
-          <a:bodyPr/>
-          <a:lstStyle/>
-          <a:p>
-            <a:r>
-              <a:rPr lang="en-US" dirty="0" err="1" smtClean="0"/>
-              <a:t>Lexer</a:t>
-            </a:r>
-            <a:r>
-              <a:rPr lang="en-US" dirty="0" smtClean="0"/>
-              <a:t>/Parser tool</a:t>
-            </a:r>
-          </a:p>
-          <a:p>
-            <a:pPr lvl="1"/>
-            <a:r>
-              <a:rPr lang="en-US" dirty="0" err="1" smtClean="0"/>
-              <a:t>yacc</a:t>
-            </a:r>
-            <a:endParaRPr lang="en-US" dirty="0" smtClean="0"/>
-          </a:p>
-          <a:p>
-            <a:pPr lvl="1"/>
-            <a:r>
-              <a:rPr lang="en-US" dirty="0" smtClean="0"/>
-              <a:t>ANTLR</a:t>
-            </a:r>
-          </a:p>
-          <a:p>
-            <a:pPr lvl="1"/>
-            <a:r>
-              <a:rPr lang="en-US" dirty="0" smtClean="0"/>
-              <a:t>Irony</a:t>
-            </a:r>
-          </a:p>
-          <a:p>
-            <a:r>
-              <a:rPr lang="en-US" dirty="0" smtClean="0"/>
-              <a:t>Language Workbench</a:t>
-            </a:r>
-            <a:endParaRPr lang="en-US" dirty="0"/>
-          </a:p>
-        </p:txBody>
-      </p:sp>
-    </p:spTree>
-    <p:custDataLst>
-      <p:tags r:id="rId1"/>
-    </p:custDataLst>
-    <p:extLst>
-      <p:ext uri="{BB962C8B-B14F-4D97-AF65-F5344CB8AC3E}">
-        <p14:creationId xmlns:p14="http://schemas.microsoft.com/office/powerpoint/2010/main" val="1524848044"/>
-      </p:ext>
-    </p:extLst>
-  </p:cSld>
-  <p:clrMapOvr>
-    <a:masterClrMapping/>
-  </p:clrMapOvr>
-</p:sld>
-</file>
-
-<file path=ppt/slides/slide13.xml><?xml version="1.0" encoding="utf-8"?>
 <p:sld xmlns:a="http://schemas.openxmlformats.org/drawingml/2006/main" xmlns:r="http://schemas.openxmlformats.org/officeDocument/2006/relationships" xmlns:p="http://schemas.openxmlformats.org/presentationml/2006/main">
   <p:cSld>
     <p:spTree>
@@ -6672,7 +6398,7 @@
 </p:sld>
 </file>
 
-<file path=ppt/slides/slide14.xml><?xml version="1.0" encoding="utf-8"?>
+<file path=ppt/slides/slide11.xml><?xml version="1.0" encoding="utf-8"?>
 <p:sld xmlns:a="http://schemas.openxmlformats.org/drawingml/2006/main" xmlns:r="http://schemas.openxmlformats.org/officeDocument/2006/relationships" xmlns:p="http://schemas.openxmlformats.org/presentationml/2006/main">
   <p:cSld>
     <p:spTree>
@@ -6775,7 +6501,7 @@
 </p:sld>
 </file>
 
-<file path=ppt/slides/slide15.xml><?xml version="1.0" encoding="utf-8"?>
+<file path=ppt/slides/slide12.xml><?xml version="1.0" encoding="utf-8"?>
 <p:sld xmlns:a="http://schemas.openxmlformats.org/drawingml/2006/main" xmlns:r="http://schemas.openxmlformats.org/officeDocument/2006/relationships" xmlns:p="http://schemas.openxmlformats.org/presentationml/2006/main">
   <p:cSld>
     <p:spTree>
@@ -6872,7 +6598,7 @@
 </p:sld>
 </file>
 
-<file path=ppt/slides/slide16.xml><?xml version="1.0" encoding="utf-8"?>
+<file path=ppt/slides/slide13.xml><?xml version="1.0" encoding="utf-8"?>
 <p:sld xmlns:a="http://schemas.openxmlformats.org/drawingml/2006/main" xmlns:r="http://schemas.openxmlformats.org/officeDocument/2006/relationships" xmlns:p="http://schemas.openxmlformats.org/presentationml/2006/main">
   <p:cSld>
     <p:spTree>
@@ -6958,7 +6684,7 @@
 </p:sld>
 </file>
 
-<file path=ppt/slides/slide17.xml><?xml version="1.0" encoding="utf-8"?>
+<file path=ppt/slides/slide14.xml><?xml version="1.0" encoding="utf-8"?>
 <p:sld xmlns:a="http://schemas.openxmlformats.org/drawingml/2006/main" xmlns:r="http://schemas.openxmlformats.org/officeDocument/2006/relationships" xmlns:p="http://schemas.openxmlformats.org/presentationml/2006/main">
   <p:cSld>
     <p:spTree>
@@ -7176,7 +6902,41 @@
             </a:pPr>
             <a:r>
               <a:rPr lang="en-US" sz="4400" dirty="0" smtClean="0"/>
-              <a:t>A computer programming language of limited expressiveness focused on a particular domain</a:t>
+              <a:t>A computer programming </a:t>
+            </a:r>
+            <a:r>
+              <a:rPr lang="en-US" sz="4400" dirty="0" smtClean="0"/>
+              <a:t>language</a:t>
+            </a:r>
+          </a:p>
+          <a:p>
+            <a:pPr marL="0" indent="0" algn="ctr">
+              <a:buNone/>
+            </a:pPr>
+            <a:r>
+              <a:rPr lang="en-US" sz="4400" dirty="0" smtClean="0"/>
+              <a:t>of </a:t>
+            </a:r>
+            <a:r>
+              <a:rPr lang="en-US" sz="4400" dirty="0" smtClean="0"/>
+              <a:t>limited </a:t>
+            </a:r>
+            <a:r>
+              <a:rPr lang="en-US" sz="4400" dirty="0" smtClean="0"/>
+              <a:t>expressiveness</a:t>
+            </a:r>
+          </a:p>
+          <a:p>
+            <a:pPr marL="0" indent="0" algn="ctr">
+              <a:buNone/>
+            </a:pPr>
+            <a:r>
+              <a:rPr lang="en-US" sz="4400" dirty="0" smtClean="0"/>
+              <a:t>focused </a:t>
+            </a:r>
+            <a:r>
+              <a:rPr lang="en-US" sz="4400" dirty="0" smtClean="0"/>
+              <a:t>on a particular domain</a:t>
             </a:r>
             <a:endParaRPr lang="en-US" sz="4400" dirty="0"/>
           </a:p>
@@ -7321,238 +7081,11 @@
           <a:p>
             <a:r>
               <a:rPr lang="en-US" dirty="0" smtClean="0"/>
-              <a:t>Internal DSL</a:t>
-            </a:r>
-            <a:endParaRPr lang="en-US" dirty="0"/>
-          </a:p>
-        </p:txBody>
-      </p:sp>
-      <p:sp>
-        <p:nvSpPr>
-          <p:cNvPr id="3" name="Content Placeholder 2"/>
-          <p:cNvSpPr>
-            <a:spLocks noGrp="1"/>
-          </p:cNvSpPr>
-          <p:nvPr>
-            <p:ph idx="1"/>
-            <p:custDataLst>
-              <p:tags r:id="rId3"/>
-            </p:custDataLst>
-          </p:nvPr>
-        </p:nvSpPr>
-        <p:spPr/>
-        <p:txBody>
-          <a:bodyPr/>
-          <a:lstStyle/>
-          <a:p>
+              <a:t>Internal </a:t>
+            </a:r>
             <a:r>
               <a:rPr lang="en-US" dirty="0" smtClean="0"/>
-              <a:t>Written in a general-purpose language</a:t>
-            </a:r>
-          </a:p>
-          <a:p>
-            <a:r>
-              <a:rPr lang="en-US" dirty="0" smtClean="0"/>
-              <a:t>Uses subset of language’s features</a:t>
-            </a:r>
-          </a:p>
-          <a:p>
-            <a:r>
-              <a:rPr lang="en-US" dirty="0" smtClean="0"/>
-              <a:t>Built to handle one small aspect of the overall system</a:t>
-            </a:r>
-          </a:p>
-          <a:p>
-            <a:r>
-              <a:rPr lang="en-US" dirty="0" smtClean="0"/>
-              <a:t>Written Ruby, C#, Lisp etc.</a:t>
-            </a:r>
-            <a:endParaRPr lang="en-US" dirty="0"/>
-          </a:p>
-        </p:txBody>
-      </p:sp>
-    </p:spTree>
-    <p:custDataLst>
-      <p:tags r:id="rId1"/>
-    </p:custDataLst>
-    <p:extLst>
-      <p:ext uri="{BB962C8B-B14F-4D97-AF65-F5344CB8AC3E}">
-        <p14:creationId xmlns:p14="http://schemas.microsoft.com/office/powerpoint/2010/main" val="866772534"/>
-      </p:ext>
-    </p:extLst>
-  </p:cSld>
-  <p:clrMapOvr>
-    <a:masterClrMapping/>
-  </p:clrMapOvr>
-</p:sld>
-</file>
-
-<file path=ppt/slides/slide5.xml><?xml version="1.0" encoding="utf-8"?>
-<p:sld xmlns:a="http://schemas.openxmlformats.org/drawingml/2006/main" xmlns:r="http://schemas.openxmlformats.org/officeDocument/2006/relationships" xmlns:p="http://schemas.openxmlformats.org/presentationml/2006/main">
-  <p:cSld>
-    <p:spTree>
-      <p:nvGrpSpPr>
-        <p:cNvPr id="1" name=""/>
-        <p:cNvGrpSpPr/>
-        <p:nvPr/>
-      </p:nvGrpSpPr>
-      <p:grpSpPr>
-        <a:xfrm>
-          <a:off x="0" y="0"/>
-          <a:ext cx="0" cy="0"/>
-          <a:chOff x="0" y="0"/>
-          <a:chExt cx="0" cy="0"/>
-        </a:xfrm>
-      </p:grpSpPr>
-      <p:sp>
-        <p:nvSpPr>
-          <p:cNvPr id="2" name="Title 1"/>
-          <p:cNvSpPr>
-            <a:spLocks noGrp="1"/>
-          </p:cNvSpPr>
-          <p:nvPr>
-            <p:ph type="title"/>
-            <p:custDataLst>
-              <p:tags r:id="rId2"/>
-            </p:custDataLst>
-          </p:nvPr>
-        </p:nvSpPr>
-        <p:spPr/>
-        <p:txBody>
-          <a:bodyPr/>
-          <a:lstStyle/>
-          <a:p>
-            <a:r>
-              <a:rPr lang="en-US" dirty="0" smtClean="0"/>
-              <a:t>Internal DSLs - examples</a:t>
-            </a:r>
-            <a:endParaRPr lang="en-US" dirty="0"/>
-          </a:p>
-        </p:txBody>
-      </p:sp>
-      <p:pic>
-        <p:nvPicPr>
-          <p:cNvPr id="5" name="Picture 2"/>
-          <p:cNvPicPr>
-            <a:picLocks noGrp="1" noChangeAspect="1" noChangeArrowheads="1"/>
-          </p:cNvPicPr>
-          <p:nvPr>
-            <p:ph idx="1"/>
-            <p:custDataLst>
-              <p:tags r:id="rId3"/>
-            </p:custDataLst>
-          </p:nvPr>
-        </p:nvPicPr>
-        <p:blipFill>
-          <a:blip r:embed="rId5">
-            <a:extLst>
-              <a:ext uri="{28A0092B-C50C-407E-A947-70E740481C1C}">
-                <a14:useLocalDpi xmlns:a14="http://schemas.microsoft.com/office/drawing/2010/main" val="0"/>
-              </a:ext>
-            </a:extLst>
-          </a:blip>
-          <a:srcRect/>
-          <a:stretch>
-            <a:fillRect/>
-          </a:stretch>
-        </p:blipFill>
-        <p:spPr bwMode="auto">
-          <a:xfrm>
-            <a:off x="1524000" y="1371600"/>
-            <a:ext cx="6248400" cy="4678529"/>
-          </a:xfrm>
-          <a:prstGeom prst="rect">
-            <a:avLst/>
-          </a:prstGeom>
-          <a:noFill/>
-          <a:ln>
-            <a:noFill/>
-          </a:ln>
-          <a:effectLst/>
-          <a:extLst>
-            <a:ext uri="{909E8E84-426E-40DD-AFC4-6F175D3DCCD1}">
-              <a14:hiddenFill xmlns:a14="http://schemas.microsoft.com/office/drawing/2010/main">
-                <a:solidFill>
-                  <a:schemeClr val="accent1"/>
-                </a:solidFill>
-              </a14:hiddenFill>
-            </a:ext>
-            <a:ext uri="{91240B29-F687-4F45-9708-019B960494DF}">
-              <a14:hiddenLine xmlns:a14="http://schemas.microsoft.com/office/drawing/2010/main" w="9525">
-                <a:solidFill>
-                  <a:schemeClr val="tx1"/>
-                </a:solidFill>
-                <a:miter lim="800000"/>
-                <a:headEnd/>
-                <a:tailEnd/>
-              </a14:hiddenLine>
-            </a:ext>
-            <a:ext uri="{AF507438-7753-43E0-B8FC-AC1667EBCBE1}">
-              <a14:hiddenEffects xmlns:a14="http://schemas.microsoft.com/office/drawing/2010/main">
-                <a:effectLst>
-                  <a:outerShdw dist="35921" dir="2700000" algn="ctr" rotWithShape="0">
-                    <a:schemeClr val="bg2"/>
-                  </a:outerShdw>
-                </a:effectLst>
-              </a14:hiddenEffects>
-            </a:ext>
-          </a:extLst>
-        </p:spPr>
-      </p:pic>
-    </p:spTree>
-    <p:custDataLst>
-      <p:tags r:id="rId1"/>
-    </p:custDataLst>
-    <p:extLst>
-      <p:ext uri="{BB962C8B-B14F-4D97-AF65-F5344CB8AC3E}">
-        <p14:creationId xmlns:p14="http://schemas.microsoft.com/office/powerpoint/2010/main" val="2320661629"/>
-      </p:ext>
-    </p:extLst>
-  </p:cSld>
-  <p:clrMapOvr>
-    <a:masterClrMapping/>
-  </p:clrMapOvr>
-</p:sld>
-</file>
-
-<file path=ppt/slides/slide6.xml><?xml version="1.0" encoding="utf-8"?>
-<p:sld xmlns:a="http://schemas.openxmlformats.org/drawingml/2006/main" xmlns:r="http://schemas.openxmlformats.org/officeDocument/2006/relationships" xmlns:p="http://schemas.openxmlformats.org/presentationml/2006/main">
-  <p:cSld>
-    <p:spTree>
-      <p:nvGrpSpPr>
-        <p:cNvPr id="1" name=""/>
-        <p:cNvGrpSpPr/>
-        <p:nvPr/>
-      </p:nvGrpSpPr>
-      <p:grpSpPr>
-        <a:xfrm>
-          <a:off x="0" y="0"/>
-          <a:ext cx="0" cy="0"/>
-          <a:chOff x="0" y="0"/>
-          <a:chExt cx="0" cy="0"/>
-        </a:xfrm>
-      </p:grpSpPr>
-      <p:sp>
-        <p:nvSpPr>
-          <p:cNvPr id="2" name="Title 1"/>
-          <p:cNvSpPr>
-            <a:spLocks noGrp="1"/>
-          </p:cNvSpPr>
-          <p:nvPr>
-            <p:ph type="title"/>
-            <p:custDataLst>
-              <p:tags r:id="rId2"/>
-            </p:custDataLst>
-          </p:nvPr>
-        </p:nvSpPr>
-        <p:spPr/>
-        <p:txBody>
-          <a:bodyPr/>
-          <a:lstStyle/>
-          <a:p>
-            <a:r>
-              <a:rPr lang="en-US" dirty="0" smtClean="0"/>
-              <a:t>Internal DSLs - examples</a:t>
+              <a:t>DSLs</a:t>
             </a:r>
             <a:endParaRPr lang="en-US" dirty="0"/>
           </a:p>
@@ -7572,7 +7105,7 @@
           </p:nvPr>
         </p:nvPicPr>
         <p:blipFill>
-          <a:blip r:embed="rId5">
+          <a:blip r:embed="rId6">
             <a:extLst>
               <a:ext uri="{28A0092B-C50C-407E-A947-70E740481C1C}">
                 <a14:useLocalDpi xmlns:a14="http://schemas.microsoft.com/office/drawing/2010/main" val="0"/>
@@ -7643,7 +7176,7 @@
 </p:sld>
 </file>
 
-<file path=ppt/slides/slide7.xml><?xml version="1.0" encoding="utf-8"?>
+<file path=ppt/slides/slide5.xml><?xml version="1.0" encoding="utf-8"?>
 <p:sld xmlns:a="http://schemas.openxmlformats.org/drawingml/2006/main" xmlns:r="http://schemas.openxmlformats.org/officeDocument/2006/relationships" xmlns:p="http://schemas.openxmlformats.org/presentationml/2006/main">
   <p:cSld>
     <p:spTree>
@@ -7680,104 +7213,11 @@
           <a:p>
             <a:r>
               <a:rPr lang="en-US" dirty="0" smtClean="0"/>
-              <a:t>External DSL</a:t>
-            </a:r>
-            <a:endParaRPr lang="en-US" dirty="0"/>
-          </a:p>
-        </p:txBody>
-      </p:sp>
-      <p:sp>
-        <p:nvSpPr>
-          <p:cNvPr id="3" name="Content Placeholder 2"/>
-          <p:cNvSpPr>
-            <a:spLocks noGrp="1"/>
-          </p:cNvSpPr>
-          <p:nvPr>
-            <p:ph idx="1"/>
-            <p:custDataLst>
-              <p:tags r:id="rId3"/>
-            </p:custDataLst>
-          </p:nvPr>
-        </p:nvSpPr>
-        <p:spPr/>
-        <p:txBody>
-          <a:bodyPr/>
-          <a:lstStyle/>
-          <a:p>
+              <a:t>External </a:t>
+            </a:r>
             <a:r>
               <a:rPr lang="en-US" dirty="0" smtClean="0"/>
-              <a:t>Language separate from the main language of the application it works with</a:t>
-            </a:r>
-          </a:p>
-          <a:p>
-            <a:r>
-              <a:rPr lang="en-US" dirty="0" smtClean="0"/>
-              <a:t>Custom syntax, common to borrow other syntax</a:t>
-            </a:r>
-          </a:p>
-          <a:p>
-            <a:r>
-              <a:rPr lang="en-US" dirty="0" smtClean="0"/>
-              <a:t>Parsed in the host code using text parsing techniques</a:t>
-            </a:r>
-            <a:endParaRPr lang="en-US" dirty="0"/>
-          </a:p>
-        </p:txBody>
-      </p:sp>
-    </p:spTree>
-    <p:custDataLst>
-      <p:tags r:id="rId1"/>
-    </p:custDataLst>
-    <p:extLst>
-      <p:ext uri="{BB962C8B-B14F-4D97-AF65-F5344CB8AC3E}">
-        <p14:creationId xmlns:p14="http://schemas.microsoft.com/office/powerpoint/2010/main" val="3646384068"/>
-      </p:ext>
-    </p:extLst>
-  </p:cSld>
-  <p:clrMapOvr>
-    <a:masterClrMapping/>
-  </p:clrMapOvr>
-</p:sld>
-</file>
-
-<file path=ppt/slides/slide8.xml><?xml version="1.0" encoding="utf-8"?>
-<p:sld xmlns:a="http://schemas.openxmlformats.org/drawingml/2006/main" xmlns:r="http://schemas.openxmlformats.org/officeDocument/2006/relationships" xmlns:p="http://schemas.openxmlformats.org/presentationml/2006/main">
-  <p:cSld>
-    <p:spTree>
-      <p:nvGrpSpPr>
-        <p:cNvPr id="1" name=""/>
-        <p:cNvGrpSpPr/>
-        <p:nvPr/>
-      </p:nvGrpSpPr>
-      <p:grpSpPr>
-        <a:xfrm>
-          <a:off x="0" y="0"/>
-          <a:ext cx="0" cy="0"/>
-          <a:chOff x="0" y="0"/>
-          <a:chExt cx="0" cy="0"/>
-        </a:xfrm>
-      </p:grpSpPr>
-      <p:sp>
-        <p:nvSpPr>
-          <p:cNvPr id="2" name="Title 1"/>
-          <p:cNvSpPr>
-            <a:spLocks noGrp="1"/>
-          </p:cNvSpPr>
-          <p:nvPr>
-            <p:ph type="title"/>
-            <p:custDataLst>
-              <p:tags r:id="rId2"/>
-            </p:custDataLst>
-          </p:nvPr>
-        </p:nvSpPr>
-        <p:spPr/>
-        <p:txBody>
-          <a:bodyPr/>
-          <a:lstStyle/>
-          <a:p>
-            <a:r>
-              <a:rPr lang="en-US" dirty="0" smtClean="0"/>
-              <a:t>External DSLs - examples</a:t>
+              <a:t>DSLs</a:t>
             </a:r>
             <a:endParaRPr lang="en-US" dirty="0"/>
           </a:p>
@@ -7797,7 +7237,7 @@
           </p:nvPr>
         </p:nvPicPr>
         <p:blipFill>
-          <a:blip r:embed="rId5">
+          <a:blip r:embed="rId6">
             <a:extLst>
               <a:ext uri="{28A0092B-C50C-407E-A947-70E740481C1C}">
                 <a14:useLocalDpi xmlns:a14="http://schemas.microsoft.com/office/drawing/2010/main" val="0"/>
@@ -7868,6 +7308,773 @@
 </p:sld>
 </file>
 
+<file path=ppt/slides/slide6.xml><?xml version="1.0" encoding="utf-8"?>
+<p:sld xmlns:a="http://schemas.openxmlformats.org/drawingml/2006/main" xmlns:r="http://schemas.openxmlformats.org/officeDocument/2006/relationships" xmlns:p="http://schemas.openxmlformats.org/presentationml/2006/main">
+  <p:cSld>
+    <p:spTree>
+      <p:nvGrpSpPr>
+        <p:cNvPr id="1" name=""/>
+        <p:cNvGrpSpPr/>
+        <p:nvPr/>
+      </p:nvGrpSpPr>
+      <p:grpSpPr>
+        <a:xfrm>
+          <a:off x="0" y="0"/>
+          <a:ext cx="0" cy="0"/>
+          <a:chOff x="0" y="0"/>
+          <a:chExt cx="0" cy="0"/>
+        </a:xfrm>
+      </p:grpSpPr>
+      <p:sp>
+        <p:nvSpPr>
+          <p:cNvPr id="2" name="Title 1"/>
+          <p:cNvSpPr>
+            <a:spLocks noGrp="1"/>
+          </p:cNvSpPr>
+          <p:nvPr>
+            <p:ph type="title"/>
+            <p:custDataLst>
+              <p:tags r:id="rId2"/>
+            </p:custDataLst>
+          </p:nvPr>
+        </p:nvSpPr>
+        <p:spPr/>
+        <p:txBody>
+          <a:bodyPr/>
+          <a:lstStyle/>
+          <a:p>
+            <a:r>
+              <a:rPr lang="en-US" dirty="0" smtClean="0"/>
+              <a:t>External DSL Processing</a:t>
+            </a:r>
+            <a:endParaRPr lang="en-US" dirty="0"/>
+          </a:p>
+        </p:txBody>
+      </p:sp>
+      <p:sp>
+        <p:nvSpPr>
+          <p:cNvPr id="3" name="Content Placeholder 2"/>
+          <p:cNvSpPr>
+            <a:spLocks noGrp="1"/>
+          </p:cNvSpPr>
+          <p:nvPr>
+            <p:ph idx="1"/>
+            <p:custDataLst>
+              <p:tags r:id="rId3"/>
+            </p:custDataLst>
+          </p:nvPr>
+        </p:nvSpPr>
+        <p:spPr/>
+        <p:txBody>
+          <a:bodyPr/>
+          <a:lstStyle/>
+          <a:p>
+            <a:endParaRPr lang="en-US" dirty="0"/>
+          </a:p>
+        </p:txBody>
+      </p:sp>
+      <p:sp>
+        <p:nvSpPr>
+          <p:cNvPr id="4" name="Rectangle 3"/>
+          <p:cNvSpPr/>
+          <p:nvPr>
+            <p:custDataLst>
+              <p:tags r:id="rId4"/>
+            </p:custDataLst>
+          </p:nvPr>
+        </p:nvSpPr>
+        <p:spPr>
+          <a:xfrm>
+            <a:off x="609600" y="2971800"/>
+            <a:ext cx="1371600" cy="914400"/>
+          </a:xfrm>
+          <a:prstGeom prst="rect">
+            <a:avLst/>
+          </a:prstGeom>
+        </p:spPr>
+        <p:style>
+          <a:lnRef idx="2">
+            <a:schemeClr val="accent1">
+              <a:shade val="50000"/>
+            </a:schemeClr>
+          </a:lnRef>
+          <a:fillRef idx="1">
+            <a:schemeClr val="accent1"/>
+          </a:fillRef>
+          <a:effectRef idx="0">
+            <a:schemeClr val="accent1"/>
+          </a:effectRef>
+          <a:fontRef idx="minor">
+            <a:schemeClr val="lt1"/>
+          </a:fontRef>
+        </p:style>
+        <p:txBody>
+          <a:bodyPr rtlCol="0" anchor="ctr"/>
+          <a:lstStyle/>
+          <a:p>
+            <a:pPr algn="ctr"/>
+            <a:r>
+              <a:rPr lang="en-US" dirty="0" smtClean="0"/>
+              <a:t>DSL script</a:t>
+            </a:r>
+            <a:endParaRPr lang="en-US" dirty="0"/>
+          </a:p>
+        </p:txBody>
+      </p:sp>
+      <p:sp>
+        <p:nvSpPr>
+          <p:cNvPr id="6" name="Rectangle 5"/>
+          <p:cNvSpPr/>
+          <p:nvPr>
+            <p:custDataLst>
+              <p:tags r:id="rId5"/>
+            </p:custDataLst>
+          </p:nvPr>
+        </p:nvSpPr>
+        <p:spPr>
+          <a:xfrm>
+            <a:off x="3810000" y="2971800"/>
+            <a:ext cx="1371600" cy="914400"/>
+          </a:xfrm>
+          <a:prstGeom prst="rect">
+            <a:avLst/>
+          </a:prstGeom>
+        </p:spPr>
+        <p:style>
+          <a:lnRef idx="2">
+            <a:schemeClr val="accent1">
+              <a:shade val="50000"/>
+            </a:schemeClr>
+          </a:lnRef>
+          <a:fillRef idx="1">
+            <a:schemeClr val="accent1"/>
+          </a:fillRef>
+          <a:effectRef idx="0">
+            <a:schemeClr val="accent1"/>
+          </a:effectRef>
+          <a:fontRef idx="minor">
+            <a:schemeClr val="lt1"/>
+          </a:fontRef>
+        </p:style>
+        <p:txBody>
+          <a:bodyPr rtlCol="0" anchor="ctr"/>
+          <a:lstStyle/>
+          <a:p>
+            <a:pPr algn="ctr"/>
+            <a:r>
+              <a:rPr lang="en-US" dirty="0" smtClean="0"/>
+              <a:t>Semantic Model</a:t>
+            </a:r>
+            <a:endParaRPr lang="en-US" dirty="0"/>
+          </a:p>
+        </p:txBody>
+      </p:sp>
+      <p:sp>
+        <p:nvSpPr>
+          <p:cNvPr id="8" name="Rectangle 7"/>
+          <p:cNvSpPr/>
+          <p:nvPr>
+            <p:custDataLst>
+              <p:tags r:id="rId6"/>
+            </p:custDataLst>
+          </p:nvPr>
+        </p:nvSpPr>
+        <p:spPr>
+          <a:xfrm>
+            <a:off x="6934200" y="3000375"/>
+            <a:ext cx="1371600" cy="914400"/>
+          </a:xfrm>
+          <a:prstGeom prst="rect">
+            <a:avLst/>
+          </a:prstGeom>
+        </p:spPr>
+        <p:style>
+          <a:lnRef idx="2">
+            <a:schemeClr val="accent1">
+              <a:shade val="50000"/>
+            </a:schemeClr>
+          </a:lnRef>
+          <a:fillRef idx="1">
+            <a:schemeClr val="accent1"/>
+          </a:fillRef>
+          <a:effectRef idx="0">
+            <a:schemeClr val="accent1"/>
+          </a:effectRef>
+          <a:fontRef idx="minor">
+            <a:schemeClr val="lt1"/>
+          </a:fontRef>
+        </p:style>
+        <p:txBody>
+          <a:bodyPr rtlCol="0" anchor="ctr"/>
+          <a:lstStyle/>
+          <a:p>
+            <a:pPr algn="ctr"/>
+            <a:r>
+              <a:rPr lang="en-US" dirty="0" smtClean="0"/>
+              <a:t>Target Code</a:t>
+            </a:r>
+            <a:endParaRPr lang="en-US" dirty="0"/>
+          </a:p>
+        </p:txBody>
+      </p:sp>
+      <p:sp>
+        <p:nvSpPr>
+          <p:cNvPr id="9" name="Right Arrow 8"/>
+          <p:cNvSpPr/>
+          <p:nvPr>
+            <p:custDataLst>
+              <p:tags r:id="rId7"/>
+            </p:custDataLst>
+          </p:nvPr>
+        </p:nvSpPr>
+        <p:spPr>
+          <a:xfrm>
+            <a:off x="2286000" y="3200400"/>
+            <a:ext cx="1219200" cy="457200"/>
+          </a:xfrm>
+          <a:prstGeom prst="rightArrow">
+            <a:avLst/>
+          </a:prstGeom>
+        </p:spPr>
+        <p:style>
+          <a:lnRef idx="2">
+            <a:schemeClr val="accent1">
+              <a:shade val="50000"/>
+            </a:schemeClr>
+          </a:lnRef>
+          <a:fillRef idx="1">
+            <a:schemeClr val="accent1"/>
+          </a:fillRef>
+          <a:effectRef idx="0">
+            <a:schemeClr val="accent1"/>
+          </a:effectRef>
+          <a:fontRef idx="minor">
+            <a:schemeClr val="lt1"/>
+          </a:fontRef>
+        </p:style>
+        <p:txBody>
+          <a:bodyPr rtlCol="0" anchor="ctr"/>
+          <a:lstStyle/>
+          <a:p>
+            <a:pPr algn="ctr"/>
+            <a:r>
+              <a:rPr lang="en-US" dirty="0" smtClean="0"/>
+              <a:t>Parse</a:t>
+            </a:r>
+            <a:endParaRPr lang="en-US" dirty="0"/>
+          </a:p>
+        </p:txBody>
+      </p:sp>
+      <p:sp>
+        <p:nvSpPr>
+          <p:cNvPr id="11" name="Right Arrow 10"/>
+          <p:cNvSpPr/>
+          <p:nvPr>
+            <p:custDataLst>
+              <p:tags r:id="rId8"/>
+            </p:custDataLst>
+          </p:nvPr>
+        </p:nvSpPr>
+        <p:spPr>
+          <a:xfrm>
+            <a:off x="5486400" y="3228975"/>
+            <a:ext cx="1219200" cy="457200"/>
+          </a:xfrm>
+          <a:prstGeom prst="rightArrow">
+            <a:avLst/>
+          </a:prstGeom>
+        </p:spPr>
+        <p:style>
+          <a:lnRef idx="2">
+            <a:schemeClr val="accent1">
+              <a:shade val="50000"/>
+            </a:schemeClr>
+          </a:lnRef>
+          <a:fillRef idx="1">
+            <a:schemeClr val="accent1"/>
+          </a:fillRef>
+          <a:effectRef idx="0">
+            <a:schemeClr val="accent1"/>
+          </a:effectRef>
+          <a:fontRef idx="minor">
+            <a:schemeClr val="lt1"/>
+          </a:fontRef>
+        </p:style>
+        <p:txBody>
+          <a:bodyPr rtlCol="0" anchor="ctr"/>
+          <a:lstStyle/>
+          <a:p>
+            <a:pPr algn="ctr"/>
+            <a:r>
+              <a:rPr lang="en-US" dirty="0" smtClean="0"/>
+              <a:t>Generate</a:t>
+            </a:r>
+            <a:endParaRPr lang="en-US" dirty="0"/>
+          </a:p>
+        </p:txBody>
+      </p:sp>
+    </p:spTree>
+    <p:custDataLst>
+      <p:tags r:id="rId1"/>
+    </p:custDataLst>
+    <p:extLst>
+      <p:ext uri="{BB962C8B-B14F-4D97-AF65-F5344CB8AC3E}">
+        <p14:creationId xmlns:p14="http://schemas.microsoft.com/office/powerpoint/2010/main" val="2727538279"/>
+      </p:ext>
+    </p:extLst>
+  </p:cSld>
+  <p:clrMapOvr>
+    <a:masterClrMapping/>
+  </p:clrMapOvr>
+</p:sld>
+</file>
+
+<file path=ppt/slides/slide7.xml><?xml version="1.0" encoding="utf-8"?>
+<p:sld xmlns:a="http://schemas.openxmlformats.org/drawingml/2006/main" xmlns:r="http://schemas.openxmlformats.org/officeDocument/2006/relationships" xmlns:p="http://schemas.openxmlformats.org/presentationml/2006/main">
+  <p:cSld>
+    <p:spTree>
+      <p:nvGrpSpPr>
+        <p:cNvPr id="1" name=""/>
+        <p:cNvGrpSpPr/>
+        <p:nvPr/>
+      </p:nvGrpSpPr>
+      <p:grpSpPr>
+        <a:xfrm>
+          <a:off x="0" y="0"/>
+          <a:ext cx="0" cy="0"/>
+          <a:chOff x="0" y="0"/>
+          <a:chExt cx="0" cy="0"/>
+        </a:xfrm>
+      </p:grpSpPr>
+      <p:sp>
+        <p:nvSpPr>
+          <p:cNvPr id="2" name="Title 1"/>
+          <p:cNvSpPr>
+            <a:spLocks noGrp="1"/>
+          </p:cNvSpPr>
+          <p:nvPr>
+            <p:ph type="title"/>
+            <p:custDataLst>
+              <p:tags r:id="rId2"/>
+            </p:custDataLst>
+          </p:nvPr>
+        </p:nvSpPr>
+        <p:spPr/>
+        <p:txBody>
+          <a:bodyPr/>
+          <a:lstStyle/>
+          <a:p>
+            <a:r>
+              <a:rPr lang="en-US" dirty="0" smtClean="0"/>
+              <a:t>External DSL Processing</a:t>
+            </a:r>
+            <a:endParaRPr lang="en-US" dirty="0"/>
+          </a:p>
+        </p:txBody>
+      </p:sp>
+      <p:sp>
+        <p:nvSpPr>
+          <p:cNvPr id="3" name="Content Placeholder 2"/>
+          <p:cNvSpPr>
+            <a:spLocks noGrp="1"/>
+          </p:cNvSpPr>
+          <p:nvPr>
+            <p:ph idx="1"/>
+            <p:custDataLst>
+              <p:tags r:id="rId3"/>
+            </p:custDataLst>
+          </p:nvPr>
+        </p:nvSpPr>
+        <p:spPr/>
+        <p:txBody>
+          <a:bodyPr/>
+          <a:lstStyle/>
+          <a:p>
+            <a:endParaRPr lang="en-US" dirty="0"/>
+          </a:p>
+        </p:txBody>
+      </p:sp>
+      <p:sp>
+        <p:nvSpPr>
+          <p:cNvPr id="4" name="Rectangle 3"/>
+          <p:cNvSpPr/>
+          <p:nvPr>
+            <p:custDataLst>
+              <p:tags r:id="rId4"/>
+            </p:custDataLst>
+          </p:nvPr>
+        </p:nvSpPr>
+        <p:spPr>
+          <a:xfrm>
+            <a:off x="609600" y="2971800"/>
+            <a:ext cx="1371600" cy="914400"/>
+          </a:xfrm>
+          <a:prstGeom prst="rect">
+            <a:avLst/>
+          </a:prstGeom>
+        </p:spPr>
+        <p:style>
+          <a:lnRef idx="2">
+            <a:schemeClr val="accent1">
+              <a:shade val="50000"/>
+            </a:schemeClr>
+          </a:lnRef>
+          <a:fillRef idx="1">
+            <a:schemeClr val="accent1"/>
+          </a:fillRef>
+          <a:effectRef idx="0">
+            <a:schemeClr val="accent1"/>
+          </a:effectRef>
+          <a:fontRef idx="minor">
+            <a:schemeClr val="lt1"/>
+          </a:fontRef>
+        </p:style>
+        <p:txBody>
+          <a:bodyPr rtlCol="0" anchor="ctr"/>
+          <a:lstStyle/>
+          <a:p>
+            <a:pPr algn="ctr"/>
+            <a:r>
+              <a:rPr lang="en-US" dirty="0" smtClean="0"/>
+              <a:t>DSL script</a:t>
+            </a:r>
+            <a:endParaRPr lang="en-US" dirty="0"/>
+          </a:p>
+        </p:txBody>
+      </p:sp>
+      <p:sp>
+        <p:nvSpPr>
+          <p:cNvPr id="6" name="Rectangle 5"/>
+          <p:cNvSpPr/>
+          <p:nvPr>
+            <p:custDataLst>
+              <p:tags r:id="rId5"/>
+            </p:custDataLst>
+          </p:nvPr>
+        </p:nvSpPr>
+        <p:spPr>
+          <a:xfrm>
+            <a:off x="3810000" y="2971800"/>
+            <a:ext cx="1371600" cy="914400"/>
+          </a:xfrm>
+          <a:prstGeom prst="rect">
+            <a:avLst/>
+          </a:prstGeom>
+        </p:spPr>
+        <p:style>
+          <a:lnRef idx="2">
+            <a:schemeClr val="accent1">
+              <a:shade val="50000"/>
+            </a:schemeClr>
+          </a:lnRef>
+          <a:fillRef idx="1">
+            <a:schemeClr val="accent1"/>
+          </a:fillRef>
+          <a:effectRef idx="0">
+            <a:schemeClr val="accent1"/>
+          </a:effectRef>
+          <a:fontRef idx="minor">
+            <a:schemeClr val="lt1"/>
+          </a:fontRef>
+        </p:style>
+        <p:txBody>
+          <a:bodyPr rtlCol="0" anchor="ctr"/>
+          <a:lstStyle/>
+          <a:p>
+            <a:pPr algn="ctr"/>
+            <a:r>
+              <a:rPr lang="en-US" dirty="0" smtClean="0"/>
+              <a:t>Semantic Model</a:t>
+            </a:r>
+            <a:endParaRPr lang="en-US" dirty="0"/>
+          </a:p>
+        </p:txBody>
+      </p:sp>
+      <p:sp>
+        <p:nvSpPr>
+          <p:cNvPr id="8" name="Rectangle 7"/>
+          <p:cNvSpPr/>
+          <p:nvPr>
+            <p:custDataLst>
+              <p:tags r:id="rId6"/>
+            </p:custDataLst>
+          </p:nvPr>
+        </p:nvSpPr>
+        <p:spPr>
+          <a:xfrm>
+            <a:off x="6934200" y="3000375"/>
+            <a:ext cx="1371600" cy="914400"/>
+          </a:xfrm>
+          <a:prstGeom prst="rect">
+            <a:avLst/>
+          </a:prstGeom>
+        </p:spPr>
+        <p:style>
+          <a:lnRef idx="2">
+            <a:schemeClr val="accent1">
+              <a:shade val="50000"/>
+            </a:schemeClr>
+          </a:lnRef>
+          <a:fillRef idx="1">
+            <a:schemeClr val="accent1"/>
+          </a:fillRef>
+          <a:effectRef idx="0">
+            <a:schemeClr val="accent1"/>
+          </a:effectRef>
+          <a:fontRef idx="minor">
+            <a:schemeClr val="lt1"/>
+          </a:fontRef>
+        </p:style>
+        <p:txBody>
+          <a:bodyPr rtlCol="0" anchor="ctr"/>
+          <a:lstStyle/>
+          <a:p>
+            <a:pPr algn="ctr"/>
+            <a:r>
+              <a:rPr lang="en-US" dirty="0" smtClean="0"/>
+              <a:t>Target Code</a:t>
+            </a:r>
+            <a:endParaRPr lang="en-US" dirty="0"/>
+          </a:p>
+        </p:txBody>
+      </p:sp>
+      <p:sp>
+        <p:nvSpPr>
+          <p:cNvPr id="9" name="Right Arrow 8"/>
+          <p:cNvSpPr/>
+          <p:nvPr>
+            <p:custDataLst>
+              <p:tags r:id="rId7"/>
+            </p:custDataLst>
+          </p:nvPr>
+        </p:nvSpPr>
+        <p:spPr>
+          <a:xfrm>
+            <a:off x="2286000" y="3200400"/>
+            <a:ext cx="1219200" cy="457200"/>
+          </a:xfrm>
+          <a:prstGeom prst="rightArrow">
+            <a:avLst/>
+          </a:prstGeom>
+          <a:effectLst>
+            <a:glow rad="228600">
+              <a:schemeClr val="accent1">
+                <a:satMod val="175000"/>
+                <a:alpha val="40000"/>
+              </a:schemeClr>
+            </a:glow>
+          </a:effectLst>
+        </p:spPr>
+        <p:style>
+          <a:lnRef idx="2">
+            <a:schemeClr val="accent3">
+              <a:shade val="50000"/>
+            </a:schemeClr>
+          </a:lnRef>
+          <a:fillRef idx="1">
+            <a:schemeClr val="accent3"/>
+          </a:fillRef>
+          <a:effectRef idx="0">
+            <a:schemeClr val="accent3"/>
+          </a:effectRef>
+          <a:fontRef idx="minor">
+            <a:schemeClr val="lt1"/>
+          </a:fontRef>
+        </p:style>
+        <p:txBody>
+          <a:bodyPr rtlCol="0" anchor="ctr"/>
+          <a:lstStyle/>
+          <a:p>
+            <a:pPr algn="ctr"/>
+            <a:r>
+              <a:rPr lang="en-US" dirty="0" smtClean="0"/>
+              <a:t>Parse</a:t>
+            </a:r>
+            <a:endParaRPr lang="en-US" dirty="0"/>
+          </a:p>
+        </p:txBody>
+      </p:sp>
+      <p:sp>
+        <p:nvSpPr>
+          <p:cNvPr id="11" name="Right Arrow 10"/>
+          <p:cNvSpPr/>
+          <p:nvPr>
+            <p:custDataLst>
+              <p:tags r:id="rId8"/>
+            </p:custDataLst>
+          </p:nvPr>
+        </p:nvSpPr>
+        <p:spPr>
+          <a:xfrm>
+            <a:off x="5486400" y="3228975"/>
+            <a:ext cx="1219200" cy="457200"/>
+          </a:xfrm>
+          <a:prstGeom prst="rightArrow">
+            <a:avLst/>
+          </a:prstGeom>
+        </p:spPr>
+        <p:style>
+          <a:lnRef idx="2">
+            <a:schemeClr val="accent1">
+              <a:shade val="50000"/>
+            </a:schemeClr>
+          </a:lnRef>
+          <a:fillRef idx="1">
+            <a:schemeClr val="accent1"/>
+          </a:fillRef>
+          <a:effectRef idx="0">
+            <a:schemeClr val="accent1"/>
+          </a:effectRef>
+          <a:fontRef idx="minor">
+            <a:schemeClr val="lt1"/>
+          </a:fontRef>
+        </p:style>
+        <p:txBody>
+          <a:bodyPr rtlCol="0" anchor="ctr"/>
+          <a:lstStyle/>
+          <a:p>
+            <a:pPr algn="ctr"/>
+            <a:r>
+              <a:rPr lang="en-US" dirty="0" smtClean="0"/>
+              <a:t>Generate</a:t>
+            </a:r>
+            <a:endParaRPr lang="en-US" dirty="0"/>
+          </a:p>
+        </p:txBody>
+      </p:sp>
+    </p:spTree>
+    <p:custDataLst>
+      <p:tags r:id="rId1"/>
+    </p:custDataLst>
+    <p:extLst>
+      <p:ext uri="{BB962C8B-B14F-4D97-AF65-F5344CB8AC3E}">
+        <p14:creationId xmlns:p14="http://schemas.microsoft.com/office/powerpoint/2010/main" val="2215226172"/>
+      </p:ext>
+    </p:extLst>
+  </p:cSld>
+  <p:clrMapOvr>
+    <a:masterClrMapping/>
+  </p:clrMapOvr>
+</p:sld>
+</file>
+
+<file path=ppt/slides/slide8.xml><?xml version="1.0" encoding="utf-8"?>
+<p:sld xmlns:a="http://schemas.openxmlformats.org/drawingml/2006/main" xmlns:r="http://schemas.openxmlformats.org/officeDocument/2006/relationships" xmlns:p="http://schemas.openxmlformats.org/presentationml/2006/main">
+  <p:cSld>
+    <p:spTree>
+      <p:nvGrpSpPr>
+        <p:cNvPr id="1" name=""/>
+        <p:cNvGrpSpPr/>
+        <p:nvPr/>
+      </p:nvGrpSpPr>
+      <p:grpSpPr>
+        <a:xfrm>
+          <a:off x="0" y="0"/>
+          <a:ext cx="0" cy="0"/>
+          <a:chOff x="0" y="0"/>
+          <a:chExt cx="0" cy="0"/>
+        </a:xfrm>
+      </p:grpSpPr>
+      <p:sp>
+        <p:nvSpPr>
+          <p:cNvPr id="2" name="Title 1"/>
+          <p:cNvSpPr>
+            <a:spLocks noGrp="1"/>
+          </p:cNvSpPr>
+          <p:nvPr>
+            <p:ph type="title"/>
+            <p:custDataLst>
+              <p:tags r:id="rId2"/>
+            </p:custDataLst>
+          </p:nvPr>
+        </p:nvSpPr>
+        <p:spPr/>
+        <p:txBody>
+          <a:bodyPr/>
+          <a:lstStyle/>
+          <a:p>
+            <a:r>
+              <a:rPr lang="en-US" dirty="0" smtClean="0"/>
+              <a:t>Parsing</a:t>
+            </a:r>
+            <a:endParaRPr lang="en-US" dirty="0"/>
+          </a:p>
+        </p:txBody>
+      </p:sp>
+      <p:sp>
+        <p:nvSpPr>
+          <p:cNvPr id="3" name="Content Placeholder 2"/>
+          <p:cNvSpPr>
+            <a:spLocks noGrp="1"/>
+          </p:cNvSpPr>
+          <p:nvPr>
+            <p:ph idx="1"/>
+            <p:custDataLst>
+              <p:tags r:id="rId3"/>
+            </p:custDataLst>
+          </p:nvPr>
+        </p:nvSpPr>
+        <p:spPr/>
+        <p:txBody>
+          <a:bodyPr/>
+          <a:lstStyle/>
+          <a:p>
+            <a:r>
+              <a:rPr lang="en-US" dirty="0" err="1" smtClean="0"/>
+              <a:t>Lexer</a:t>
+            </a:r>
+            <a:r>
+              <a:rPr lang="en-US" dirty="0" smtClean="0"/>
+              <a:t>/Parser tool</a:t>
+            </a:r>
+          </a:p>
+          <a:p>
+            <a:pPr lvl="1"/>
+            <a:r>
+              <a:rPr lang="en-US" dirty="0" err="1" smtClean="0"/>
+              <a:t>yacc</a:t>
+            </a:r>
+            <a:endParaRPr lang="en-US" dirty="0" smtClean="0"/>
+          </a:p>
+          <a:p>
+            <a:pPr lvl="1"/>
+            <a:r>
+              <a:rPr lang="en-US" dirty="0" smtClean="0"/>
+              <a:t>ANTLR</a:t>
+            </a:r>
+          </a:p>
+          <a:p>
+            <a:pPr lvl="1"/>
+            <a:r>
+              <a:rPr lang="en-US" dirty="0" smtClean="0"/>
+              <a:t>Irony</a:t>
+            </a:r>
+          </a:p>
+          <a:p>
+            <a:r>
+              <a:rPr lang="en-US" dirty="0" smtClean="0"/>
+              <a:t>Language Workbench</a:t>
+            </a:r>
+            <a:endParaRPr lang="en-US" dirty="0"/>
+          </a:p>
+        </p:txBody>
+      </p:sp>
+    </p:spTree>
+    <p:custDataLst>
+      <p:tags r:id="rId1"/>
+    </p:custDataLst>
+    <p:extLst>
+      <p:ext uri="{BB962C8B-B14F-4D97-AF65-F5344CB8AC3E}">
+        <p14:creationId xmlns:p14="http://schemas.microsoft.com/office/powerpoint/2010/main" val="1524848044"/>
+      </p:ext>
+    </p:extLst>
+  </p:cSld>
+  <p:clrMapOvr>
+    <a:masterClrMapping/>
+  </p:clrMapOvr>
+</p:sld>
+</file>
+
 <file path=ppt/slides/slide9.xml><?xml version="1.0" encoding="utf-8"?>
 <p:sld xmlns:a="http://schemas.openxmlformats.org/drawingml/2006/main" xmlns:r="http://schemas.openxmlformats.org/officeDocument/2006/relationships" xmlns:p="http://schemas.openxmlformats.org/presentationml/2006/main">
   <p:cSld>
@@ -7905,7 +8112,7 @@
           <a:p>
             <a:r>
               <a:rPr lang="en-US" dirty="0" smtClean="0"/>
-              <a:t>When to use Internal DSLs?</a:t>
+              <a:t>Parsing</a:t>
             </a:r>
             <a:endParaRPr lang="en-US" dirty="0"/>
           </a:p>
@@ -7926,20 +8133,19 @@
         </p:nvSpPr>
         <p:spPr/>
         <p:txBody>
-          <a:bodyPr/>
+          <a:bodyPr anchor="ctr">
+            <a:normAutofit/>
+          </a:bodyPr>
           <a:lstStyle/>
           <a:p>
-            <a:r>
-              <a:rPr lang="en-US" dirty="0" smtClean="0"/>
-              <a:t>Good for when coders are using the DSL</a:t>
-            </a:r>
-          </a:p>
-          <a:p>
-            <a:r>
-              <a:rPr lang="en-US" dirty="0" smtClean="0"/>
-              <a:t>More static in nature</a:t>
-            </a:r>
-            <a:endParaRPr lang="en-US" dirty="0"/>
+            <a:pPr marL="0" indent="0" algn="ctr">
+              <a:buNone/>
+            </a:pPr>
+            <a:r>
+              <a:rPr lang="en-US" sz="19900" dirty="0" smtClean="0"/>
+              <a:t>1 + 2</a:t>
+            </a:r>
+            <a:endParaRPr lang="en-US" sz="19900" dirty="0"/>
           </a:p>
         </p:txBody>
       </p:sp>
@@ -7949,7 +8155,7 @@
     </p:custDataLst>
     <p:extLst>
       <p:ext uri="{BB962C8B-B14F-4D97-AF65-F5344CB8AC3E}">
-        <p14:creationId xmlns:p14="http://schemas.microsoft.com/office/powerpoint/2010/main" val="854876620"/>
+        <p14:creationId xmlns:p14="http://schemas.microsoft.com/office/powerpoint/2010/main" val="317508930"/>
       </p:ext>
     </p:extLst>
   </p:cSld>
@@ -8105,55 +8311,55 @@
 
 <file path=ppt/tags/tag31.xml><?xml version="1.0" encoding="utf-8"?>
 <p:tagLst xmlns:a="http://schemas.openxmlformats.org/drawingml/2006/main" xmlns:r="http://schemas.openxmlformats.org/officeDocument/2006/relationships" xmlns:p="http://schemas.openxmlformats.org/presentationml/2006/main">
-  <p:tag name="DVSECTIONID" val="5iH34WsJAZUvMGFSWWrwB6"/>
-</p:tagLst>
-</file>
-
-<file path=ppt/tags/tag32.xml><?xml version="1.0" encoding="utf-8"?>
-<p:tagLst xmlns:a="http://schemas.openxmlformats.org/drawingml/2006/main" xmlns:r="http://schemas.openxmlformats.org/officeDocument/2006/relationships" xmlns:p="http://schemas.openxmlformats.org/presentationml/2006/main">
-  <p:tag name="DVSHAPEID" val="BYMlnZc9wfBSJ46vg7VR4F"/>
-</p:tagLst>
-</file>
-
-<file path=ppt/tags/tag33.xml><?xml version="1.0" encoding="utf-8"?>
-<p:tagLst xmlns:a="http://schemas.openxmlformats.org/drawingml/2006/main" xmlns:r="http://schemas.openxmlformats.org/officeDocument/2006/relationships" xmlns:p="http://schemas.openxmlformats.org/presentationml/2006/main">
-  <p:tag name="DVSHAPEID" val="7M6N0z5pW1kulYUrglr0WG"/>
-</p:tagLst>
-</file>
-
-<file path=ppt/tags/tag34.xml><?xml version="1.0" encoding="utf-8"?>
-<p:tagLst xmlns:a="http://schemas.openxmlformats.org/drawingml/2006/main" xmlns:r="http://schemas.openxmlformats.org/officeDocument/2006/relationships" xmlns:p="http://schemas.openxmlformats.org/presentationml/2006/main">
-  <p:tag name="DVSECTIONID" val="jN8Op8ifxLNDSNxOWMOSPb"/>
-</p:tagLst>
-</file>
-
-<file path=ppt/tags/tag35.xml><?xml version="1.0" encoding="utf-8"?>
-<p:tagLst xmlns:a="http://schemas.openxmlformats.org/drawingml/2006/main" xmlns:r="http://schemas.openxmlformats.org/officeDocument/2006/relationships" xmlns:p="http://schemas.openxmlformats.org/presentationml/2006/main">
-  <p:tag name="DVSHAPEID" val="vKeQ5svRqVFVR0ezZC36jz"/>
-</p:tagLst>
-</file>
-
-<file path=ppt/tags/tag36.xml><?xml version="1.0" encoding="utf-8"?>
-<p:tagLst xmlns:a="http://schemas.openxmlformats.org/drawingml/2006/main" xmlns:r="http://schemas.openxmlformats.org/officeDocument/2006/relationships" xmlns:p="http://schemas.openxmlformats.org/presentationml/2006/main">
-  <p:tag name="DVSHAPEID" val="xfI7APQAp3Jqgmz9tDU4Ap"/>
-</p:tagLst>
-</file>
-
-<file path=ppt/tags/tag37.xml><?xml version="1.0" encoding="utf-8"?>
-<p:tagLst xmlns:a="http://schemas.openxmlformats.org/drawingml/2006/main" xmlns:r="http://schemas.openxmlformats.org/officeDocument/2006/relationships" xmlns:p="http://schemas.openxmlformats.org/presentationml/2006/main">
   <p:tag name="DVSECTIONID" val="cjNbiFpVhHkZZTUgxkrlr9"/>
 </p:tagLst>
 </file>
 
-<file path=ppt/tags/tag38.xml><?xml version="1.0" encoding="utf-8"?>
+<file path=ppt/tags/tag32.xml><?xml version="1.0" encoding="utf-8"?>
 <p:tagLst xmlns:a="http://schemas.openxmlformats.org/drawingml/2006/main" xmlns:r="http://schemas.openxmlformats.org/officeDocument/2006/relationships" xmlns:p="http://schemas.openxmlformats.org/presentationml/2006/main">
   <p:tag name="DVSHAPEID" val="Oq7TcHmPXPnWcY8XSF1QvC"/>
 </p:tagLst>
 </file>
 
+<file path=ppt/tags/tag33.xml><?xml version="1.0" encoding="utf-8"?>
+<p:tagLst xmlns:a="http://schemas.openxmlformats.org/drawingml/2006/main" xmlns:r="http://schemas.openxmlformats.org/officeDocument/2006/relationships" xmlns:p="http://schemas.openxmlformats.org/presentationml/2006/main">
+  <p:tag name="DVSHAPEID" val="cqKSZP9qceZ7qiZGD8eA6T"/>
+</p:tagLst>
+</file>
+
+<file path=ppt/tags/tag34.xml><?xml version="1.0" encoding="utf-8"?>
+<p:tagLst xmlns:a="http://schemas.openxmlformats.org/drawingml/2006/main" xmlns:r="http://schemas.openxmlformats.org/officeDocument/2006/relationships" xmlns:p="http://schemas.openxmlformats.org/presentationml/2006/main">
+  <p:tag name="DVSECTIONID" val="jSNDTGftquJ2BEnqkhVCZB"/>
+</p:tagLst>
+</file>
+
+<file path=ppt/tags/tag35.xml><?xml version="1.0" encoding="utf-8"?>
+<p:tagLst xmlns:a="http://schemas.openxmlformats.org/drawingml/2006/main" xmlns:r="http://schemas.openxmlformats.org/officeDocument/2006/relationships" xmlns:p="http://schemas.openxmlformats.org/presentationml/2006/main">
+  <p:tag name="DVSHAPEID" val="df5ixjqHUzgSn53cxzbb90"/>
+</p:tagLst>
+</file>
+
+<file path=ppt/tags/tag36.xml><?xml version="1.0" encoding="utf-8"?>
+<p:tagLst xmlns:a="http://schemas.openxmlformats.org/drawingml/2006/main" xmlns:r="http://schemas.openxmlformats.org/officeDocument/2006/relationships" xmlns:p="http://schemas.openxmlformats.org/presentationml/2006/main">
+  <p:tag name="DVSHAPEID" val="FUjJBjJ3RFZIRiKGEIrTZW"/>
+</p:tagLst>
+</file>
+
+<file path=ppt/tags/tag37.xml><?xml version="1.0" encoding="utf-8"?>
+<p:tagLst xmlns:a="http://schemas.openxmlformats.org/drawingml/2006/main" xmlns:r="http://schemas.openxmlformats.org/officeDocument/2006/relationships" xmlns:p="http://schemas.openxmlformats.org/presentationml/2006/main">
+  <p:tag name="DVSECTIONID" val="nYQslB3BcKjWuJTSs7xX9O"/>
+</p:tagLst>
+</file>
+
+<file path=ppt/tags/tag38.xml><?xml version="1.0" encoding="utf-8"?>
+<p:tagLst xmlns:a="http://schemas.openxmlformats.org/drawingml/2006/main" xmlns:r="http://schemas.openxmlformats.org/officeDocument/2006/relationships" xmlns:p="http://schemas.openxmlformats.org/presentationml/2006/main">
+  <p:tag name="DVSHAPEID" val="usdizoYKCzLOrTixKhc4di"/>
+</p:tagLst>
+</file>
+
 <file path=ppt/tags/tag39.xml><?xml version="1.0" encoding="utf-8"?>
 <p:tagLst xmlns:a="http://schemas.openxmlformats.org/drawingml/2006/main" xmlns:r="http://schemas.openxmlformats.org/officeDocument/2006/relationships" xmlns:p="http://schemas.openxmlformats.org/presentationml/2006/main">
-  <p:tag name="DVSHAPEID" val="cqKSZP9qceZ7qiZGD8eA6T"/>
+  <p:tag name="DVSHAPEID" val="IImPzh25RPtklPWN9KR9j8"/>
 </p:tagLst>
 </file>
 
@@ -8165,61 +8371,61 @@
 
 <file path=ppt/tags/tag40.xml><?xml version="1.0" encoding="utf-8"?>
 <p:tagLst xmlns:a="http://schemas.openxmlformats.org/drawingml/2006/main" xmlns:r="http://schemas.openxmlformats.org/officeDocument/2006/relationships" xmlns:p="http://schemas.openxmlformats.org/presentationml/2006/main">
-  <p:tag name="DVSECTIONID" val="I8NSl70EIIg7BO0ePCPBt5"/>
+  <p:tag name="DVSHAPEID" val="7c87zDjacgEcJvWKOGHxIV"/>
 </p:tagLst>
 </file>
 
 <file path=ppt/tags/tag41.xml><?xml version="1.0" encoding="utf-8"?>
 <p:tagLst xmlns:a="http://schemas.openxmlformats.org/drawingml/2006/main" xmlns:r="http://schemas.openxmlformats.org/officeDocument/2006/relationships" xmlns:p="http://schemas.openxmlformats.org/presentationml/2006/main">
-  <p:tag name="DVSHAPEID" val="2k9B1wLe3KUbdH9jIwFwD9"/>
+  <p:tag name="DVSHAPEID" val="k7xsAX7rc4ZzAaGrIpLHCd"/>
 </p:tagLst>
 </file>
 
 <file path=ppt/tags/tag42.xml><?xml version="1.0" encoding="utf-8"?>
 <p:tagLst xmlns:a="http://schemas.openxmlformats.org/drawingml/2006/main" xmlns:r="http://schemas.openxmlformats.org/officeDocument/2006/relationships" xmlns:p="http://schemas.openxmlformats.org/presentationml/2006/main">
-  <p:tag name="DVSHAPEID" val="W4xPYb2SBUwinqIoNCFXae"/>
+  <p:tag name="DVSHAPEID" val="F95rRpVbrLpbR1A62m2L3z"/>
 </p:tagLst>
 </file>
 
 <file path=ppt/tags/tag43.xml><?xml version="1.0" encoding="utf-8"?>
 <p:tagLst xmlns:a="http://schemas.openxmlformats.org/drawingml/2006/main" xmlns:r="http://schemas.openxmlformats.org/officeDocument/2006/relationships" xmlns:p="http://schemas.openxmlformats.org/presentationml/2006/main">
-  <p:tag name="DVSECTIONID" val="jSNDTGftquJ2BEnqkhVCZB"/>
+  <p:tag name="DVSHAPEID" val="caUL3nYiM1i7ron85Hv1Dd"/>
 </p:tagLst>
 </file>
 
 <file path=ppt/tags/tag44.xml><?xml version="1.0" encoding="utf-8"?>
 <p:tagLst xmlns:a="http://schemas.openxmlformats.org/drawingml/2006/main" xmlns:r="http://schemas.openxmlformats.org/officeDocument/2006/relationships" xmlns:p="http://schemas.openxmlformats.org/presentationml/2006/main">
-  <p:tag name="DVSHAPEID" val="df5ixjqHUzgSn53cxzbb90"/>
+  <p:tag name="DVSHAPEID" val="9ojFRCnoER95XVx6myc9Zo"/>
 </p:tagLst>
 </file>
 
 <file path=ppt/tags/tag45.xml><?xml version="1.0" encoding="utf-8"?>
 <p:tagLst xmlns:a="http://schemas.openxmlformats.org/drawingml/2006/main" xmlns:r="http://schemas.openxmlformats.org/officeDocument/2006/relationships" xmlns:p="http://schemas.openxmlformats.org/presentationml/2006/main">
-  <p:tag name="DVSHAPEID" val="FUjJBjJ3RFZIRiKGEIrTZW"/>
+  <p:tag name="DVSECTIONID" val="d4qBFGJvJMfi0d14iIXMjH"/>
 </p:tagLst>
 </file>
 
 <file path=ppt/tags/tag46.xml><?xml version="1.0" encoding="utf-8"?>
 <p:tagLst xmlns:a="http://schemas.openxmlformats.org/drawingml/2006/main" xmlns:r="http://schemas.openxmlformats.org/officeDocument/2006/relationships" xmlns:p="http://schemas.openxmlformats.org/presentationml/2006/main">
-  <p:tag name="DVSECTIONID" val="IRi6fjvPvQFCOV4IejpeiM"/>
+  <p:tag name="DVSHAPEID" val="usdizoYKCzLOrTixKhc4di"/>
 </p:tagLst>
 </file>
 
 <file path=ppt/tags/tag47.xml><?xml version="1.0" encoding="utf-8"?>
 <p:tagLst xmlns:a="http://schemas.openxmlformats.org/drawingml/2006/main" xmlns:r="http://schemas.openxmlformats.org/officeDocument/2006/relationships" xmlns:p="http://schemas.openxmlformats.org/presentationml/2006/main">
-  <p:tag name="DVSHAPEID" val="2u2DlB55MY4dzaYNH7YRIB"/>
+  <p:tag name="DVSHAPEID" val="IImPzh25RPtklPWN9KR9j8"/>
 </p:tagLst>
 </file>
 
 <file path=ppt/tags/tag48.xml><?xml version="1.0" encoding="utf-8"?>
 <p:tagLst xmlns:a="http://schemas.openxmlformats.org/drawingml/2006/main" xmlns:r="http://schemas.openxmlformats.org/officeDocument/2006/relationships" xmlns:p="http://schemas.openxmlformats.org/presentationml/2006/main">
-  <p:tag name="DVSHAPEID" val="TEdKrRVsJf0JSOGYY8XMT0"/>
+  <p:tag name="DVSHAPEID" val="7c87zDjacgEcJvWKOGHxIV"/>
 </p:tagLst>
 </file>
 
 <file path=ppt/tags/tag49.xml><?xml version="1.0" encoding="utf-8"?>
 <p:tagLst xmlns:a="http://schemas.openxmlformats.org/drawingml/2006/main" xmlns:r="http://schemas.openxmlformats.org/officeDocument/2006/relationships" xmlns:p="http://schemas.openxmlformats.org/presentationml/2006/main">
-  <p:tag name="DVSECTIONID" val="nydmQoixGR6I9WlNrWXBYT"/>
+  <p:tag name="DVSHAPEID" val="k7xsAX7rc4ZzAaGrIpLHCd"/>
 </p:tagLst>
 </file>
 
@@ -8231,61 +8437,61 @@
 
 <file path=ppt/tags/tag50.xml><?xml version="1.0" encoding="utf-8"?>
 <p:tagLst xmlns:a="http://schemas.openxmlformats.org/drawingml/2006/main" xmlns:r="http://schemas.openxmlformats.org/officeDocument/2006/relationships" xmlns:p="http://schemas.openxmlformats.org/presentationml/2006/main">
-  <p:tag name="DVSHAPEID" val="DEJAHQ1kU7eqBnpA9d9jfO"/>
-</p:tagLst>
-</file>
-
-<file path=ppt/tags/tag51.xml><?xml version="1.0" encoding="utf-8"?>
-<p:tagLst xmlns:a="http://schemas.openxmlformats.org/drawingml/2006/main" xmlns:r="http://schemas.openxmlformats.org/officeDocument/2006/relationships" xmlns:p="http://schemas.openxmlformats.org/presentationml/2006/main">
-  <p:tag name="DVSHAPEID" val="cQha6J8QTVIT0z1Ra4rplS"/>
-</p:tagLst>
-</file>
-
-<file path=ppt/tags/tag52.xml><?xml version="1.0" encoding="utf-8"?>
-<p:tagLst xmlns:a="http://schemas.openxmlformats.org/drawingml/2006/main" xmlns:r="http://schemas.openxmlformats.org/officeDocument/2006/relationships" xmlns:p="http://schemas.openxmlformats.org/presentationml/2006/main">
-  <p:tag name="DVSECTIONID" val="nYQslB3BcKjWuJTSs7xX9O"/>
-</p:tagLst>
-</file>
-
-<file path=ppt/tags/tag53.xml><?xml version="1.0" encoding="utf-8"?>
-<p:tagLst xmlns:a="http://schemas.openxmlformats.org/drawingml/2006/main" xmlns:r="http://schemas.openxmlformats.org/officeDocument/2006/relationships" xmlns:p="http://schemas.openxmlformats.org/presentationml/2006/main">
-  <p:tag name="DVSHAPEID" val="usdizoYKCzLOrTixKhc4di"/>
-</p:tagLst>
-</file>
-
-<file path=ppt/tags/tag54.xml><?xml version="1.0" encoding="utf-8"?>
-<p:tagLst xmlns:a="http://schemas.openxmlformats.org/drawingml/2006/main" xmlns:r="http://schemas.openxmlformats.org/officeDocument/2006/relationships" xmlns:p="http://schemas.openxmlformats.org/presentationml/2006/main">
-  <p:tag name="DVSHAPEID" val="IImPzh25RPtklPWN9KR9j8"/>
-</p:tagLst>
-</file>
-
-<file path=ppt/tags/tag55.xml><?xml version="1.0" encoding="utf-8"?>
-<p:tagLst xmlns:a="http://schemas.openxmlformats.org/drawingml/2006/main" xmlns:r="http://schemas.openxmlformats.org/officeDocument/2006/relationships" xmlns:p="http://schemas.openxmlformats.org/presentationml/2006/main">
-  <p:tag name="DVSHAPEID" val="7c87zDjacgEcJvWKOGHxIV"/>
-</p:tagLst>
-</file>
-
-<file path=ppt/tags/tag56.xml><?xml version="1.0" encoding="utf-8"?>
-<p:tagLst xmlns:a="http://schemas.openxmlformats.org/drawingml/2006/main" xmlns:r="http://schemas.openxmlformats.org/officeDocument/2006/relationships" xmlns:p="http://schemas.openxmlformats.org/presentationml/2006/main">
-  <p:tag name="DVSHAPEID" val="k7xsAX7rc4ZzAaGrIpLHCd"/>
-</p:tagLst>
-</file>
-
-<file path=ppt/tags/tag57.xml><?xml version="1.0" encoding="utf-8"?>
-<p:tagLst xmlns:a="http://schemas.openxmlformats.org/drawingml/2006/main" xmlns:r="http://schemas.openxmlformats.org/officeDocument/2006/relationships" xmlns:p="http://schemas.openxmlformats.org/presentationml/2006/main">
   <p:tag name="DVSHAPEID" val="F95rRpVbrLpbR1A62m2L3z"/>
 </p:tagLst>
 </file>
 
-<file path=ppt/tags/tag58.xml><?xml version="1.0" encoding="utf-8"?>
+<file path=ppt/tags/tag51.xml><?xml version="1.0" encoding="utf-8"?>
 <p:tagLst xmlns:a="http://schemas.openxmlformats.org/drawingml/2006/main" xmlns:r="http://schemas.openxmlformats.org/officeDocument/2006/relationships" xmlns:p="http://schemas.openxmlformats.org/presentationml/2006/main">
   <p:tag name="DVSHAPEID" val="caUL3nYiM1i7ron85Hv1Dd"/>
 </p:tagLst>
 </file>
 
+<file path=ppt/tags/tag52.xml><?xml version="1.0" encoding="utf-8"?>
+<p:tagLst xmlns:a="http://schemas.openxmlformats.org/drawingml/2006/main" xmlns:r="http://schemas.openxmlformats.org/officeDocument/2006/relationships" xmlns:p="http://schemas.openxmlformats.org/presentationml/2006/main">
+  <p:tag name="DVSHAPEID" val="9ojFRCnoER95XVx6myc9Zo"/>
+</p:tagLst>
+</file>
+
+<file path=ppt/tags/tag53.xml><?xml version="1.0" encoding="utf-8"?>
+<p:tagLst xmlns:a="http://schemas.openxmlformats.org/drawingml/2006/main" xmlns:r="http://schemas.openxmlformats.org/officeDocument/2006/relationships" xmlns:p="http://schemas.openxmlformats.org/presentationml/2006/main">
+  <p:tag name="DVSECTIONID" val="v6L8nrStgGOtbevo2Gu4Em"/>
+</p:tagLst>
+</file>
+
+<file path=ppt/tags/tag54.xml><?xml version="1.0" encoding="utf-8"?>
+<p:tagLst xmlns:a="http://schemas.openxmlformats.org/drawingml/2006/main" xmlns:r="http://schemas.openxmlformats.org/officeDocument/2006/relationships" xmlns:p="http://schemas.openxmlformats.org/presentationml/2006/main">
+  <p:tag name="DVSHAPEID" val="TKAcJThkf1WY0vrovmVomq"/>
+</p:tagLst>
+</file>
+
+<file path=ppt/tags/tag55.xml><?xml version="1.0" encoding="utf-8"?>
+<p:tagLst xmlns:a="http://schemas.openxmlformats.org/drawingml/2006/main" xmlns:r="http://schemas.openxmlformats.org/officeDocument/2006/relationships" xmlns:p="http://schemas.openxmlformats.org/presentationml/2006/main">
+  <p:tag name="DVSHAPEID" val="XlqrBZlXOteLvz4ESt6kC8"/>
+</p:tagLst>
+</file>
+
+<file path=ppt/tags/tag56.xml><?xml version="1.0" encoding="utf-8"?>
+<p:tagLst xmlns:a="http://schemas.openxmlformats.org/drawingml/2006/main" xmlns:r="http://schemas.openxmlformats.org/officeDocument/2006/relationships" xmlns:p="http://schemas.openxmlformats.org/presentationml/2006/main">
+  <p:tag name="DVSECTIONID" val="7UaRiSLiyb2sOPuBo5huce"/>
+</p:tagLst>
+</file>
+
+<file path=ppt/tags/tag57.xml><?xml version="1.0" encoding="utf-8"?>
+<p:tagLst xmlns:a="http://schemas.openxmlformats.org/drawingml/2006/main" xmlns:r="http://schemas.openxmlformats.org/officeDocument/2006/relationships" xmlns:p="http://schemas.openxmlformats.org/presentationml/2006/main">
+  <p:tag name="DVSHAPEID" val="TKAcJThkf1WY0vrovmVomq"/>
+</p:tagLst>
+</file>
+
+<file path=ppt/tags/tag58.xml><?xml version="1.0" encoding="utf-8"?>
+<p:tagLst xmlns:a="http://schemas.openxmlformats.org/drawingml/2006/main" xmlns:r="http://schemas.openxmlformats.org/officeDocument/2006/relationships" xmlns:p="http://schemas.openxmlformats.org/presentationml/2006/main">
+  <p:tag name="DVSHAPEID" val="XlqrBZlXOteLvz4ESt6kC8"/>
+</p:tagLst>
+</file>
+
 <file path=ppt/tags/tag59.xml><?xml version="1.0" encoding="utf-8"?>
 <p:tagLst xmlns:a="http://schemas.openxmlformats.org/drawingml/2006/main" xmlns:r="http://schemas.openxmlformats.org/officeDocument/2006/relationships" xmlns:p="http://schemas.openxmlformats.org/presentationml/2006/main">
-  <p:tag name="DVSHAPEID" val="9ojFRCnoER95XVx6myc9Zo"/>
+  <p:tag name="DVSECTIONID" val="odsBUytQ30KztJGdeBJJtC"/>
 </p:tagLst>
 </file>
 
@@ -8297,61 +8503,61 @@
 
 <file path=ppt/tags/tag60.xml><?xml version="1.0" encoding="utf-8"?>
 <p:tagLst xmlns:a="http://schemas.openxmlformats.org/drawingml/2006/main" xmlns:r="http://schemas.openxmlformats.org/officeDocument/2006/relationships" xmlns:p="http://schemas.openxmlformats.org/presentationml/2006/main">
-  <p:tag name="DVSECTIONID" val="v6L8nrStgGOtbevo2Gu4Em"/>
-</p:tagLst>
-</file>
-
-<file path=ppt/tags/tag61.xml><?xml version="1.0" encoding="utf-8"?>
-<p:tagLst xmlns:a="http://schemas.openxmlformats.org/drawingml/2006/main" xmlns:r="http://schemas.openxmlformats.org/officeDocument/2006/relationships" xmlns:p="http://schemas.openxmlformats.org/presentationml/2006/main">
-  <p:tag name="DVSHAPEID" val="TKAcJThkf1WY0vrovmVomq"/>
-</p:tagLst>
-</file>
-
-<file path=ppt/tags/tag62.xml><?xml version="1.0" encoding="utf-8"?>
-<p:tagLst xmlns:a="http://schemas.openxmlformats.org/drawingml/2006/main" xmlns:r="http://schemas.openxmlformats.org/officeDocument/2006/relationships" xmlns:p="http://schemas.openxmlformats.org/presentationml/2006/main">
-  <p:tag name="DVSHAPEID" val="XlqrBZlXOteLvz4ESt6kC8"/>
-</p:tagLst>
-</file>
-
-<file path=ppt/tags/tag63.xml><?xml version="1.0" encoding="utf-8"?>
-<p:tagLst xmlns:a="http://schemas.openxmlformats.org/drawingml/2006/main" xmlns:r="http://schemas.openxmlformats.org/officeDocument/2006/relationships" xmlns:p="http://schemas.openxmlformats.org/presentationml/2006/main">
-  <p:tag name="DVSECTIONID" val="odsBUytQ30KztJGdeBJJtC"/>
-</p:tagLst>
-</file>
-
-<file path=ppt/tags/tag64.xml><?xml version="1.0" encoding="utf-8"?>
-<p:tagLst xmlns:a="http://schemas.openxmlformats.org/drawingml/2006/main" xmlns:r="http://schemas.openxmlformats.org/officeDocument/2006/relationships" xmlns:p="http://schemas.openxmlformats.org/presentationml/2006/main">
   <p:tag name="DVSHAPEID" val="8YU1EY2QeA1sMeLhihZics"/>
 </p:tagLst>
 </file>
 
-<file path=ppt/tags/tag65.xml><?xml version="1.0" encoding="utf-8"?>
+<file path=ppt/tags/tag61.xml><?xml version="1.0" encoding="utf-8"?>
 <p:tagLst xmlns:a="http://schemas.openxmlformats.org/drawingml/2006/main" xmlns:r="http://schemas.openxmlformats.org/officeDocument/2006/relationships" xmlns:p="http://schemas.openxmlformats.org/presentationml/2006/main">
   <p:tag name="DVSHAPEID" val="Jf0SjRtrh2OPcswzlmUYfE"/>
 </p:tagLst>
 </file>
 
-<file path=ppt/tags/tag66.xml><?xml version="1.0" encoding="utf-8"?>
+<file path=ppt/tags/tag62.xml><?xml version="1.0" encoding="utf-8"?>
 <p:tagLst xmlns:a="http://schemas.openxmlformats.org/drawingml/2006/main" xmlns:r="http://schemas.openxmlformats.org/officeDocument/2006/relationships" xmlns:p="http://schemas.openxmlformats.org/presentationml/2006/main">
   <p:tag name="DVSECTIONID" val="80yEm34Qt599IyGLxjZqCN"/>
 </p:tagLst>
 </file>
 
-<file path=ppt/tags/tag67.xml><?xml version="1.0" encoding="utf-8"?>
+<file path=ppt/tags/tag63.xml><?xml version="1.0" encoding="utf-8"?>
 <p:tagLst xmlns:a="http://schemas.openxmlformats.org/drawingml/2006/main" xmlns:r="http://schemas.openxmlformats.org/officeDocument/2006/relationships" xmlns:p="http://schemas.openxmlformats.org/presentationml/2006/main">
   <p:tag name="DVSHAPEID" val="J3MQTAbPkkVGeF1LFbnMjY"/>
 </p:tagLst>
 </file>
 
-<file path=ppt/tags/tag68.xml><?xml version="1.0" encoding="utf-8"?>
+<file path=ppt/tags/tag64.xml><?xml version="1.0" encoding="utf-8"?>
 <p:tagLst xmlns:a="http://schemas.openxmlformats.org/drawingml/2006/main" xmlns:r="http://schemas.openxmlformats.org/officeDocument/2006/relationships" xmlns:p="http://schemas.openxmlformats.org/presentationml/2006/main">
   <p:tag name="DVSHAPEID" val="DX1iLIWCned5vW5sXSgrIu"/>
 </p:tagLst>
 </file>
 
+<file path=ppt/tags/tag65.xml><?xml version="1.0" encoding="utf-8"?>
+<p:tagLst xmlns:a="http://schemas.openxmlformats.org/drawingml/2006/main" xmlns:r="http://schemas.openxmlformats.org/officeDocument/2006/relationships" xmlns:p="http://schemas.openxmlformats.org/presentationml/2006/main">
+  <p:tag name="DVSECTIONID" val="JCKMHPrTlVSL4r3fbpMdxE"/>
+</p:tagLst>
+</file>
+
+<file path=ppt/tags/tag66.xml><?xml version="1.0" encoding="utf-8"?>
+<p:tagLst xmlns:a="http://schemas.openxmlformats.org/drawingml/2006/main" xmlns:r="http://schemas.openxmlformats.org/officeDocument/2006/relationships" xmlns:p="http://schemas.openxmlformats.org/presentationml/2006/main">
+  <p:tag name="DVSHAPEID" val="TwdQyzHIAtkLpPPAPsSHWG"/>
+</p:tagLst>
+</file>
+
+<file path=ppt/tags/tag67.xml><?xml version="1.0" encoding="utf-8"?>
+<p:tagLst xmlns:a="http://schemas.openxmlformats.org/drawingml/2006/main" xmlns:r="http://schemas.openxmlformats.org/officeDocument/2006/relationships" xmlns:p="http://schemas.openxmlformats.org/presentationml/2006/main">
+  <p:tag name="DVSHAPEID" val="t9a4FcdvvRg93u5UamVFEJ"/>
+</p:tagLst>
+</file>
+
+<file path=ppt/tags/tag68.xml><?xml version="1.0" encoding="utf-8"?>
+<p:tagLst xmlns:a="http://schemas.openxmlformats.org/drawingml/2006/main" xmlns:r="http://schemas.openxmlformats.org/officeDocument/2006/relationships" xmlns:p="http://schemas.openxmlformats.org/presentationml/2006/main">
+  <p:tag name="DVSECTIONID" val="pk18xt4pJ3ZkgVTAmepAKe"/>
+</p:tagLst>
+</file>
+
 <file path=ppt/tags/tag69.xml><?xml version="1.0" encoding="utf-8"?>
 <p:tagLst xmlns:a="http://schemas.openxmlformats.org/drawingml/2006/main" xmlns:r="http://schemas.openxmlformats.org/officeDocument/2006/relationships" xmlns:p="http://schemas.openxmlformats.org/presentationml/2006/main">
-  <p:tag name="DVSECTIONID" val="JCKMHPrTlVSL4r3fbpMdxE"/>
+  <p:tag name="DVSHAPEID" val="LKxgDn2Nz0yc34GtTvu5Xs"/>
 </p:tagLst>
 </file>
 
@@ -8363,53 +8569,29 @@
 
 <file path=ppt/tags/tag70.xml><?xml version="1.0" encoding="utf-8"?>
 <p:tagLst xmlns:a="http://schemas.openxmlformats.org/drawingml/2006/main" xmlns:r="http://schemas.openxmlformats.org/officeDocument/2006/relationships" xmlns:p="http://schemas.openxmlformats.org/presentationml/2006/main">
-  <p:tag name="DVSHAPEID" val="TwdQyzHIAtkLpPPAPsSHWG"/>
-</p:tagLst>
-</file>
-
-<file path=ppt/tags/tag71.xml><?xml version="1.0" encoding="utf-8"?>
-<p:tagLst xmlns:a="http://schemas.openxmlformats.org/drawingml/2006/main" xmlns:r="http://schemas.openxmlformats.org/officeDocument/2006/relationships" xmlns:p="http://schemas.openxmlformats.org/presentationml/2006/main">
-  <p:tag name="DVSHAPEID" val="t9a4FcdvvRg93u5UamVFEJ"/>
-</p:tagLst>
-</file>
-
-<file path=ppt/tags/tag72.xml><?xml version="1.0" encoding="utf-8"?>
-<p:tagLst xmlns:a="http://schemas.openxmlformats.org/drawingml/2006/main" xmlns:r="http://schemas.openxmlformats.org/officeDocument/2006/relationships" xmlns:p="http://schemas.openxmlformats.org/presentationml/2006/main">
-  <p:tag name="DVSECTIONID" val="pk18xt4pJ3ZkgVTAmepAKe"/>
-</p:tagLst>
-</file>
-
-<file path=ppt/tags/tag73.xml><?xml version="1.0" encoding="utf-8"?>
-<p:tagLst xmlns:a="http://schemas.openxmlformats.org/drawingml/2006/main" xmlns:r="http://schemas.openxmlformats.org/officeDocument/2006/relationships" xmlns:p="http://schemas.openxmlformats.org/presentationml/2006/main">
-  <p:tag name="DVSHAPEID" val="LKxgDn2Nz0yc34GtTvu5Xs"/>
-</p:tagLst>
-</file>
-
-<file path=ppt/tags/tag74.xml><?xml version="1.0" encoding="utf-8"?>
-<p:tagLst xmlns:a="http://schemas.openxmlformats.org/drawingml/2006/main" xmlns:r="http://schemas.openxmlformats.org/officeDocument/2006/relationships" xmlns:p="http://schemas.openxmlformats.org/presentationml/2006/main">
   <p:tag name="DVSHAPEID" val="ugLkuViwMg2JnqxpzQsIif"/>
 </p:tagLst>
 </file>
 
-<file path=ppt/tags/tag75.xml><?xml version="1.0" encoding="utf-8"?>
+<file path=ppt/tags/tag71.xml><?xml version="1.0" encoding="utf-8"?>
 <p:tagLst xmlns:a="http://schemas.openxmlformats.org/drawingml/2006/main" xmlns:r="http://schemas.openxmlformats.org/officeDocument/2006/relationships" xmlns:p="http://schemas.openxmlformats.org/presentationml/2006/main">
   <p:tag name="DVSECTIONID" val="gWteIh8zDpg4cqLyiYOVbP"/>
 </p:tagLst>
 </file>
 
-<file path=ppt/tags/tag76.xml><?xml version="1.0" encoding="utf-8"?>
+<file path=ppt/tags/tag72.xml><?xml version="1.0" encoding="utf-8"?>
 <p:tagLst xmlns:a="http://schemas.openxmlformats.org/drawingml/2006/main" xmlns:r="http://schemas.openxmlformats.org/officeDocument/2006/relationships" xmlns:p="http://schemas.openxmlformats.org/presentationml/2006/main">
   <p:tag name="DVSHAPEID" val="AQr1dGsqayMifhuiS6v3eh"/>
 </p:tagLst>
 </file>
 
-<file path=ppt/tags/tag77.xml><?xml version="1.0" encoding="utf-8"?>
+<file path=ppt/tags/tag73.xml><?xml version="1.0" encoding="utf-8"?>
 <p:tagLst xmlns:a="http://schemas.openxmlformats.org/drawingml/2006/main" xmlns:r="http://schemas.openxmlformats.org/officeDocument/2006/relationships" xmlns:p="http://schemas.openxmlformats.org/presentationml/2006/main">
   <p:tag name="DVSHAPEID" val="akGfWuVECfafFVTtIC3l6u"/>
 </p:tagLst>
 </file>
 
-<file path=ppt/tags/tag78.xml><?xml version="1.0" encoding="utf-8"?>
+<file path=ppt/tags/tag74.xml><?xml version="1.0" encoding="utf-8"?>
 <p:tagLst xmlns:a="http://schemas.openxmlformats.org/drawingml/2006/main" xmlns:r="http://schemas.openxmlformats.org/officeDocument/2006/relationships" xmlns:p="http://schemas.openxmlformats.org/presentationml/2006/main">
   <p:tag name="DVSHAPEID" val="W5bgVhXmdf0jG6kYKYuvVx"/>
 </p:tagLst>

</xml_diff>

<commit_message>
Controllers on a diet
</commit_message>
<xml_diff>
--- a/BuildingExternalDSLs/Building External DSLs.pptx
+++ b/BuildingExternalDSLs/Building External DSLs.pptx
@@ -2,7 +2,7 @@
 <file path=ppt/presentation.xml><?xml version="1.0" encoding="utf-8"?>
 <p:presentation xmlns:a="http://schemas.openxmlformats.org/drawingml/2006/main" xmlns:r="http://schemas.openxmlformats.org/officeDocument/2006/relationships" xmlns:p="http://schemas.openxmlformats.org/presentationml/2006/main" saveSubsetFonts="1">
   <p:sldMasterIdLst>
-    <p:sldMasterId id="2147483648" r:id="rId1"/>
+    <p:sldMasterId id="2147483654" r:id="rId1"/>
   </p:sldMasterIdLst>
   <p:notesMasterIdLst>
     <p:notesMasterId r:id="rId16"/>
@@ -11,7 +11,7 @@
     <p:handoutMasterId r:id="rId17"/>
   </p:handoutMasterIdLst>
   <p:sldIdLst>
-    <p:sldId id="256" r:id="rId2"/>
+    <p:sldId id="278" r:id="rId2"/>
     <p:sldId id="260" r:id="rId3"/>
     <p:sldId id="261" r:id="rId4"/>
     <p:sldId id="264" r:id="rId5"/>
@@ -1238,8 +1238,8 @@
       </dsp:nvSpPr>
       <dsp:spPr>
         <a:xfrm>
-          <a:off x="4343400" y="1936751"/>
-          <a:ext cx="2341629" cy="812796"/>
+          <a:off x="4114800" y="2047589"/>
+          <a:ext cx="2251813" cy="781621"/>
         </a:xfrm>
         <a:custGeom>
           <a:avLst/>
@@ -1253,13 +1253,13 @@
                 <a:pt x="0" y="0"/>
               </a:moveTo>
               <a:lnTo>
-                <a:pt x="0" y="406398"/>
+                <a:pt x="0" y="390810"/>
               </a:lnTo>
               <a:lnTo>
-                <a:pt x="2341629" y="406398"/>
+                <a:pt x="2251813" y="390810"/>
               </a:lnTo>
               <a:lnTo>
-                <a:pt x="2341629" y="812796"/>
+                <a:pt x="2251813" y="781621"/>
               </a:lnTo>
             </a:path>
           </a:pathLst>
@@ -1299,8 +1299,8 @@
       </dsp:nvSpPr>
       <dsp:spPr>
         <a:xfrm>
-          <a:off x="2001770" y="1936751"/>
-          <a:ext cx="2341629" cy="812796"/>
+          <a:off x="1862986" y="2047589"/>
+          <a:ext cx="2251813" cy="781621"/>
         </a:xfrm>
         <a:custGeom>
           <a:avLst/>
@@ -1311,16 +1311,16 @@
           <a:pathLst>
             <a:path>
               <a:moveTo>
-                <a:pt x="2341629" y="0"/>
+                <a:pt x="2251813" y="0"/>
               </a:moveTo>
               <a:lnTo>
-                <a:pt x="2341629" y="406398"/>
+                <a:pt x="2251813" y="390810"/>
               </a:lnTo>
               <a:lnTo>
-                <a:pt x="0" y="406398"/>
+                <a:pt x="0" y="390810"/>
               </a:lnTo>
               <a:lnTo>
-                <a:pt x="0" y="812796"/>
+                <a:pt x="0" y="781621"/>
               </a:lnTo>
             </a:path>
           </a:pathLst>
@@ -1360,8 +1360,8 @@
       </dsp:nvSpPr>
       <dsp:spPr>
         <a:xfrm>
-          <a:off x="2408169" y="1520"/>
-          <a:ext cx="3870461" cy="1935230"/>
+          <a:off x="2253797" y="186586"/>
+          <a:ext cx="3722005" cy="1861002"/>
         </a:xfrm>
         <a:prstGeom prst="rect">
           <a:avLst/>
@@ -1402,12 +1402,12 @@
         </a:fontRef>
       </dsp:style>
       <dsp:txBody>
-        <a:bodyPr spcFirstLastPara="0" vert="horz" wrap="square" lIns="34290" tIns="34290" rIns="34290" bIns="34290" numCol="1" spcCol="1270" anchor="ctr" anchorCtr="0">
+        <a:bodyPr spcFirstLastPara="0" vert="horz" wrap="square" lIns="32385" tIns="32385" rIns="32385" bIns="32385" numCol="1" spcCol="1270" anchor="ctr" anchorCtr="0">
           <a:noAutofit/>
         </a:bodyPr>
         <a:lstStyle/>
         <a:p>
-          <a:pPr lvl="0" algn="ctr" defTabSz="2400300">
+          <a:pPr lvl="0" algn="ctr" defTabSz="2266950">
             <a:lnSpc>
               <a:spcPct val="90000"/>
             </a:lnSpc>
@@ -1419,15 +1419,15 @@
             </a:spcAft>
           </a:pPr>
           <a:r>
-            <a:rPr lang="en-US" sz="5400" kern="1200" dirty="0" err="1" smtClean="0"/>
+            <a:rPr lang="en-US" sz="5100" kern="1200" dirty="0" err="1" smtClean="0"/>
             <a:t>BinaryNode</a:t>
           </a:r>
-          <a:endParaRPr lang="en-US" sz="5400" kern="1200" dirty="0"/>
+          <a:endParaRPr lang="en-US" sz="5100" kern="1200" dirty="0"/>
         </a:p>
       </dsp:txBody>
       <dsp:txXfrm>
-        <a:off x="2408169" y="1520"/>
-        <a:ext cx="3870461" cy="1935230"/>
+        <a:off x="2253797" y="186586"/>
+        <a:ext cx="3722005" cy="1861002"/>
       </dsp:txXfrm>
     </dsp:sp>
     <dsp:sp modelId="{25E2F10F-F1F9-4C1E-8E41-FFF160BD8209}">
@@ -1437,8 +1437,8 @@
       </dsp:nvSpPr>
       <dsp:spPr>
         <a:xfrm>
-          <a:off x="66540" y="2749548"/>
-          <a:ext cx="3870461" cy="1935230"/>
+          <a:off x="1984" y="2829210"/>
+          <a:ext cx="3722005" cy="1861002"/>
         </a:xfrm>
         <a:prstGeom prst="rect">
           <a:avLst/>
@@ -1479,12 +1479,12 @@
         </a:fontRef>
       </dsp:style>
       <dsp:txBody>
-        <a:bodyPr spcFirstLastPara="0" vert="horz" wrap="square" lIns="34290" tIns="34290" rIns="34290" bIns="34290" numCol="1" spcCol="1270" anchor="ctr" anchorCtr="0">
+        <a:bodyPr spcFirstLastPara="0" vert="horz" wrap="square" lIns="32385" tIns="32385" rIns="32385" bIns="32385" numCol="1" spcCol="1270" anchor="ctr" anchorCtr="0">
           <a:noAutofit/>
         </a:bodyPr>
         <a:lstStyle/>
         <a:p>
-          <a:pPr lvl="0" algn="ctr" defTabSz="2400300">
+          <a:pPr lvl="0" algn="ctr" defTabSz="2266950">
             <a:lnSpc>
               <a:spcPct val="90000"/>
             </a:lnSpc>
@@ -1496,15 +1496,15 @@
             </a:spcAft>
           </a:pPr>
           <a:r>
-            <a:rPr lang="en-US" sz="5400" kern="1200" dirty="0" err="1" smtClean="0"/>
+            <a:rPr lang="en-US" sz="5100" kern="1200" dirty="0" err="1" smtClean="0"/>
             <a:t>NumberNode</a:t>
           </a:r>
-          <a:endParaRPr lang="en-US" sz="5400" kern="1200" dirty="0"/>
+          <a:endParaRPr lang="en-US" sz="5100" kern="1200" dirty="0"/>
         </a:p>
       </dsp:txBody>
       <dsp:txXfrm>
-        <a:off x="66540" y="2749548"/>
-        <a:ext cx="3870461" cy="1935230"/>
+        <a:off x="1984" y="2829210"/>
+        <a:ext cx="3722005" cy="1861002"/>
       </dsp:txXfrm>
     </dsp:sp>
     <dsp:sp modelId="{3E622877-F3AE-498F-83A1-9C9FC68AB442}">
@@ -1514,8 +1514,8 @@
       </dsp:nvSpPr>
       <dsp:spPr>
         <a:xfrm>
-          <a:off x="4749798" y="2749548"/>
-          <a:ext cx="3870461" cy="1935230"/>
+          <a:off x="4505610" y="2829210"/>
+          <a:ext cx="3722005" cy="1861002"/>
         </a:xfrm>
         <a:prstGeom prst="rect">
           <a:avLst/>
@@ -1556,12 +1556,12 @@
         </a:fontRef>
       </dsp:style>
       <dsp:txBody>
-        <a:bodyPr spcFirstLastPara="0" vert="horz" wrap="square" lIns="34290" tIns="34290" rIns="34290" bIns="34290" numCol="1" spcCol="1270" anchor="ctr" anchorCtr="0">
+        <a:bodyPr spcFirstLastPara="0" vert="horz" wrap="square" lIns="32385" tIns="32385" rIns="32385" bIns="32385" numCol="1" spcCol="1270" anchor="ctr" anchorCtr="0">
           <a:noAutofit/>
         </a:bodyPr>
         <a:lstStyle/>
         <a:p>
-          <a:pPr lvl="0" algn="ctr" defTabSz="2400300">
+          <a:pPr lvl="0" algn="ctr" defTabSz="2266950">
             <a:lnSpc>
               <a:spcPct val="90000"/>
             </a:lnSpc>
@@ -1573,15 +1573,15 @@
             </a:spcAft>
           </a:pPr>
           <a:r>
-            <a:rPr lang="en-US" sz="5400" kern="1200" dirty="0" err="1" smtClean="0"/>
+            <a:rPr lang="en-US" sz="5100" kern="1200" dirty="0" err="1" smtClean="0"/>
             <a:t>NumberNode</a:t>
           </a:r>
-          <a:endParaRPr lang="en-US" sz="5400" kern="1200" dirty="0"/>
+          <a:endParaRPr lang="en-US" sz="5100" kern="1200" dirty="0"/>
         </a:p>
       </dsp:txBody>
       <dsp:txXfrm>
-        <a:off x="4749798" y="2749548"/>
-        <a:ext cx="3870461" cy="1935230"/>
+        <a:off x="4505610" y="2829210"/>
+        <a:ext cx="3722005" cy="1861002"/>
       </dsp:txXfrm>
     </dsp:sp>
   </dsp:spTree>
@@ -3850,7 +3850,7 @@
           <a:p>
             <a:fld id="{07B9A7F0-4EAA-4868-A40D-08B60601842D}" type="datetimeFigureOut">
               <a:rPr lang="en-US" smtClean="0"/>
-              <a:t>6/5/2012</a:t>
+              <a:t>3/6/2013</a:t>
             </a:fld>
             <a:endParaRPr lang="en-US"/>
           </a:p>
@@ -4015,7 +4015,7 @@
           <a:p>
             <a:fld id="{0643DBBB-5741-4F25-B406-E7BFD0A29909}" type="datetimeFigureOut">
               <a:rPr lang="en-US" smtClean="0"/>
-              <a:t>6/5/2012</a:t>
+              <a:t>3/6/2013</a:t>
             </a:fld>
             <a:endParaRPr lang="en-US"/>
           </a:p>
@@ -4566,7 +4566,7 @@
       </p:grpSpPr>
       <p:sp>
         <p:nvSpPr>
-          <p:cNvPr id="13" name="Rectangle 12"/>
+          <p:cNvPr id="7" name="Rectangle 6"/>
           <p:cNvSpPr/>
           <p:nvPr userDrawn="1">
             <p:custDataLst>
@@ -4576,29 +4576,28 @@
         </p:nvSpPr>
         <p:spPr>
           <a:xfrm>
-            <a:off x="0" y="5715000"/>
-            <a:ext cx="9144000" cy="1143000"/>
+            <a:off x="0" y="0"/>
+            <a:ext cx="9144000" cy="3600450"/>
           </a:xfrm>
           <a:prstGeom prst="rect">
             <a:avLst/>
           </a:prstGeom>
           <a:solidFill>
-            <a:schemeClr val="tx1"/>
+            <a:srgbClr val="FFFFFF"/>
           </a:solidFill>
           <a:ln>
             <a:noFill/>
           </a:ln>
+          <a:effectLst/>
         </p:spPr>
         <p:style>
-          <a:lnRef idx="2">
-            <a:schemeClr val="accent1">
-              <a:shade val="50000"/>
-            </a:schemeClr>
+          <a:lnRef idx="1">
+            <a:schemeClr val="accent1"/>
           </a:lnRef>
-          <a:fillRef idx="1">
+          <a:fillRef idx="3">
             <a:schemeClr val="accent1"/>
           </a:fillRef>
-          <a:effectRef idx="0">
+          <a:effectRef idx="2">
             <a:schemeClr val="accent1"/>
           </a:effectRef>
           <a:fontRef idx="minor">
@@ -4610,113 +4609,11 @@
           <a:lstStyle/>
           <a:p>
             <a:pPr algn="ctr"/>
-            <a:endParaRPr lang="en-US"/>
-          </a:p>
-        </p:txBody>
-      </p:sp>
-      <p:sp>
-        <p:nvSpPr>
-          <p:cNvPr id="9" name="Rectangle 8"/>
-          <p:cNvSpPr/>
-          <p:nvPr userDrawn="1">
-            <p:custDataLst>
-              <p:tags r:id="rId2"/>
-            </p:custDataLst>
-          </p:nvPr>
-        </p:nvSpPr>
-        <p:spPr>
-          <a:xfrm>
-            <a:off x="228600" y="2057400"/>
-            <a:ext cx="8686800" cy="3886200"/>
-          </a:xfrm>
-          <a:prstGeom prst="rect">
-            <a:avLst/>
-          </a:prstGeom>
-          <a:solidFill>
-            <a:schemeClr val="bg1">
-              <a:alpha val="67000"/>
-            </a:schemeClr>
-          </a:solidFill>
-          <a:ln w="88900" cap="rnd">
-            <a:noFill/>
-          </a:ln>
-        </p:spPr>
-        <p:style>
-          <a:lnRef idx="2">
-            <a:schemeClr val="accent1">
-              <a:shade val="50000"/>
-            </a:schemeClr>
-          </a:lnRef>
-          <a:fillRef idx="1">
-            <a:schemeClr val="accent1"/>
-          </a:fillRef>
-          <a:effectRef idx="0">
-            <a:schemeClr val="accent1"/>
-          </a:effectRef>
-          <a:fontRef idx="minor">
-            <a:schemeClr val="lt1"/>
-          </a:fontRef>
-        </p:style>
-        <p:txBody>
-          <a:bodyPr rtlCol="0" anchor="ctr"/>
-          <a:lstStyle/>
-          <a:p>
-            <a:pPr algn="ctr"/>
             <a:endParaRPr lang="en-US">
-              <a:effectLst/>
+              <a:solidFill>
+                <a:srgbClr val="0079C1"/>
+              </a:solidFill>
             </a:endParaRPr>
-          </a:p>
-        </p:txBody>
-      </p:sp>
-      <p:sp>
-        <p:nvSpPr>
-          <p:cNvPr id="8" name="Rectangle 7"/>
-          <p:cNvSpPr/>
-          <p:nvPr userDrawn="1">
-            <p:custDataLst>
-              <p:tags r:id="rId3"/>
-            </p:custDataLst>
-          </p:nvPr>
-        </p:nvSpPr>
-        <p:spPr>
-          <a:xfrm>
-            <a:off x="0" y="342900"/>
-            <a:ext cx="9144000" cy="1397938"/>
-          </a:xfrm>
-          <a:prstGeom prst="rect">
-            <a:avLst/>
-          </a:prstGeom>
-          <a:solidFill>
-            <a:schemeClr val="tx1">
-              <a:alpha val="75000"/>
-            </a:schemeClr>
-          </a:solidFill>
-          <a:ln>
-            <a:noFill/>
-          </a:ln>
-        </p:spPr>
-        <p:style>
-          <a:lnRef idx="2">
-            <a:schemeClr val="accent1">
-              <a:shade val="50000"/>
-            </a:schemeClr>
-          </a:lnRef>
-          <a:fillRef idx="1">
-            <a:schemeClr val="accent1"/>
-          </a:fillRef>
-          <a:effectRef idx="0">
-            <a:schemeClr val="accent1"/>
-          </a:effectRef>
-          <a:fontRef idx="minor">
-            <a:schemeClr val="lt1"/>
-          </a:fontRef>
-        </p:style>
-        <p:txBody>
-          <a:bodyPr rtlCol="0" anchor="ctr"/>
-          <a:lstStyle/>
-          <a:p>
-            <a:pPr algn="ctr"/>
-            <a:endParaRPr lang="en-US"/>
           </a:p>
         </p:txBody>
       </p:sp>
@@ -4729,29 +4626,24 @@
           <p:nvPr>
             <p:ph type="ctrTitle"/>
             <p:custDataLst>
-              <p:tags r:id="rId4"/>
+              <p:tags r:id="rId2"/>
             </p:custDataLst>
           </p:nvPr>
         </p:nvSpPr>
         <p:spPr>
           <a:xfrm>
-            <a:off x="457200" y="2286000"/>
-            <a:ext cx="8229600" cy="1943100"/>
+            <a:off x="0" y="2130425"/>
+            <a:ext cx="9144000" cy="1470025"/>
           </a:xfrm>
-          <a:solidFill>
-            <a:schemeClr val="bg1">
-              <a:alpha val="67000"/>
-            </a:schemeClr>
-          </a:solidFill>
-          <a:effectLst/>
+          <a:noFill/>
         </p:spPr>
         <p:txBody>
           <a:bodyPr/>
           <a:lstStyle>
-            <a:lvl1pPr algn="ctr">
-              <a:defRPr b="1">
+            <a:lvl1pPr>
+              <a:defRPr>
                 <a:solidFill>
-                  <a:schemeClr val="tx1"/>
+                  <a:srgbClr val="177EC5"/>
                 </a:solidFill>
               </a:defRPr>
             </a:lvl1pPr>
@@ -4774,33 +4666,25 @@
           <p:nvPr>
             <p:ph type="subTitle" idx="1"/>
             <p:custDataLst>
-              <p:tags r:id="rId5"/>
+              <p:tags r:id="rId3"/>
             </p:custDataLst>
           </p:nvPr>
         </p:nvSpPr>
         <p:spPr>
           <a:xfrm>
-            <a:off x="457200" y="4457700"/>
-            <a:ext cx="8229600" cy="1257300"/>
+            <a:off x="1371600" y="3886200"/>
+            <a:ext cx="6400800" cy="1752600"/>
           </a:xfrm>
-          <a:solidFill>
-            <a:schemeClr val="bg1">
-              <a:alpha val="67000"/>
-            </a:schemeClr>
-          </a:solidFill>
         </p:spPr>
         <p:txBody>
-          <a:bodyPr wrap="square" anchor="ctr" anchorCtr="1">
-            <a:normAutofit/>
-          </a:bodyPr>
+          <a:bodyPr anchor="ctr"/>
           <a:lstStyle>
             <a:lvl1pPr marL="0" indent="0" algn="ctr">
               <a:buNone/>
-              <a:defRPr sz="2800" b="1" cap="all" baseline="0">
+              <a:defRPr>
                 <a:solidFill>
-                  <a:srgbClr val="0069AA"/>
+                  <a:srgbClr val="404040"/>
                 </a:solidFill>
-                <a:latin typeface="Arial Narrow" pitchFamily="34" charset="0"/>
               </a:defRPr>
             </a:lvl1pPr>
             <a:lvl2pPr marL="457200" indent="0" algn="ctr">
@@ -4889,24 +4773,24 @@
               <a:rPr lang="en-US" smtClean="0"/>
               <a:t>Click to edit Master subtitle style</a:t>
             </a:r>
-            <a:endParaRPr lang="en-US" dirty="0"/>
+            <a:endParaRPr lang="en-US"/>
           </a:p>
         </p:txBody>
       </p:sp>
       <p:pic>
         <p:nvPicPr>
-          <p:cNvPr id="7" name="Picture 6"/>
+          <p:cNvPr id="9" name="Picture 8" descr="Logo.png"/>
           <p:cNvPicPr>
             <a:picLocks noChangeAspect="1"/>
           </p:cNvPicPr>
           <p:nvPr userDrawn="1">
             <p:custDataLst>
-              <p:tags r:id="rId6"/>
+              <p:tags r:id="rId4"/>
             </p:custDataLst>
           </p:nvPr>
         </p:nvPicPr>
         <p:blipFill>
-          <a:blip r:embed="rId10" cstate="print">
+          <a:blip r:embed="rId6" cstate="print">
             <a:extLst>
               <a:ext uri="{28A0092B-C50C-407E-A947-70E740481C1C}">
                 <a14:useLocalDpi xmlns:a14="http://schemas.microsoft.com/office/drawing/2010/main" val="0"/>
@@ -4919,119 +4803,20 @@
         </p:blipFill>
         <p:spPr>
           <a:xfrm>
-            <a:off x="1554474" y="575829"/>
-            <a:ext cx="6035052" cy="932081"/>
+            <a:off x="1449263" y="230434"/>
+            <a:ext cx="6245475" cy="1441264"/>
           </a:xfrm>
           <a:prstGeom prst="rect">
             <a:avLst/>
           </a:prstGeom>
         </p:spPr>
       </p:pic>
-      <p:sp>
-        <p:nvSpPr>
-          <p:cNvPr id="17" name="Rectangle 16"/>
-          <p:cNvSpPr/>
-          <p:nvPr userDrawn="1">
-            <p:custDataLst>
-              <p:tags r:id="rId7"/>
-            </p:custDataLst>
-          </p:nvPr>
-        </p:nvSpPr>
-        <p:spPr>
-          <a:xfrm>
-            <a:off x="228600" y="6172200"/>
-            <a:ext cx="4229100" cy="457200"/>
-          </a:xfrm>
-          <a:prstGeom prst="rect">
-            <a:avLst/>
-          </a:prstGeom>
-          <a:noFill/>
-          <a:ln>
-            <a:noFill/>
-          </a:ln>
-        </p:spPr>
-        <p:style>
-          <a:lnRef idx="2">
-            <a:schemeClr val="accent1">
-              <a:shade val="50000"/>
-            </a:schemeClr>
-          </a:lnRef>
-          <a:fillRef idx="1">
-            <a:schemeClr val="accent1"/>
-          </a:fillRef>
-          <a:effectRef idx="0">
-            <a:schemeClr val="accent1"/>
-          </a:effectRef>
-          <a:fontRef idx="minor">
-            <a:schemeClr val="lt1"/>
-          </a:fontRef>
-        </p:style>
-        <p:txBody>
-          <a:bodyPr rtlCol="0" anchor="ctr"/>
-          <a:lstStyle/>
-          <a:p>
-            <a:pPr algn="ctr"/>
-            <a:r>
-              <a:rPr lang="en-US" b="0" dirty="0" smtClean="0"/>
-              <a:t>headspring.com</a:t>
-            </a:r>
-            <a:endParaRPr lang="en-US" b="0" dirty="0"/>
-          </a:p>
-        </p:txBody>
-      </p:sp>
-      <p:sp>
-        <p:nvSpPr>
-          <p:cNvPr id="18" name="Rectangle 17"/>
-          <p:cNvSpPr/>
-          <p:nvPr userDrawn="1">
-            <p:custDataLst>
-              <p:tags r:id="rId8"/>
-            </p:custDataLst>
-          </p:nvPr>
-        </p:nvSpPr>
-        <p:spPr>
-          <a:xfrm>
-            <a:off x="4686300" y="6172200"/>
-            <a:ext cx="4229100" cy="457200"/>
-          </a:xfrm>
-          <a:prstGeom prst="rect">
-            <a:avLst/>
-          </a:prstGeom>
-          <a:noFill/>
-          <a:ln>
-            <a:noFill/>
-          </a:ln>
-        </p:spPr>
-        <p:style>
-          <a:lnRef idx="2">
-            <a:schemeClr val="accent1">
-              <a:shade val="50000"/>
-            </a:schemeClr>
-          </a:lnRef>
-          <a:fillRef idx="1">
-            <a:schemeClr val="accent1"/>
-          </a:fillRef>
-          <a:effectRef idx="0">
-            <a:schemeClr val="accent1"/>
-          </a:effectRef>
-          <a:fontRef idx="minor">
-            <a:schemeClr val="lt1"/>
-          </a:fontRef>
-        </p:style>
-        <p:txBody>
-          <a:bodyPr rtlCol="0" anchor="ctr"/>
-          <a:lstStyle/>
-          <a:p>
-            <a:pPr algn="ctr"/>
-            <a:r>
-              <a:rPr lang="en-US" dirty="0" smtClean="0"/>
-              <a:t>@headspring</a:t>
-            </a:r>
-            <a:endParaRPr lang="en-US" dirty="0"/>
-          </a:p>
-        </p:txBody>
-      </p:sp>
     </p:spTree>
+    <p:extLst>
+      <p:ext uri="{BB962C8B-B14F-4D97-AF65-F5344CB8AC3E}">
+        <p14:creationId xmlns:p14="http://schemas.microsoft.com/office/powerpoint/2010/main" val="4198732739"/>
+      </p:ext>
+    </p:extLst>
   </p:cSld>
   <p:clrMapOvr>
     <a:masterClrMapping/>
@@ -5043,6 +4828,238 @@
       </p:par>
     </p:tnLst>
   </p:timing>
+</p:sldLayout>
+</file>
+
+<file path=ppt/slideLayouts/slideLayout10.xml><?xml version="1.0" encoding="utf-8"?>
+<p:sldLayout xmlns:a="http://schemas.openxmlformats.org/drawingml/2006/main" xmlns:r="http://schemas.openxmlformats.org/officeDocument/2006/relationships" xmlns:p="http://schemas.openxmlformats.org/presentationml/2006/main" type="vertTx" preserve="1">
+  <p:cSld name="Title and Vertical Text">
+    <p:spTree>
+      <p:nvGrpSpPr>
+        <p:cNvPr id="1" name=""/>
+        <p:cNvGrpSpPr/>
+        <p:nvPr/>
+      </p:nvGrpSpPr>
+      <p:grpSpPr>
+        <a:xfrm>
+          <a:off x="0" y="0"/>
+          <a:ext cx="0" cy="0"/>
+          <a:chOff x="0" y="0"/>
+          <a:chExt cx="0" cy="0"/>
+        </a:xfrm>
+      </p:grpSpPr>
+      <p:sp>
+        <p:nvSpPr>
+          <p:cNvPr id="2" name="Title 1"/>
+          <p:cNvSpPr>
+            <a:spLocks noGrp="1"/>
+          </p:cNvSpPr>
+          <p:nvPr>
+            <p:ph type="title"/>
+            <p:custDataLst>
+              <p:tags r:id="rId1"/>
+            </p:custDataLst>
+          </p:nvPr>
+        </p:nvSpPr>
+        <p:spPr/>
+        <p:txBody>
+          <a:bodyPr/>
+          <a:lstStyle/>
+          <a:p>
+            <a:r>
+              <a:rPr lang="en-US" smtClean="0"/>
+              <a:t>Click to edit Master title style</a:t>
+            </a:r>
+            <a:endParaRPr lang="en-US"/>
+          </a:p>
+        </p:txBody>
+      </p:sp>
+      <p:sp>
+        <p:nvSpPr>
+          <p:cNvPr id="3" name="Vertical Text Placeholder 2"/>
+          <p:cNvSpPr>
+            <a:spLocks noGrp="1"/>
+          </p:cNvSpPr>
+          <p:nvPr>
+            <p:ph type="body" orient="vert" idx="1"/>
+            <p:custDataLst>
+              <p:tags r:id="rId2"/>
+            </p:custDataLst>
+          </p:nvPr>
+        </p:nvSpPr>
+        <p:spPr/>
+        <p:txBody>
+          <a:bodyPr vert="eaVert"/>
+          <a:lstStyle/>
+          <a:p>
+            <a:pPr lvl="0"/>
+            <a:r>
+              <a:rPr lang="en-US" smtClean="0"/>
+              <a:t>Click to edit Master text styles</a:t>
+            </a:r>
+          </a:p>
+          <a:p>
+            <a:pPr lvl="1"/>
+            <a:r>
+              <a:rPr lang="en-US" smtClean="0"/>
+              <a:t>Second level</a:t>
+            </a:r>
+          </a:p>
+          <a:p>
+            <a:pPr lvl="2"/>
+            <a:r>
+              <a:rPr lang="en-US" smtClean="0"/>
+              <a:t>Third level</a:t>
+            </a:r>
+          </a:p>
+          <a:p>
+            <a:pPr lvl="3"/>
+            <a:r>
+              <a:rPr lang="en-US" smtClean="0"/>
+              <a:t>Fourth level</a:t>
+            </a:r>
+          </a:p>
+          <a:p>
+            <a:pPr lvl="4"/>
+            <a:r>
+              <a:rPr lang="en-US" smtClean="0"/>
+              <a:t>Fifth level</a:t>
+            </a:r>
+            <a:endParaRPr lang="en-US"/>
+          </a:p>
+        </p:txBody>
+      </p:sp>
+    </p:spTree>
+    <p:extLst>
+      <p:ext uri="{BB962C8B-B14F-4D97-AF65-F5344CB8AC3E}">
+        <p14:creationId xmlns:p14="http://schemas.microsoft.com/office/powerpoint/2010/main" val="3324869361"/>
+      </p:ext>
+    </p:extLst>
+  </p:cSld>
+  <p:clrMapOvr>
+    <a:masterClrMapping/>
+  </p:clrMapOvr>
+</p:sldLayout>
+</file>
+
+<file path=ppt/slideLayouts/slideLayout11.xml><?xml version="1.0" encoding="utf-8"?>
+<p:sldLayout xmlns:a="http://schemas.openxmlformats.org/drawingml/2006/main" xmlns:r="http://schemas.openxmlformats.org/officeDocument/2006/relationships" xmlns:p="http://schemas.openxmlformats.org/presentationml/2006/main" type="vertTitleAndTx" preserve="1">
+  <p:cSld name="Vertical Title and Text">
+    <p:spTree>
+      <p:nvGrpSpPr>
+        <p:cNvPr id="1" name=""/>
+        <p:cNvGrpSpPr/>
+        <p:nvPr/>
+      </p:nvGrpSpPr>
+      <p:grpSpPr>
+        <a:xfrm>
+          <a:off x="0" y="0"/>
+          <a:ext cx="0" cy="0"/>
+          <a:chOff x="0" y="0"/>
+          <a:chExt cx="0" cy="0"/>
+        </a:xfrm>
+      </p:grpSpPr>
+      <p:sp>
+        <p:nvSpPr>
+          <p:cNvPr id="2" name="Vertical Title 1"/>
+          <p:cNvSpPr>
+            <a:spLocks noGrp="1"/>
+          </p:cNvSpPr>
+          <p:nvPr>
+            <p:ph type="title" orient="vert"/>
+            <p:custDataLst>
+              <p:tags r:id="rId1"/>
+            </p:custDataLst>
+          </p:nvPr>
+        </p:nvSpPr>
+        <p:spPr>
+          <a:xfrm>
+            <a:off x="6629400" y="274638"/>
+            <a:ext cx="2057400" cy="5851525"/>
+          </a:xfrm>
+        </p:spPr>
+        <p:txBody>
+          <a:bodyPr vert="eaVert"/>
+          <a:lstStyle/>
+          <a:p>
+            <a:r>
+              <a:rPr lang="en-US" smtClean="0"/>
+              <a:t>Click to edit Master title style</a:t>
+            </a:r>
+            <a:endParaRPr lang="en-US"/>
+          </a:p>
+        </p:txBody>
+      </p:sp>
+      <p:sp>
+        <p:nvSpPr>
+          <p:cNvPr id="3" name="Vertical Text Placeholder 2"/>
+          <p:cNvSpPr>
+            <a:spLocks noGrp="1"/>
+          </p:cNvSpPr>
+          <p:nvPr>
+            <p:ph type="body" orient="vert" idx="1"/>
+            <p:custDataLst>
+              <p:tags r:id="rId2"/>
+            </p:custDataLst>
+          </p:nvPr>
+        </p:nvSpPr>
+        <p:spPr>
+          <a:xfrm>
+            <a:off x="457200" y="274638"/>
+            <a:ext cx="6019800" cy="5851525"/>
+          </a:xfrm>
+        </p:spPr>
+        <p:txBody>
+          <a:bodyPr vert="eaVert"/>
+          <a:lstStyle/>
+          <a:p>
+            <a:pPr lvl="0"/>
+            <a:r>
+              <a:rPr lang="en-US" smtClean="0"/>
+              <a:t>Click to edit Master text styles</a:t>
+            </a:r>
+          </a:p>
+          <a:p>
+            <a:pPr lvl="1"/>
+            <a:r>
+              <a:rPr lang="en-US" smtClean="0"/>
+              <a:t>Second level</a:t>
+            </a:r>
+          </a:p>
+          <a:p>
+            <a:pPr lvl="2"/>
+            <a:r>
+              <a:rPr lang="en-US" smtClean="0"/>
+              <a:t>Third level</a:t>
+            </a:r>
+          </a:p>
+          <a:p>
+            <a:pPr lvl="3"/>
+            <a:r>
+              <a:rPr lang="en-US" smtClean="0"/>
+              <a:t>Fourth level</a:t>
+            </a:r>
+          </a:p>
+          <a:p>
+            <a:pPr lvl="4"/>
+            <a:r>
+              <a:rPr lang="en-US" smtClean="0"/>
+              <a:t>Fifth level</a:t>
+            </a:r>
+            <a:endParaRPr lang="en-US"/>
+          </a:p>
+        </p:txBody>
+      </p:sp>
+    </p:spTree>
+    <p:extLst>
+      <p:ext uri="{BB962C8B-B14F-4D97-AF65-F5344CB8AC3E}">
+        <p14:creationId xmlns:p14="http://schemas.microsoft.com/office/powerpoint/2010/main" val="295060696"/>
+      </p:ext>
+    </p:extLst>
+  </p:cSld>
+  <p:clrMapOvr>
+    <a:masterClrMapping/>
+  </p:clrMapOvr>
 </p:sldLayout>
 </file>
 
@@ -5079,7 +5096,15 @@
         <p:spPr/>
         <p:txBody>
           <a:bodyPr/>
-          <a:lstStyle/>
+          <a:lstStyle>
+            <a:lvl1pPr>
+              <a:defRPr>
+                <a:solidFill>
+                  <a:srgbClr val="177EC5"/>
+                </a:solidFill>
+              </a:defRPr>
+            </a:lvl1pPr>
+          </a:lstStyle>
           <a:p>
             <a:r>
               <a:rPr lang="en-US" smtClean="0"/>
@@ -5104,12 +5129,12 @@
         </p:nvSpPr>
         <p:spPr>
           <a:xfrm>
-            <a:off x="228600" y="1485900"/>
-            <a:ext cx="8686800" cy="4686300"/>
+            <a:off x="457200" y="1600200"/>
+            <a:ext cx="8229600" cy="4876800"/>
           </a:xfrm>
         </p:spPr>
         <p:txBody>
-          <a:bodyPr lIns="118872" tIns="118872" rIns="118872" bIns="118872"/>
+          <a:bodyPr/>
           <a:lstStyle/>
           <a:p>
             <a:pPr lvl="0"/>
@@ -5150,21 +5175,172 @@
         </p:txBody>
       </p:sp>
     </p:spTree>
+    <p:extLst>
+      <p:ext uri="{BB962C8B-B14F-4D97-AF65-F5344CB8AC3E}">
+        <p14:creationId xmlns:p14="http://schemas.microsoft.com/office/powerpoint/2010/main" val="2130195970"/>
+      </p:ext>
+    </p:extLst>
   </p:cSld>
   <p:clrMapOvr>
     <a:masterClrMapping/>
   </p:clrMapOvr>
-  <p:timing>
-    <p:tnLst>
-      <p:par>
-        <p:cTn id="1" dur="indefinite" restart="never" nodeType="tmRoot"/>
-      </p:par>
-    </p:tnLst>
-  </p:timing>
 </p:sldLayout>
 </file>
 
 <file path=ppt/slideLayouts/slideLayout3.xml><?xml version="1.0" encoding="utf-8"?>
+<p:sldLayout xmlns:a="http://schemas.openxmlformats.org/drawingml/2006/main" xmlns:r="http://schemas.openxmlformats.org/officeDocument/2006/relationships" xmlns:p="http://schemas.openxmlformats.org/presentationml/2006/main" preserve="1" userDrawn="1">
+  <p:cSld name="Section Header">
+    <p:spTree>
+      <p:nvGrpSpPr>
+        <p:cNvPr id="1" name=""/>
+        <p:cNvGrpSpPr/>
+        <p:nvPr/>
+      </p:nvGrpSpPr>
+      <p:grpSpPr>
+        <a:xfrm>
+          <a:off x="0" y="0"/>
+          <a:ext cx="0" cy="0"/>
+          <a:chOff x="0" y="0"/>
+          <a:chExt cx="0" cy="0"/>
+        </a:xfrm>
+      </p:grpSpPr>
+      <p:sp>
+        <p:nvSpPr>
+          <p:cNvPr id="8" name="Rectangle 7"/>
+          <p:cNvSpPr/>
+          <p:nvPr userDrawn="1">
+            <p:custDataLst>
+              <p:tags r:id="rId1"/>
+            </p:custDataLst>
+          </p:nvPr>
+        </p:nvSpPr>
+        <p:spPr>
+          <a:xfrm flipV="1">
+            <a:off x="0" y="3431458"/>
+            <a:ext cx="9144000" cy="3426542"/>
+          </a:xfrm>
+          <a:prstGeom prst="rect">
+            <a:avLst/>
+          </a:prstGeom>
+          <a:solidFill>
+            <a:srgbClr val="FFFFFF"/>
+          </a:solidFill>
+          <a:ln>
+            <a:noFill/>
+          </a:ln>
+          <a:effectLst/>
+        </p:spPr>
+        <p:style>
+          <a:lnRef idx="1">
+            <a:schemeClr val="accent1"/>
+          </a:lnRef>
+          <a:fillRef idx="3">
+            <a:schemeClr val="accent1"/>
+          </a:fillRef>
+          <a:effectRef idx="2">
+            <a:schemeClr val="accent1"/>
+          </a:effectRef>
+          <a:fontRef idx="minor">
+            <a:schemeClr val="lt1"/>
+          </a:fontRef>
+        </p:style>
+        <p:txBody>
+          <a:bodyPr rtlCol="0" anchor="ctr"/>
+          <a:lstStyle/>
+          <a:p>
+            <a:pPr algn="ctr"/>
+            <a:endParaRPr lang="en-US">
+              <a:solidFill>
+                <a:srgbClr val="0079C1"/>
+              </a:solidFill>
+            </a:endParaRPr>
+          </a:p>
+        </p:txBody>
+      </p:sp>
+      <p:sp>
+        <p:nvSpPr>
+          <p:cNvPr id="2" name="Title 1"/>
+          <p:cNvSpPr>
+            <a:spLocks noGrp="1"/>
+          </p:cNvSpPr>
+          <p:nvPr>
+            <p:ph type="title"/>
+            <p:custDataLst>
+              <p:tags r:id="rId2"/>
+            </p:custDataLst>
+          </p:nvPr>
+        </p:nvSpPr>
+        <p:spPr>
+          <a:xfrm>
+            <a:off x="0" y="3431458"/>
+            <a:ext cx="9144000" cy="1362075"/>
+          </a:xfrm>
+          <a:noFill/>
+        </p:spPr>
+        <p:txBody>
+          <a:bodyPr anchor="ctr"/>
+          <a:lstStyle>
+            <a:lvl1pPr algn="ctr">
+              <a:defRPr sz="4000" b="0" strike="noStrike" cap="none" normalizeH="0" baseline="0"/>
+            </a:lvl1pPr>
+          </a:lstStyle>
+          <a:p>
+            <a:r>
+              <a:rPr lang="en-US" smtClean="0"/>
+              <a:t>Click to edit Master title style</a:t>
+            </a:r>
+            <a:endParaRPr lang="en-US" dirty="0"/>
+          </a:p>
+        </p:txBody>
+      </p:sp>
+      <p:pic>
+        <p:nvPicPr>
+          <p:cNvPr id="7" name="Picture 6" descr="Logo.png"/>
+          <p:cNvPicPr>
+            <a:picLocks noChangeAspect="1"/>
+          </p:cNvPicPr>
+          <p:nvPr userDrawn="1">
+            <p:custDataLst>
+              <p:tags r:id="rId3"/>
+            </p:custDataLst>
+          </p:nvPr>
+        </p:nvPicPr>
+        <p:blipFill>
+          <a:blip r:embed="rId5" cstate="print">
+            <a:extLst>
+              <a:ext uri="{28A0092B-C50C-407E-A947-70E740481C1C}">
+                <a14:useLocalDpi xmlns:a14="http://schemas.microsoft.com/office/drawing/2010/main" val="0"/>
+              </a:ext>
+            </a:extLst>
+          </a:blip>
+          <a:stretch>
+            <a:fillRect/>
+          </a:stretch>
+        </p:blipFill>
+        <p:spPr>
+          <a:xfrm>
+            <a:off x="2439128" y="5382085"/>
+            <a:ext cx="4265744" cy="984403"/>
+          </a:xfrm>
+          <a:prstGeom prst="rect">
+            <a:avLst/>
+          </a:prstGeom>
+        </p:spPr>
+      </p:pic>
+    </p:spTree>
+    <p:extLst>
+      <p:ext uri="{BB962C8B-B14F-4D97-AF65-F5344CB8AC3E}">
+        <p14:creationId xmlns:p14="http://schemas.microsoft.com/office/powerpoint/2010/main" val="1676916202"/>
+      </p:ext>
+    </p:extLst>
+  </p:cSld>
+  <p:clrMapOvr>
+    <a:masterClrMapping/>
+  </p:clrMapOvr>
+</p:sldLayout>
+</file>
+
+<file path=ppt/slideLayouts/slideLayout4.xml><?xml version="1.0" encoding="utf-8"?>
 <p:sldLayout xmlns:a="http://schemas.openxmlformats.org/drawingml/2006/main" xmlns:r="http://schemas.openxmlformats.org/officeDocument/2006/relationships" xmlns:p="http://schemas.openxmlformats.org/presentationml/2006/main" type="twoObj" preserve="1">
   <p:cSld name="Two Content">
     <p:spTree>
@@ -5222,12 +5398,12 @@
         </p:nvSpPr>
         <p:spPr>
           <a:xfrm>
-            <a:off x="228600" y="1485900"/>
-            <a:ext cx="4267200" cy="4686300"/>
+            <a:off x="457200" y="1600200"/>
+            <a:ext cx="4038600" cy="4868333"/>
           </a:xfrm>
         </p:spPr>
         <p:txBody>
-          <a:bodyPr lIns="118872" tIns="118872" rIns="118872" bIns="118872"/>
+          <a:bodyPr/>
           <a:lstStyle>
             <a:lvl1pPr>
               <a:defRPr sz="2800"/>
@@ -5310,12 +5486,12 @@
         </p:nvSpPr>
         <p:spPr>
           <a:xfrm>
-            <a:off x="4648200" y="1485900"/>
-            <a:ext cx="4267200" cy="4686300"/>
+            <a:off x="4648200" y="1600200"/>
+            <a:ext cx="4038600" cy="4868333"/>
           </a:xfrm>
         </p:spPr>
         <p:txBody>
-          <a:bodyPr lIns="118872" tIns="118872" rIns="118872" bIns="118872"/>
+          <a:bodyPr/>
           <a:lstStyle>
             <a:lvl1pPr>
               <a:defRPr sz="2800"/>
@@ -5384,21 +5560,19 @@
         </p:txBody>
       </p:sp>
     </p:spTree>
+    <p:extLst>
+      <p:ext uri="{BB962C8B-B14F-4D97-AF65-F5344CB8AC3E}">
+        <p14:creationId xmlns:p14="http://schemas.microsoft.com/office/powerpoint/2010/main" val="4034680450"/>
+      </p:ext>
+    </p:extLst>
   </p:cSld>
   <p:clrMapOvr>
     <a:masterClrMapping/>
   </p:clrMapOvr>
-  <p:timing>
-    <p:tnLst>
-      <p:par>
-        <p:cTn id="1" dur="indefinite" restart="never" nodeType="tmRoot"/>
-      </p:par>
-    </p:tnLst>
-  </p:timing>
 </p:sldLayout>
 </file>
 
-<file path=ppt/slideLayouts/slideLayout4.xml><?xml version="1.0" encoding="utf-8"?>
+<file path=ppt/slideLayouts/slideLayout5.xml><?xml version="1.0" encoding="utf-8"?>
 <p:sldLayout xmlns:a="http://schemas.openxmlformats.org/drawingml/2006/main" xmlns:r="http://schemas.openxmlformats.org/officeDocument/2006/relationships" xmlns:p="http://schemas.openxmlformats.org/presentationml/2006/main" type="twoTxTwoObj" preserve="1">
   <p:cSld name="Comparison">
     <p:spTree>
@@ -5460,21 +5634,16 @@
         </p:nvSpPr>
         <p:spPr>
           <a:xfrm>
-            <a:off x="228600" y="1485900"/>
-            <a:ext cx="4268788" cy="688975"/>
+            <a:off x="457200" y="1535113"/>
+            <a:ext cx="4040188" cy="639762"/>
           </a:xfrm>
         </p:spPr>
         <p:txBody>
-          <a:bodyPr lIns="118872" tIns="0" rIns="118872" bIns="0" anchor="b"/>
+          <a:bodyPr anchor="b"/>
           <a:lstStyle>
-            <a:lvl1pPr marL="0" indent="0" algn="l">
+            <a:lvl1pPr marL="0" indent="0">
               <a:buNone/>
-              <a:defRPr sz="2400" b="1" cap="all" baseline="0">
-                <a:solidFill>
-                  <a:srgbClr val="0069AA"/>
-                </a:solidFill>
-                <a:latin typeface="Arial Narrow" pitchFamily="34" charset="0"/>
-              </a:defRPr>
+              <a:defRPr sz="2400" b="1"/>
             </a:lvl1pPr>
             <a:lvl2pPr marL="457200" indent="0">
               <a:buNone/>
@@ -5533,12 +5702,12 @@
         </p:nvSpPr>
         <p:spPr>
           <a:xfrm>
-            <a:off x="228600" y="2174874"/>
-            <a:ext cx="4268788" cy="3997325"/>
+            <a:off x="457200" y="2174875"/>
+            <a:ext cx="4040188" cy="4319058"/>
           </a:xfrm>
         </p:spPr>
         <p:txBody>
-          <a:bodyPr lIns="118872" tIns="118872" rIns="118872" bIns="118872"/>
+          <a:bodyPr/>
           <a:lstStyle>
             <a:lvl1pPr>
               <a:defRPr sz="2400"/>
@@ -5602,7 +5771,7 @@
               <a:rPr lang="en-US" smtClean="0"/>
               <a:t>Fifth level</a:t>
             </a:r>
-            <a:endParaRPr lang="en-US" dirty="0"/>
+            <a:endParaRPr lang="en-US"/>
           </a:p>
         </p:txBody>
       </p:sp>
@@ -5621,32 +5790,52 @@
         </p:nvSpPr>
         <p:spPr>
           <a:xfrm>
-            <a:off x="4645025" y="1485900"/>
-            <a:ext cx="4270375" cy="688975"/>
+            <a:off x="4645025" y="1535113"/>
+            <a:ext cx="4041775" cy="639762"/>
           </a:xfrm>
-          <a:solidFill>
-            <a:schemeClr val="bg1">
-              <a:alpha val="85000"/>
-            </a:schemeClr>
-          </a:solidFill>
         </p:spPr>
         <p:txBody>
-          <a:bodyPr vert="horz" lIns="118872" tIns="0" rIns="118872" bIns="0" rtlCol="0" anchor="b">
-            <a:normAutofit/>
-          </a:bodyPr>
+          <a:bodyPr anchor="b"/>
           <a:lstStyle>
-            <a:lvl1pPr marL="342900" indent="-342900">
+            <a:lvl1pPr marL="0" indent="0">
               <a:buNone/>
-              <a:defRPr lang="en-US" sz="2400" b="1" cap="all" baseline="0" smtClean="0">
-                <a:solidFill>
-                  <a:srgbClr val="0069AA"/>
-                </a:solidFill>
-                <a:latin typeface="Arial Narrow" pitchFamily="34" charset="0"/>
-              </a:defRPr>
+              <a:defRPr sz="2400" b="1"/>
             </a:lvl1pPr>
+            <a:lvl2pPr marL="457200" indent="0">
+              <a:buNone/>
+              <a:defRPr sz="2000" b="1"/>
+            </a:lvl2pPr>
+            <a:lvl3pPr marL="914400" indent="0">
+              <a:buNone/>
+              <a:defRPr sz="1800" b="1"/>
+            </a:lvl3pPr>
+            <a:lvl4pPr marL="1371600" indent="0">
+              <a:buNone/>
+              <a:defRPr sz="1600" b="1"/>
+            </a:lvl4pPr>
+            <a:lvl5pPr marL="1828800" indent="0">
+              <a:buNone/>
+              <a:defRPr sz="1600" b="1"/>
+            </a:lvl5pPr>
+            <a:lvl6pPr marL="2286000" indent="0">
+              <a:buNone/>
+              <a:defRPr sz="1600" b="1"/>
+            </a:lvl6pPr>
+            <a:lvl7pPr marL="2743200" indent="0">
+              <a:buNone/>
+              <a:defRPr sz="1600" b="1"/>
+            </a:lvl7pPr>
+            <a:lvl8pPr marL="3200400" indent="0">
+              <a:buNone/>
+              <a:defRPr sz="1600" b="1"/>
+            </a:lvl8pPr>
+            <a:lvl9pPr marL="3657600" indent="0">
+              <a:buNone/>
+              <a:defRPr sz="1600" b="1"/>
+            </a:lvl9pPr>
           </a:lstStyle>
           <a:p>
-            <a:pPr marL="0" lvl="0" indent="0"/>
+            <a:pPr lvl="0"/>
             <a:r>
               <a:rPr lang="en-US" smtClean="0"/>
               <a:t>Click to edit Master text styles</a:t>
@@ -5669,12 +5858,12 @@
         </p:nvSpPr>
         <p:spPr>
           <a:xfrm>
-            <a:off x="4645025" y="2174874"/>
-            <a:ext cx="4270375" cy="3997325"/>
+            <a:off x="4645025" y="2174875"/>
+            <a:ext cx="4041775" cy="4319058"/>
           </a:xfrm>
         </p:spPr>
         <p:txBody>
-          <a:bodyPr lIns="118872" tIns="118872" rIns="118872" bIns="118872"/>
+          <a:bodyPr/>
           <a:lstStyle>
             <a:lvl1pPr>
               <a:defRPr sz="2400"/>
@@ -5743,34 +5932,534 @@
         </p:txBody>
       </p:sp>
     </p:spTree>
+    <p:extLst>
+      <p:ext uri="{BB962C8B-B14F-4D97-AF65-F5344CB8AC3E}">
+        <p14:creationId xmlns:p14="http://schemas.microsoft.com/office/powerpoint/2010/main" val="684261388"/>
+      </p:ext>
+    </p:extLst>
   </p:cSld>
   <p:clrMapOvr>
     <a:masterClrMapping/>
   </p:clrMapOvr>
-  <p:timing>
-    <p:tnLst>
-      <p:par>
-        <p:cTn id="1" dur="indefinite" restart="never" nodeType="tmRoot"/>
-      </p:par>
-    </p:tnLst>
-  </p:timing>
 </p:sldLayout>
 </file>
 
+<file path=ppt/slideLayouts/slideLayout6.xml><?xml version="1.0" encoding="utf-8"?>
+<p:sldLayout xmlns:a="http://schemas.openxmlformats.org/drawingml/2006/main" xmlns:r="http://schemas.openxmlformats.org/officeDocument/2006/relationships" xmlns:p="http://schemas.openxmlformats.org/presentationml/2006/main" type="titleOnly" preserve="1">
+  <p:cSld name="Title Only">
+    <p:spTree>
+      <p:nvGrpSpPr>
+        <p:cNvPr id="1" name=""/>
+        <p:cNvGrpSpPr/>
+        <p:nvPr/>
+      </p:nvGrpSpPr>
+      <p:grpSpPr>
+        <a:xfrm>
+          <a:off x="0" y="0"/>
+          <a:ext cx="0" cy="0"/>
+          <a:chOff x="0" y="0"/>
+          <a:chExt cx="0" cy="0"/>
+        </a:xfrm>
+      </p:grpSpPr>
+      <p:sp>
+        <p:nvSpPr>
+          <p:cNvPr id="2" name="Title 1"/>
+          <p:cNvSpPr>
+            <a:spLocks noGrp="1"/>
+          </p:cNvSpPr>
+          <p:nvPr>
+            <p:ph type="title"/>
+            <p:custDataLst>
+              <p:tags r:id="rId1"/>
+            </p:custDataLst>
+          </p:nvPr>
+        </p:nvSpPr>
+        <p:spPr/>
+        <p:txBody>
+          <a:bodyPr/>
+          <a:lstStyle/>
+          <a:p>
+            <a:r>
+              <a:rPr lang="en-US" smtClean="0"/>
+              <a:t>Click to edit Master title style</a:t>
+            </a:r>
+            <a:endParaRPr lang="en-US"/>
+          </a:p>
+        </p:txBody>
+      </p:sp>
+    </p:spTree>
+    <p:extLst>
+      <p:ext uri="{BB962C8B-B14F-4D97-AF65-F5344CB8AC3E}">
+        <p14:creationId xmlns:p14="http://schemas.microsoft.com/office/powerpoint/2010/main" val="3277829455"/>
+      </p:ext>
+    </p:extLst>
+  </p:cSld>
+  <p:clrMapOvr>
+    <a:masterClrMapping/>
+  </p:clrMapOvr>
+</p:sldLayout>
+</file>
+
+<file path=ppt/slideLayouts/slideLayout7.xml><?xml version="1.0" encoding="utf-8"?>
+<p:sldLayout xmlns:a="http://schemas.openxmlformats.org/drawingml/2006/main" xmlns:r="http://schemas.openxmlformats.org/officeDocument/2006/relationships" xmlns:p="http://schemas.openxmlformats.org/presentationml/2006/main" type="blank" preserve="1">
+  <p:cSld name="Blank">
+    <p:spTree>
+      <p:nvGrpSpPr>
+        <p:cNvPr id="1" name=""/>
+        <p:cNvGrpSpPr/>
+        <p:nvPr/>
+      </p:nvGrpSpPr>
+      <p:grpSpPr>
+        <a:xfrm>
+          <a:off x="0" y="0"/>
+          <a:ext cx="0" cy="0"/>
+          <a:chOff x="0" y="0"/>
+          <a:chExt cx="0" cy="0"/>
+        </a:xfrm>
+      </p:grpSpPr>
+    </p:spTree>
+    <p:extLst>
+      <p:ext uri="{BB962C8B-B14F-4D97-AF65-F5344CB8AC3E}">
+        <p14:creationId xmlns:p14="http://schemas.microsoft.com/office/powerpoint/2010/main" val="4249116457"/>
+      </p:ext>
+    </p:extLst>
+  </p:cSld>
+  <p:clrMapOvr>
+    <a:masterClrMapping/>
+  </p:clrMapOvr>
+</p:sldLayout>
+</file>
+
+<file path=ppt/slideLayouts/slideLayout8.xml><?xml version="1.0" encoding="utf-8"?>
+<p:sldLayout xmlns:a="http://schemas.openxmlformats.org/drawingml/2006/main" xmlns:r="http://schemas.openxmlformats.org/officeDocument/2006/relationships" xmlns:p="http://schemas.openxmlformats.org/presentationml/2006/main" type="objTx" preserve="1">
+  <p:cSld name="Content with Caption">
+    <p:spTree>
+      <p:nvGrpSpPr>
+        <p:cNvPr id="1" name=""/>
+        <p:cNvGrpSpPr/>
+        <p:nvPr/>
+      </p:nvGrpSpPr>
+      <p:grpSpPr>
+        <a:xfrm>
+          <a:off x="0" y="0"/>
+          <a:ext cx="0" cy="0"/>
+          <a:chOff x="0" y="0"/>
+          <a:chExt cx="0" cy="0"/>
+        </a:xfrm>
+      </p:grpSpPr>
+      <p:sp>
+        <p:nvSpPr>
+          <p:cNvPr id="2" name="Title 1"/>
+          <p:cNvSpPr>
+            <a:spLocks noGrp="1"/>
+          </p:cNvSpPr>
+          <p:nvPr>
+            <p:ph type="title"/>
+            <p:custDataLst>
+              <p:tags r:id="rId1"/>
+            </p:custDataLst>
+          </p:nvPr>
+        </p:nvSpPr>
+        <p:spPr>
+          <a:xfrm>
+            <a:off x="457200" y="273050"/>
+            <a:ext cx="3008313" cy="1162050"/>
+          </a:xfrm>
+        </p:spPr>
+        <p:txBody>
+          <a:bodyPr anchor="b"/>
+          <a:lstStyle>
+            <a:lvl1pPr algn="l">
+              <a:defRPr sz="2000" b="1"/>
+            </a:lvl1pPr>
+          </a:lstStyle>
+          <a:p>
+            <a:r>
+              <a:rPr lang="en-US" smtClean="0"/>
+              <a:t>Click to edit Master title style</a:t>
+            </a:r>
+            <a:endParaRPr lang="en-US"/>
+          </a:p>
+        </p:txBody>
+      </p:sp>
+      <p:sp>
+        <p:nvSpPr>
+          <p:cNvPr id="3" name="Content Placeholder 2"/>
+          <p:cNvSpPr>
+            <a:spLocks noGrp="1"/>
+          </p:cNvSpPr>
+          <p:nvPr>
+            <p:ph idx="1"/>
+            <p:custDataLst>
+              <p:tags r:id="rId2"/>
+            </p:custDataLst>
+          </p:nvPr>
+        </p:nvSpPr>
+        <p:spPr>
+          <a:xfrm>
+            <a:off x="3575050" y="273050"/>
+            <a:ext cx="5111750" cy="6220883"/>
+          </a:xfrm>
+        </p:spPr>
+        <p:txBody>
+          <a:bodyPr/>
+          <a:lstStyle>
+            <a:lvl1pPr>
+              <a:defRPr sz="3200"/>
+            </a:lvl1pPr>
+            <a:lvl2pPr>
+              <a:defRPr sz="2800"/>
+            </a:lvl2pPr>
+            <a:lvl3pPr>
+              <a:defRPr sz="2400"/>
+            </a:lvl3pPr>
+            <a:lvl4pPr>
+              <a:defRPr sz="2000"/>
+            </a:lvl4pPr>
+            <a:lvl5pPr>
+              <a:defRPr sz="2000"/>
+            </a:lvl5pPr>
+            <a:lvl6pPr>
+              <a:defRPr sz="2000"/>
+            </a:lvl6pPr>
+            <a:lvl7pPr>
+              <a:defRPr sz="2000"/>
+            </a:lvl7pPr>
+            <a:lvl8pPr>
+              <a:defRPr sz="2000"/>
+            </a:lvl8pPr>
+            <a:lvl9pPr>
+              <a:defRPr sz="2000"/>
+            </a:lvl9pPr>
+          </a:lstStyle>
+          <a:p>
+            <a:pPr lvl="0"/>
+            <a:r>
+              <a:rPr lang="en-US" smtClean="0"/>
+              <a:t>Click to edit Master text styles</a:t>
+            </a:r>
+          </a:p>
+          <a:p>
+            <a:pPr lvl="1"/>
+            <a:r>
+              <a:rPr lang="en-US" smtClean="0"/>
+              <a:t>Second level</a:t>
+            </a:r>
+          </a:p>
+          <a:p>
+            <a:pPr lvl="2"/>
+            <a:r>
+              <a:rPr lang="en-US" smtClean="0"/>
+              <a:t>Third level</a:t>
+            </a:r>
+          </a:p>
+          <a:p>
+            <a:pPr lvl="3"/>
+            <a:r>
+              <a:rPr lang="en-US" smtClean="0"/>
+              <a:t>Fourth level</a:t>
+            </a:r>
+          </a:p>
+          <a:p>
+            <a:pPr lvl="4"/>
+            <a:r>
+              <a:rPr lang="en-US" smtClean="0"/>
+              <a:t>Fifth level</a:t>
+            </a:r>
+            <a:endParaRPr lang="en-US"/>
+          </a:p>
+        </p:txBody>
+      </p:sp>
+      <p:sp>
+        <p:nvSpPr>
+          <p:cNvPr id="4" name="Text Placeholder 3"/>
+          <p:cNvSpPr>
+            <a:spLocks noGrp="1"/>
+          </p:cNvSpPr>
+          <p:nvPr>
+            <p:ph type="body" sz="half" idx="2"/>
+            <p:custDataLst>
+              <p:tags r:id="rId3"/>
+            </p:custDataLst>
+          </p:nvPr>
+        </p:nvSpPr>
+        <p:spPr>
+          <a:xfrm>
+            <a:off x="457200" y="1435100"/>
+            <a:ext cx="3008313" cy="5058833"/>
+          </a:xfrm>
+        </p:spPr>
+        <p:txBody>
+          <a:bodyPr/>
+          <a:lstStyle>
+            <a:lvl1pPr marL="0" indent="0">
+              <a:buNone/>
+              <a:defRPr sz="1400"/>
+            </a:lvl1pPr>
+            <a:lvl2pPr marL="457200" indent="0">
+              <a:buNone/>
+              <a:defRPr sz="1200"/>
+            </a:lvl2pPr>
+            <a:lvl3pPr marL="914400" indent="0">
+              <a:buNone/>
+              <a:defRPr sz="1000"/>
+            </a:lvl3pPr>
+            <a:lvl4pPr marL="1371600" indent="0">
+              <a:buNone/>
+              <a:defRPr sz="900"/>
+            </a:lvl4pPr>
+            <a:lvl5pPr marL="1828800" indent="0">
+              <a:buNone/>
+              <a:defRPr sz="900"/>
+            </a:lvl5pPr>
+            <a:lvl6pPr marL="2286000" indent="0">
+              <a:buNone/>
+              <a:defRPr sz="900"/>
+            </a:lvl6pPr>
+            <a:lvl7pPr marL="2743200" indent="0">
+              <a:buNone/>
+              <a:defRPr sz="900"/>
+            </a:lvl7pPr>
+            <a:lvl8pPr marL="3200400" indent="0">
+              <a:buNone/>
+              <a:defRPr sz="900"/>
+            </a:lvl8pPr>
+            <a:lvl9pPr marL="3657600" indent="0">
+              <a:buNone/>
+              <a:defRPr sz="900"/>
+            </a:lvl9pPr>
+          </a:lstStyle>
+          <a:p>
+            <a:pPr lvl="0"/>
+            <a:r>
+              <a:rPr lang="en-US" smtClean="0"/>
+              <a:t>Click to edit Master text styles</a:t>
+            </a:r>
+          </a:p>
+        </p:txBody>
+      </p:sp>
+    </p:spTree>
+    <p:extLst>
+      <p:ext uri="{BB962C8B-B14F-4D97-AF65-F5344CB8AC3E}">
+        <p14:creationId xmlns:p14="http://schemas.microsoft.com/office/powerpoint/2010/main" val="2760778411"/>
+      </p:ext>
+    </p:extLst>
+  </p:cSld>
+  <p:clrMapOvr>
+    <a:masterClrMapping/>
+  </p:clrMapOvr>
+</p:sldLayout>
+</file>
+
+<file path=ppt/slideLayouts/slideLayout9.xml><?xml version="1.0" encoding="utf-8"?>
+<p:sldLayout xmlns:a="http://schemas.openxmlformats.org/drawingml/2006/main" xmlns:r="http://schemas.openxmlformats.org/officeDocument/2006/relationships" xmlns:p="http://schemas.openxmlformats.org/presentationml/2006/main" type="picTx" preserve="1">
+  <p:cSld name="Picture with Caption">
+    <p:spTree>
+      <p:nvGrpSpPr>
+        <p:cNvPr id="1" name=""/>
+        <p:cNvGrpSpPr/>
+        <p:nvPr/>
+      </p:nvGrpSpPr>
+      <p:grpSpPr>
+        <a:xfrm>
+          <a:off x="0" y="0"/>
+          <a:ext cx="0" cy="0"/>
+          <a:chOff x="0" y="0"/>
+          <a:chExt cx="0" cy="0"/>
+        </a:xfrm>
+      </p:grpSpPr>
+      <p:sp>
+        <p:nvSpPr>
+          <p:cNvPr id="2" name="Title 1"/>
+          <p:cNvSpPr>
+            <a:spLocks noGrp="1"/>
+          </p:cNvSpPr>
+          <p:nvPr>
+            <p:ph type="title"/>
+            <p:custDataLst>
+              <p:tags r:id="rId1"/>
+            </p:custDataLst>
+          </p:nvPr>
+        </p:nvSpPr>
+        <p:spPr>
+          <a:xfrm>
+            <a:off x="1792288" y="4800600"/>
+            <a:ext cx="5486400" cy="566738"/>
+          </a:xfrm>
+        </p:spPr>
+        <p:txBody>
+          <a:bodyPr anchor="b"/>
+          <a:lstStyle>
+            <a:lvl1pPr algn="l">
+              <a:defRPr sz="2000" b="1"/>
+            </a:lvl1pPr>
+          </a:lstStyle>
+          <a:p>
+            <a:r>
+              <a:rPr lang="en-US" smtClean="0"/>
+              <a:t>Click to edit Master title style</a:t>
+            </a:r>
+            <a:endParaRPr lang="en-US"/>
+          </a:p>
+        </p:txBody>
+      </p:sp>
+      <p:sp>
+        <p:nvSpPr>
+          <p:cNvPr id="3" name="Picture Placeholder 2"/>
+          <p:cNvSpPr>
+            <a:spLocks noGrp="1"/>
+          </p:cNvSpPr>
+          <p:nvPr>
+            <p:ph type="pic" idx="1"/>
+            <p:custDataLst>
+              <p:tags r:id="rId2"/>
+            </p:custDataLst>
+          </p:nvPr>
+        </p:nvSpPr>
+        <p:spPr>
+          <a:xfrm>
+            <a:off x="1792288" y="612775"/>
+            <a:ext cx="5486400" cy="4114800"/>
+          </a:xfrm>
+        </p:spPr>
+        <p:txBody>
+          <a:bodyPr/>
+          <a:lstStyle>
+            <a:lvl1pPr marL="0" indent="0">
+              <a:buNone/>
+              <a:defRPr sz="3200"/>
+            </a:lvl1pPr>
+            <a:lvl2pPr marL="457200" indent="0">
+              <a:buNone/>
+              <a:defRPr sz="2800"/>
+            </a:lvl2pPr>
+            <a:lvl3pPr marL="914400" indent="0">
+              <a:buNone/>
+              <a:defRPr sz="2400"/>
+            </a:lvl3pPr>
+            <a:lvl4pPr marL="1371600" indent="0">
+              <a:buNone/>
+              <a:defRPr sz="2000"/>
+            </a:lvl4pPr>
+            <a:lvl5pPr marL="1828800" indent="0">
+              <a:buNone/>
+              <a:defRPr sz="2000"/>
+            </a:lvl5pPr>
+            <a:lvl6pPr marL="2286000" indent="0">
+              <a:buNone/>
+              <a:defRPr sz="2000"/>
+            </a:lvl6pPr>
+            <a:lvl7pPr marL="2743200" indent="0">
+              <a:buNone/>
+              <a:defRPr sz="2000"/>
+            </a:lvl7pPr>
+            <a:lvl8pPr marL="3200400" indent="0">
+              <a:buNone/>
+              <a:defRPr sz="2000"/>
+            </a:lvl8pPr>
+            <a:lvl9pPr marL="3657600" indent="0">
+              <a:buNone/>
+              <a:defRPr sz="2000"/>
+            </a:lvl9pPr>
+          </a:lstStyle>
+          <a:p>
+            <a:r>
+              <a:rPr lang="en-US" smtClean="0"/>
+              <a:t>Click icon to add picture</a:t>
+            </a:r>
+            <a:endParaRPr lang="en-US"/>
+          </a:p>
+        </p:txBody>
+      </p:sp>
+      <p:sp>
+        <p:nvSpPr>
+          <p:cNvPr id="4" name="Text Placeholder 3"/>
+          <p:cNvSpPr>
+            <a:spLocks noGrp="1"/>
+          </p:cNvSpPr>
+          <p:nvPr>
+            <p:ph type="body" sz="half" idx="2"/>
+            <p:custDataLst>
+              <p:tags r:id="rId3"/>
+            </p:custDataLst>
+          </p:nvPr>
+        </p:nvSpPr>
+        <p:spPr>
+          <a:xfrm>
+            <a:off x="1792288" y="5367338"/>
+            <a:ext cx="5486400" cy="804862"/>
+          </a:xfrm>
+        </p:spPr>
+        <p:txBody>
+          <a:bodyPr/>
+          <a:lstStyle>
+            <a:lvl1pPr marL="0" indent="0">
+              <a:buNone/>
+              <a:defRPr sz="1400"/>
+            </a:lvl1pPr>
+            <a:lvl2pPr marL="457200" indent="0">
+              <a:buNone/>
+              <a:defRPr sz="1200"/>
+            </a:lvl2pPr>
+            <a:lvl3pPr marL="914400" indent="0">
+              <a:buNone/>
+              <a:defRPr sz="1000"/>
+            </a:lvl3pPr>
+            <a:lvl4pPr marL="1371600" indent="0">
+              <a:buNone/>
+              <a:defRPr sz="900"/>
+            </a:lvl4pPr>
+            <a:lvl5pPr marL="1828800" indent="0">
+              <a:buNone/>
+              <a:defRPr sz="900"/>
+            </a:lvl5pPr>
+            <a:lvl6pPr marL="2286000" indent="0">
+              <a:buNone/>
+              <a:defRPr sz="900"/>
+            </a:lvl6pPr>
+            <a:lvl7pPr marL="2743200" indent="0">
+              <a:buNone/>
+              <a:defRPr sz="900"/>
+            </a:lvl7pPr>
+            <a:lvl8pPr marL="3200400" indent="0">
+              <a:buNone/>
+              <a:defRPr sz="900"/>
+            </a:lvl8pPr>
+            <a:lvl9pPr marL="3657600" indent="0">
+              <a:buNone/>
+              <a:defRPr sz="900"/>
+            </a:lvl9pPr>
+          </a:lstStyle>
+          <a:p>
+            <a:pPr lvl="0"/>
+            <a:r>
+              <a:rPr lang="en-US" smtClean="0"/>
+              <a:t>Click to edit Master text styles</a:t>
+            </a:r>
+          </a:p>
+        </p:txBody>
+      </p:sp>
+    </p:spTree>
+    <p:extLst>
+      <p:ext uri="{BB962C8B-B14F-4D97-AF65-F5344CB8AC3E}">
+        <p14:creationId xmlns:p14="http://schemas.microsoft.com/office/powerpoint/2010/main" val="3437134801"/>
+      </p:ext>
+    </p:extLst>
+  </p:cSld>
+  <p:clrMapOvr>
+    <a:masterClrMapping/>
+  </p:clrMapOvr>
+</p:sldLayout>
+</file>
+
 <file path=ppt/slideMasters/slideMaster1.xml><?xml version="1.0" encoding="utf-8"?>
-<p:sldMaster xmlns:a="http://schemas.openxmlformats.org/drawingml/2006/main" xmlns:r="http://schemas.openxmlformats.org/officeDocument/2006/relationships" xmlns:p="http://schemas.openxmlformats.org/presentationml/2006/main">
+<p:sldMaster xmlns:a="http://schemas.openxmlformats.org/drawingml/2006/main" xmlns:r="http://schemas.openxmlformats.org/officeDocument/2006/relationships" xmlns:p="http://schemas.openxmlformats.org/presentationml/2006/main" preserve="1">
   <p:cSld>
     <p:bg>
       <p:bgPr>
-        <a:blipFill dpi="0" rotWithShape="1">
-          <a:blip r:embed="rId9">
-            <a:lum/>
-          </a:blip>
-          <a:srcRect/>
-          <a:stretch>
-            <a:fillRect b="-34000"/>
-          </a:stretch>
-        </a:blipFill>
+        <a:solidFill>
+          <a:srgbClr val="F4F2F2"/>
+        </a:solidFill>
         <a:effectLst/>
       </p:bgPr>
     </p:bg>
@@ -5797,26 +6486,24 @@
           <p:nvPr>
             <p:ph type="title"/>
             <p:custDataLst>
-              <p:tags r:id="rId6"/>
+              <p:tags r:id="rId13"/>
             </p:custDataLst>
           </p:nvPr>
         </p:nvSpPr>
         <p:spPr>
           <a:xfrm>
-            <a:off x="0" y="228600"/>
-            <a:ext cx="9144000" cy="914400"/>
+            <a:off x="0" y="274638"/>
+            <a:ext cx="9144000" cy="1143000"/>
           </a:xfrm>
           <a:prstGeom prst="rect">
             <a:avLst/>
           </a:prstGeom>
           <a:solidFill>
-            <a:schemeClr val="tx1">
-              <a:alpha val="75000"/>
-            </a:schemeClr>
+            <a:srgbClr val="FFFFFF"/>
           </a:solidFill>
         </p:spPr>
         <p:txBody>
-          <a:bodyPr vert="horz" lIns="228600" tIns="0" rIns="228600" bIns="0" rtlCol="0" anchor="ctr">
+          <a:bodyPr vert="horz" lIns="91440" tIns="45720" rIns="91440" bIns="45720" rtlCol="0" anchor="ctr">
             <a:normAutofit/>
           </a:bodyPr>
           <a:lstStyle/>
@@ -5838,109 +6525,82 @@
           <p:nvPr>
             <p:ph type="body" idx="1"/>
             <p:custDataLst>
-              <p:tags r:id="rId7"/>
+              <p:tags r:id="rId14"/>
             </p:custDataLst>
           </p:nvPr>
         </p:nvSpPr>
         <p:spPr>
           <a:xfrm>
-            <a:off x="228600" y="1485900"/>
-            <a:ext cx="8686800" cy="4686300"/>
-          </a:xfrm>
-          <a:prstGeom prst="rect">
-            <a:avLst/>
-          </a:prstGeom>
-          <a:solidFill>
-            <a:schemeClr val="bg1">
-              <a:alpha val="85000"/>
-            </a:schemeClr>
-          </a:solidFill>
-        </p:spPr>
-        <p:txBody>
-          <a:bodyPr vert="horz" lIns="228600" tIns="228600" rIns="228600" bIns="228600" rtlCol="0">
-            <a:normAutofit/>
-          </a:bodyPr>
-          <a:lstStyle/>
-          <a:p>
-            <a:pPr lvl="0"/>
-            <a:r>
-              <a:rPr lang="en-US" smtClean="0"/>
-              <a:t>Click to edit Master text styles</a:t>
-            </a:r>
-          </a:p>
-          <a:p>
-            <a:pPr lvl="1"/>
-            <a:r>
-              <a:rPr lang="en-US" smtClean="0"/>
-              <a:t>Second level</a:t>
-            </a:r>
-          </a:p>
-          <a:p>
-            <a:pPr lvl="2"/>
-            <a:r>
-              <a:rPr lang="en-US" smtClean="0"/>
-              <a:t>Third level</a:t>
-            </a:r>
-          </a:p>
-          <a:p>
-            <a:pPr lvl="3"/>
-            <a:r>
-              <a:rPr lang="en-US" smtClean="0"/>
-              <a:t>Fourth level</a:t>
-            </a:r>
-          </a:p>
-          <a:p>
-            <a:pPr lvl="4"/>
-            <a:r>
-              <a:rPr lang="en-US" smtClean="0"/>
-              <a:t>Fifth level</a:t>
-            </a:r>
-            <a:endParaRPr lang="en-US"/>
-          </a:p>
-        </p:txBody>
-      </p:sp>
-      <p:pic>
-        <p:nvPicPr>
-          <p:cNvPr id="8" name="Picture 7"/>
-          <p:cNvPicPr>
-            <a:picLocks noChangeAspect="1"/>
-          </p:cNvPicPr>
-          <p:nvPr>
-            <p:custDataLst>
-              <p:tags r:id="rId8"/>
-            </p:custDataLst>
-          </p:nvPr>
-        </p:nvPicPr>
-        <p:blipFill>
-          <a:blip r:embed="rId10" cstate="print">
-            <a:extLst>
-              <a:ext uri="{28A0092B-C50C-407E-A947-70E740481C1C}">
-                <a14:useLocalDpi xmlns:a14="http://schemas.microsoft.com/office/drawing/2010/main" val="0"/>
-              </a:ext>
-            </a:extLst>
-          </a:blip>
-          <a:stretch>
-            <a:fillRect/>
-          </a:stretch>
-        </p:blipFill>
-        <p:spPr>
-          <a:xfrm>
-            <a:off x="6588626" y="6355767"/>
-            <a:ext cx="2326774" cy="359358"/>
+            <a:off x="457200" y="1600200"/>
+            <a:ext cx="8229600" cy="4876800"/>
           </a:xfrm>
           <a:prstGeom prst="rect">
             <a:avLst/>
           </a:prstGeom>
         </p:spPr>
-      </p:pic>
+        <p:txBody>
+          <a:bodyPr vert="horz" lIns="91440" tIns="45720" rIns="91440" bIns="45720" rtlCol="0">
+            <a:normAutofit/>
+          </a:bodyPr>
+          <a:lstStyle/>
+          <a:p>
+            <a:pPr lvl="0"/>
+            <a:r>
+              <a:rPr lang="en-US" smtClean="0"/>
+              <a:t>Click to edit Master text styles</a:t>
+            </a:r>
+          </a:p>
+          <a:p>
+            <a:pPr lvl="1"/>
+            <a:r>
+              <a:rPr lang="en-US" smtClean="0"/>
+              <a:t>Second level</a:t>
+            </a:r>
+          </a:p>
+          <a:p>
+            <a:pPr lvl="2"/>
+            <a:r>
+              <a:rPr lang="en-US" smtClean="0"/>
+              <a:t>Third level</a:t>
+            </a:r>
+          </a:p>
+          <a:p>
+            <a:pPr lvl="3"/>
+            <a:r>
+              <a:rPr lang="en-US" smtClean="0"/>
+              <a:t>Fourth level</a:t>
+            </a:r>
+          </a:p>
+          <a:p>
+            <a:pPr lvl="4"/>
+            <a:r>
+              <a:rPr lang="en-US" smtClean="0"/>
+              <a:t>Fifth level</a:t>
+            </a:r>
+            <a:endParaRPr lang="en-US"/>
+          </a:p>
+        </p:txBody>
+      </p:sp>
     </p:spTree>
+    <p:extLst>
+      <p:ext uri="{BB962C8B-B14F-4D97-AF65-F5344CB8AC3E}">
+        <p14:creationId xmlns:p14="http://schemas.microsoft.com/office/powerpoint/2010/main" val="891023"/>
+      </p:ext>
+    </p:extLst>
   </p:cSld>
   <p:clrMap bg1="lt1" tx1="dk1" bg2="lt2" tx2="dk2" accent1="accent1" accent2="accent2" accent3="accent3" accent4="accent4" accent5="accent5" accent6="accent6" hlink="hlink" folHlink="folHlink"/>
   <p:sldLayoutIdLst>
-    <p:sldLayoutId id="2147483649" r:id="rId1"/>
-    <p:sldLayoutId id="2147483650" r:id="rId2"/>
-    <p:sldLayoutId id="2147483652" r:id="rId3"/>
-    <p:sldLayoutId id="2147483653" r:id="rId4"/>
+    <p:sldLayoutId id="2147483655" r:id="rId1"/>
+    <p:sldLayoutId id="2147483656" r:id="rId2"/>
+    <p:sldLayoutId id="2147483657" r:id="rId3"/>
+    <p:sldLayoutId id="2147483658" r:id="rId4"/>
+    <p:sldLayoutId id="2147483659" r:id="rId5"/>
+    <p:sldLayoutId id="2147483660" r:id="rId6"/>
+    <p:sldLayoutId id="2147483661" r:id="rId7"/>
+    <p:sldLayoutId id="2147483662" r:id="rId8"/>
+    <p:sldLayoutId id="2147483663" r:id="rId9"/>
+    <p:sldLayoutId id="2147483664" r:id="rId10"/>
+    <p:sldLayoutId id="2147483665" r:id="rId11"/>
   </p:sldLayoutIdLst>
   <p:timing>
     <p:tnLst>
@@ -5951,102 +6611,102 @@
   </p:timing>
   <p:txStyles>
     <p:titleStyle>
-      <a:lvl1pPr algn="l" defTabSz="914400" rtl="0" eaLnBrk="1" latinLnBrk="0" hangingPunct="1">
+      <a:lvl1pPr algn="ctr" defTabSz="457200" rtl="0" eaLnBrk="1" latinLnBrk="0" hangingPunct="1">
         <a:spcBef>
           <a:spcPct val="0"/>
         </a:spcBef>
         <a:buNone/>
-        <a:defRPr sz="4400" b="1" kern="1200">
+        <a:defRPr sz="4400" kern="1200">
           <a:solidFill>
-            <a:schemeClr val="bg1"/>
+            <a:srgbClr val="0079C1"/>
           </a:solidFill>
-          <a:latin typeface="Arial" pitchFamily="34" charset="0"/>
+          <a:latin typeface="Museo Sans 500"/>
           <a:ea typeface="+mj-ea"/>
-          <a:cs typeface="Arial" pitchFamily="34" charset="0"/>
+          <a:cs typeface="Museo Sans 500"/>
         </a:defRPr>
       </a:lvl1pPr>
     </p:titleStyle>
     <p:bodyStyle>
-      <a:lvl1pPr marL="342900" indent="-342900" algn="l" defTabSz="914400" rtl="0" eaLnBrk="1" latinLnBrk="0" hangingPunct="1">
+      <a:lvl1pPr marL="342900" indent="-342900" algn="l" defTabSz="457200" rtl="0" eaLnBrk="1" latinLnBrk="0" hangingPunct="1">
         <a:spcBef>
           <a:spcPct val="20000"/>
         </a:spcBef>
-        <a:buFont typeface="Arial" pitchFamily="34" charset="0"/>
+        <a:buFont typeface="Arial"/>
         <a:buChar char="•"/>
         <a:defRPr sz="3200" kern="1200">
           <a:solidFill>
-            <a:schemeClr val="tx1"/>
+            <a:srgbClr val="404040"/>
           </a:solidFill>
-          <a:latin typeface="Arial" pitchFamily="34" charset="0"/>
+          <a:latin typeface="Museo Sans 500"/>
           <a:ea typeface="+mn-ea"/>
-          <a:cs typeface="Arial" pitchFamily="34" charset="0"/>
+          <a:cs typeface="Museo Sans 500"/>
         </a:defRPr>
       </a:lvl1pPr>
-      <a:lvl2pPr marL="742950" indent="-285750" algn="l" defTabSz="914400" rtl="0" eaLnBrk="1" latinLnBrk="0" hangingPunct="1">
+      <a:lvl2pPr marL="742950" indent="-285750" algn="l" defTabSz="457200" rtl="0" eaLnBrk="1" latinLnBrk="0" hangingPunct="1">
         <a:spcBef>
           <a:spcPct val="20000"/>
         </a:spcBef>
-        <a:buFont typeface="Arial" pitchFamily="34" charset="0"/>
+        <a:buFont typeface="Arial"/>
         <a:buChar char="–"/>
         <a:defRPr sz="2800" kern="1200">
           <a:solidFill>
-            <a:schemeClr val="tx1"/>
+            <a:srgbClr val="404040"/>
           </a:solidFill>
-          <a:latin typeface="Arial" pitchFamily="34" charset="0"/>
+          <a:latin typeface="Museo Sans 500"/>
           <a:ea typeface="+mn-ea"/>
-          <a:cs typeface="Arial" pitchFamily="34" charset="0"/>
+          <a:cs typeface="Museo Sans 500"/>
         </a:defRPr>
       </a:lvl2pPr>
-      <a:lvl3pPr marL="1143000" indent="-228600" algn="l" defTabSz="914400" rtl="0" eaLnBrk="1" latinLnBrk="0" hangingPunct="1">
+      <a:lvl3pPr marL="1143000" indent="-228600" algn="l" defTabSz="457200" rtl="0" eaLnBrk="1" latinLnBrk="0" hangingPunct="1">
         <a:spcBef>
           <a:spcPct val="20000"/>
         </a:spcBef>
-        <a:buFont typeface="Arial" pitchFamily="34" charset="0"/>
+        <a:buFont typeface="Arial"/>
         <a:buChar char="•"/>
         <a:defRPr sz="2400" kern="1200">
           <a:solidFill>
-            <a:schemeClr val="tx1"/>
+            <a:srgbClr val="404040"/>
           </a:solidFill>
-          <a:latin typeface="Arial" pitchFamily="34" charset="0"/>
+          <a:latin typeface="Museo Sans 500"/>
           <a:ea typeface="+mn-ea"/>
-          <a:cs typeface="Arial" pitchFamily="34" charset="0"/>
+          <a:cs typeface="Museo Sans 500"/>
         </a:defRPr>
       </a:lvl3pPr>
-      <a:lvl4pPr marL="1600200" indent="-228600" algn="l" defTabSz="914400" rtl="0" eaLnBrk="1" latinLnBrk="0" hangingPunct="1">
+      <a:lvl4pPr marL="1600200" indent="-228600" algn="l" defTabSz="457200" rtl="0" eaLnBrk="1" latinLnBrk="0" hangingPunct="1">
         <a:spcBef>
           <a:spcPct val="20000"/>
         </a:spcBef>
-        <a:buFont typeface="Arial" pitchFamily="34" charset="0"/>
+        <a:buFont typeface="Arial"/>
         <a:buChar char="–"/>
         <a:defRPr sz="2000" kern="1200">
           <a:solidFill>
-            <a:schemeClr val="tx1"/>
+            <a:srgbClr val="404040"/>
           </a:solidFill>
-          <a:latin typeface="Arial" pitchFamily="34" charset="0"/>
+          <a:latin typeface="Museo Sans 500"/>
           <a:ea typeface="+mn-ea"/>
-          <a:cs typeface="Arial" pitchFamily="34" charset="0"/>
+          <a:cs typeface="Museo Sans 500"/>
         </a:defRPr>
       </a:lvl4pPr>
-      <a:lvl5pPr marL="2057400" indent="-228600" algn="l" defTabSz="914400" rtl="0" eaLnBrk="1" latinLnBrk="0" hangingPunct="1">
+      <a:lvl5pPr marL="2057400" indent="-228600" algn="l" defTabSz="457200" rtl="0" eaLnBrk="1" latinLnBrk="0" hangingPunct="1">
         <a:spcBef>
           <a:spcPct val="20000"/>
         </a:spcBef>
-        <a:buFont typeface="Arial" pitchFamily="34" charset="0"/>
+        <a:buFont typeface="Arial"/>
         <a:buChar char="»"/>
         <a:defRPr sz="2000" kern="1200">
           <a:solidFill>
-            <a:schemeClr val="tx1"/>
+            <a:srgbClr val="404040"/>
           </a:solidFill>
-          <a:latin typeface="Arial" pitchFamily="34" charset="0"/>
+          <a:latin typeface="Museo Sans 500"/>
           <a:ea typeface="+mn-ea"/>
-          <a:cs typeface="Arial" pitchFamily="34" charset="0"/>
+          <a:cs typeface="Museo Sans 500"/>
         </a:defRPr>
       </a:lvl5pPr>
-      <a:lvl6pPr marL="2514600" indent="-228600" algn="l" defTabSz="914400" rtl="0" eaLnBrk="1" latinLnBrk="0" hangingPunct="1">
+      <a:lvl6pPr marL="2514600" indent="-228600" algn="l" defTabSz="457200" rtl="0" eaLnBrk="1" latinLnBrk="0" hangingPunct="1">
         <a:spcBef>
           <a:spcPct val="20000"/>
         </a:spcBef>
-        <a:buFont typeface="Arial" pitchFamily="34" charset="0"/>
+        <a:buFont typeface="Arial"/>
         <a:buChar char="•"/>
         <a:defRPr sz="2000" kern="1200">
           <a:solidFill>
@@ -6057,11 +6717,11 @@
           <a:cs typeface="+mn-cs"/>
         </a:defRPr>
       </a:lvl6pPr>
-      <a:lvl7pPr marL="2971800" indent="-228600" algn="l" defTabSz="914400" rtl="0" eaLnBrk="1" latinLnBrk="0" hangingPunct="1">
+      <a:lvl7pPr marL="2971800" indent="-228600" algn="l" defTabSz="457200" rtl="0" eaLnBrk="1" latinLnBrk="0" hangingPunct="1">
         <a:spcBef>
           <a:spcPct val="20000"/>
         </a:spcBef>
-        <a:buFont typeface="Arial" pitchFamily="34" charset="0"/>
+        <a:buFont typeface="Arial"/>
         <a:buChar char="•"/>
         <a:defRPr sz="2000" kern="1200">
           <a:solidFill>
@@ -6072,11 +6732,11 @@
           <a:cs typeface="+mn-cs"/>
         </a:defRPr>
       </a:lvl7pPr>
-      <a:lvl8pPr marL="3429000" indent="-228600" algn="l" defTabSz="914400" rtl="0" eaLnBrk="1" latinLnBrk="0" hangingPunct="1">
+      <a:lvl8pPr marL="3429000" indent="-228600" algn="l" defTabSz="457200" rtl="0" eaLnBrk="1" latinLnBrk="0" hangingPunct="1">
         <a:spcBef>
           <a:spcPct val="20000"/>
         </a:spcBef>
-        <a:buFont typeface="Arial" pitchFamily="34" charset="0"/>
+        <a:buFont typeface="Arial"/>
         <a:buChar char="•"/>
         <a:defRPr sz="2000" kern="1200">
           <a:solidFill>
@@ -6087,11 +6747,11 @@
           <a:cs typeface="+mn-cs"/>
         </a:defRPr>
       </a:lvl8pPr>
-      <a:lvl9pPr marL="3886200" indent="-228600" algn="l" defTabSz="914400" rtl="0" eaLnBrk="1" latinLnBrk="0" hangingPunct="1">
+      <a:lvl9pPr marL="3886200" indent="-228600" algn="l" defTabSz="457200" rtl="0" eaLnBrk="1" latinLnBrk="0" hangingPunct="1">
         <a:spcBef>
           <a:spcPct val="20000"/>
         </a:spcBef>
-        <a:buFont typeface="Arial" pitchFamily="34" charset="0"/>
+        <a:buFont typeface="Arial"/>
         <a:buChar char="•"/>
         <a:defRPr sz="2000" kern="1200">
           <a:solidFill>
@@ -6107,7 +6767,7 @@
       <a:defPPr>
         <a:defRPr lang="en-US"/>
       </a:defPPr>
-      <a:lvl1pPr marL="0" algn="l" defTabSz="914400" rtl="0" eaLnBrk="1" latinLnBrk="0" hangingPunct="1">
+      <a:lvl1pPr marL="0" algn="l" defTabSz="457200" rtl="0" eaLnBrk="1" latinLnBrk="0" hangingPunct="1">
         <a:defRPr sz="1800" kern="1200">
           <a:solidFill>
             <a:schemeClr val="tx1"/>
@@ -6117,7 +6777,7 @@
           <a:cs typeface="+mn-cs"/>
         </a:defRPr>
       </a:lvl1pPr>
-      <a:lvl2pPr marL="457200" algn="l" defTabSz="914400" rtl="0" eaLnBrk="1" latinLnBrk="0" hangingPunct="1">
+      <a:lvl2pPr marL="457200" algn="l" defTabSz="457200" rtl="0" eaLnBrk="1" latinLnBrk="0" hangingPunct="1">
         <a:defRPr sz="1800" kern="1200">
           <a:solidFill>
             <a:schemeClr val="tx1"/>
@@ -6127,7 +6787,7 @@
           <a:cs typeface="+mn-cs"/>
         </a:defRPr>
       </a:lvl2pPr>
-      <a:lvl3pPr marL="914400" algn="l" defTabSz="914400" rtl="0" eaLnBrk="1" latinLnBrk="0" hangingPunct="1">
+      <a:lvl3pPr marL="914400" algn="l" defTabSz="457200" rtl="0" eaLnBrk="1" latinLnBrk="0" hangingPunct="1">
         <a:defRPr sz="1800" kern="1200">
           <a:solidFill>
             <a:schemeClr val="tx1"/>
@@ -6137,7 +6797,7 @@
           <a:cs typeface="+mn-cs"/>
         </a:defRPr>
       </a:lvl3pPr>
-      <a:lvl4pPr marL="1371600" algn="l" defTabSz="914400" rtl="0" eaLnBrk="1" latinLnBrk="0" hangingPunct="1">
+      <a:lvl4pPr marL="1371600" algn="l" defTabSz="457200" rtl="0" eaLnBrk="1" latinLnBrk="0" hangingPunct="1">
         <a:defRPr sz="1800" kern="1200">
           <a:solidFill>
             <a:schemeClr val="tx1"/>
@@ -6147,7 +6807,7 @@
           <a:cs typeface="+mn-cs"/>
         </a:defRPr>
       </a:lvl4pPr>
-      <a:lvl5pPr marL="1828800" algn="l" defTabSz="914400" rtl="0" eaLnBrk="1" latinLnBrk="0" hangingPunct="1">
+      <a:lvl5pPr marL="1828800" algn="l" defTabSz="457200" rtl="0" eaLnBrk="1" latinLnBrk="0" hangingPunct="1">
         <a:defRPr sz="1800" kern="1200">
           <a:solidFill>
             <a:schemeClr val="tx1"/>
@@ -6157,7 +6817,7 @@
           <a:cs typeface="+mn-cs"/>
         </a:defRPr>
       </a:lvl5pPr>
-      <a:lvl6pPr marL="2286000" algn="l" defTabSz="914400" rtl="0" eaLnBrk="1" latinLnBrk="0" hangingPunct="1">
+      <a:lvl6pPr marL="2286000" algn="l" defTabSz="457200" rtl="0" eaLnBrk="1" latinLnBrk="0" hangingPunct="1">
         <a:defRPr sz="1800" kern="1200">
           <a:solidFill>
             <a:schemeClr val="tx1"/>
@@ -6167,7 +6827,7 @@
           <a:cs typeface="+mn-cs"/>
         </a:defRPr>
       </a:lvl6pPr>
-      <a:lvl7pPr marL="2743200" algn="l" defTabSz="914400" rtl="0" eaLnBrk="1" latinLnBrk="0" hangingPunct="1">
+      <a:lvl7pPr marL="2743200" algn="l" defTabSz="457200" rtl="0" eaLnBrk="1" latinLnBrk="0" hangingPunct="1">
         <a:defRPr sz="1800" kern="1200">
           <a:solidFill>
             <a:schemeClr val="tx1"/>
@@ -6177,7 +6837,7 @@
           <a:cs typeface="+mn-cs"/>
         </a:defRPr>
       </a:lvl7pPr>
-      <a:lvl8pPr marL="3200400" algn="l" defTabSz="914400" rtl="0" eaLnBrk="1" latinLnBrk="0" hangingPunct="1">
+      <a:lvl8pPr marL="3200400" algn="l" defTabSz="457200" rtl="0" eaLnBrk="1" latinLnBrk="0" hangingPunct="1">
         <a:defRPr sz="1800" kern="1200">
           <a:solidFill>
             <a:schemeClr val="tx1"/>
@@ -6187,7 +6847,7 @@
           <a:cs typeface="+mn-cs"/>
         </a:defRPr>
       </a:lvl8pPr>
-      <a:lvl9pPr marL="3657600" algn="l" defTabSz="914400" rtl="0" eaLnBrk="1" latinLnBrk="0" hangingPunct="1">
+      <a:lvl9pPr marL="3657600" algn="l" defTabSz="457200" rtl="0" eaLnBrk="1" latinLnBrk="0" hangingPunct="1">
         <a:defRPr sz="1800" kern="1200">
           <a:solidFill>
             <a:schemeClr val="tx1"/>
@@ -6226,88 +6886,367 @@
             <a:spLocks noGrp="1"/>
           </p:cNvSpPr>
           <p:nvPr>
-            <p:ph type="ctrTitle"/>
+            <p:ph type="ctrTitle" idx="4294967295"/>
             <p:custDataLst>
               <p:tags r:id="rId2"/>
             </p:custDataLst>
           </p:nvPr>
         </p:nvSpPr>
-        <p:spPr/>
+        <p:spPr>
+          <a:xfrm>
+            <a:off x="762000" y="1524000"/>
+            <a:ext cx="8382000" cy="609600"/>
+          </a:xfrm>
+          <a:noFill/>
+        </p:spPr>
         <p:txBody>
-          <a:bodyPr/>
+          <a:bodyPr>
+            <a:normAutofit fontScale="90000"/>
+          </a:bodyPr>
           <a:lstStyle/>
           <a:p>
-            <a:r>
-              <a:rPr lang="en-US" dirty="0" smtClean="0"/>
+            <a:pPr algn="l"/>
+            <a:r>
+              <a:rPr lang="en-US" b="1" dirty="0" smtClean="0">
+                <a:latin typeface="Verdana" pitchFamily="34" charset="0"/>
+                <a:ea typeface="Verdana" pitchFamily="34" charset="0"/>
+                <a:cs typeface="Verdana" pitchFamily="34" charset="0"/>
+              </a:rPr>
               <a:t>Building External DSLs</a:t>
             </a:r>
-            <a:endParaRPr lang="en-US" dirty="0"/>
+            <a:r>
+              <a:rPr lang="en-US" b="1" dirty="0" smtClean="0">
+                <a:latin typeface="Verdana" pitchFamily="34" charset="0"/>
+                <a:ea typeface="Verdana" pitchFamily="34" charset="0"/>
+                <a:cs typeface="Verdana" pitchFamily="34" charset="0"/>
+              </a:rPr>
+              <a:t/>
+            </a:r>
+            <a:br>
+              <a:rPr lang="en-US" b="1" dirty="0" smtClean="0">
+                <a:latin typeface="Verdana" pitchFamily="34" charset="0"/>
+                <a:ea typeface="Verdana" pitchFamily="34" charset="0"/>
+                <a:cs typeface="Verdana" pitchFamily="34" charset="0"/>
+              </a:rPr>
+            </a:br>
+            <a:r>
+              <a:rPr lang="en-US" b="1" dirty="0">
+                <a:latin typeface="Verdana" pitchFamily="34" charset="0"/>
+                <a:ea typeface="Verdana" pitchFamily="34" charset="0"/>
+                <a:cs typeface="Verdana" pitchFamily="34" charset="0"/>
+              </a:rPr>
+              <a:t/>
+            </a:r>
+            <a:br>
+              <a:rPr lang="en-US" b="1" dirty="0">
+                <a:latin typeface="Verdana" pitchFamily="34" charset="0"/>
+                <a:ea typeface="Verdana" pitchFamily="34" charset="0"/>
+                <a:cs typeface="Verdana" pitchFamily="34" charset="0"/>
+              </a:rPr>
+            </a:br>
+            <a:r>
+              <a:rPr lang="en-US" sz="3600" b="1" dirty="0" smtClean="0">
+                <a:latin typeface="Verdana" pitchFamily="34" charset="0"/>
+                <a:ea typeface="Verdana" pitchFamily="34" charset="0"/>
+                <a:cs typeface="Verdana" pitchFamily="34" charset="0"/>
+              </a:rPr>
+              <a:t>Jimmy </a:t>
+            </a:r>
+            <a:r>
+              <a:rPr lang="en-US" sz="3600" b="1" dirty="0" err="1" smtClean="0">
+                <a:latin typeface="Verdana" pitchFamily="34" charset="0"/>
+                <a:ea typeface="Verdana" pitchFamily="34" charset="0"/>
+                <a:cs typeface="Verdana" pitchFamily="34" charset="0"/>
+              </a:rPr>
+              <a:t>Bogard</a:t>
+            </a:r>
+            <a:r>
+              <a:rPr lang="en-US" sz="3600" b="1" dirty="0" smtClean="0">
+                <a:latin typeface="Verdana" pitchFamily="34" charset="0"/>
+                <a:ea typeface="Verdana" pitchFamily="34" charset="0"/>
+                <a:cs typeface="Verdana" pitchFamily="34" charset="0"/>
+              </a:rPr>
+              <a:t> - @</a:t>
+            </a:r>
+            <a:r>
+              <a:rPr lang="en-US" sz="3600" b="1" dirty="0" err="1" smtClean="0">
+                <a:latin typeface="Verdana" pitchFamily="34" charset="0"/>
+                <a:ea typeface="Verdana" pitchFamily="34" charset="0"/>
+                <a:cs typeface="Verdana" pitchFamily="34" charset="0"/>
+              </a:rPr>
+              <a:t>jbogard</a:t>
+            </a:r>
+            <a:r>
+              <a:rPr lang="en-US" sz="3600" b="1" dirty="0" smtClean="0">
+                <a:latin typeface="Verdana" pitchFamily="34" charset="0"/>
+                <a:ea typeface="Verdana" pitchFamily="34" charset="0"/>
+                <a:cs typeface="Verdana" pitchFamily="34" charset="0"/>
+              </a:rPr>
+              <a:t/>
+            </a:r>
+            <a:br>
+              <a:rPr lang="en-US" sz="3600" b="1" dirty="0" smtClean="0">
+                <a:latin typeface="Verdana" pitchFamily="34" charset="0"/>
+                <a:ea typeface="Verdana" pitchFamily="34" charset="0"/>
+                <a:cs typeface="Verdana" pitchFamily="34" charset="0"/>
+              </a:rPr>
+            </a:br>
+            <a:r>
+              <a:rPr lang="en-US" sz="3600" b="1" dirty="0" smtClean="0">
+                <a:latin typeface="Verdana" pitchFamily="34" charset="0"/>
+                <a:ea typeface="Verdana" pitchFamily="34" charset="0"/>
+                <a:cs typeface="Verdana" pitchFamily="34" charset="0"/>
+              </a:rPr>
+              <a:t>jimmybogard.lostechies.com</a:t>
+            </a:r>
+            <a:br>
+              <a:rPr lang="en-US" sz="3600" b="1" dirty="0" smtClean="0">
+                <a:latin typeface="Verdana" pitchFamily="34" charset="0"/>
+                <a:ea typeface="Verdana" pitchFamily="34" charset="0"/>
+                <a:cs typeface="Verdana" pitchFamily="34" charset="0"/>
+              </a:rPr>
+            </a:br>
+            <a:r>
+              <a:rPr lang="en-US" sz="3600" b="1" dirty="0" smtClean="0">
+                <a:latin typeface="Verdana" pitchFamily="34" charset="0"/>
+                <a:ea typeface="Verdana" pitchFamily="34" charset="0"/>
+                <a:cs typeface="Verdana" pitchFamily="34" charset="0"/>
+              </a:rPr>
+              <a:t>Headspring</a:t>
+            </a:r>
+            <a:endParaRPr lang="en-US" sz="3600" dirty="0">
+              <a:latin typeface="Verdana" pitchFamily="34" charset="0"/>
+              <a:ea typeface="Verdana" pitchFamily="34" charset="0"/>
+              <a:cs typeface="Verdana" pitchFamily="34" charset="0"/>
+            </a:endParaRPr>
           </a:p>
         </p:txBody>
       </p:sp>
-      <p:sp>
-        <p:nvSpPr>
-          <p:cNvPr id="3" name="Subtitle 2"/>
-          <p:cNvSpPr>
-            <a:spLocks noGrp="1"/>
-          </p:cNvSpPr>
-          <p:nvPr>
-            <p:ph type="subTitle" idx="1"/>
-            <p:custDataLst>
-              <p:tags r:id="rId3"/>
-            </p:custDataLst>
-          </p:nvPr>
-        </p:nvSpPr>
-        <p:spPr/>
-        <p:txBody>
-          <a:bodyPr>
-            <a:normAutofit fontScale="62500" lnSpcReduction="20000"/>
-          </a:bodyPr>
-          <a:lstStyle/>
-          <a:p>
-            <a:r>
-              <a:rPr lang="en-US" dirty="0" smtClean="0"/>
-              <a:t>Jimmy </a:t>
-            </a:r>
-            <a:r>
-              <a:rPr lang="en-US" dirty="0" err="1" smtClean="0"/>
-              <a:t>Bogard</a:t>
-            </a:r>
-            <a:endParaRPr lang="en-US" dirty="0"/>
-          </a:p>
-          <a:p>
-            <a:r>
-              <a:rPr lang="en-US" dirty="0" smtClean="0"/>
-              <a:t>@</a:t>
-            </a:r>
-            <a:r>
-              <a:rPr lang="en-US" dirty="0" err="1" smtClean="0"/>
-              <a:t>jbogard</a:t>
-            </a:r>
-            <a:endParaRPr lang="en-US" dirty="0" smtClean="0"/>
-          </a:p>
-          <a:p>
-            <a:r>
-              <a:rPr lang="en-US" dirty="0" smtClean="0"/>
-              <a:t>Jimmybogard.lostechies.com</a:t>
-            </a:r>
-            <a:endParaRPr lang="en-US" dirty="0" smtClean="0"/>
-          </a:p>
-        </p:txBody>
-      </p:sp>
+      <p:pic>
+        <p:nvPicPr>
+          <p:cNvPr id="1026" name="Picture 2" descr="http://www.manning.com/palermo3/palermo3_cover150.jpg"/>
+          <p:cNvPicPr>
+            <a:picLocks noChangeAspect="1" noChangeArrowheads="1"/>
+          </p:cNvPicPr>
+          <p:nvPr/>
+        </p:nvPicPr>
+        <p:blipFill>
+          <a:blip r:embed="rId4">
+            <a:extLst>
+              <a:ext uri="{28A0092B-C50C-407E-A947-70E740481C1C}">
+                <a14:useLocalDpi xmlns:a14="http://schemas.microsoft.com/office/drawing/2010/main" val="0"/>
+              </a:ext>
+            </a:extLst>
+          </a:blip>
+          <a:srcRect/>
+          <a:stretch>
+            <a:fillRect/>
+          </a:stretch>
+        </p:blipFill>
+        <p:spPr bwMode="auto">
+          <a:xfrm>
+            <a:off x="381000" y="3733800"/>
+            <a:ext cx="1428750" cy="1790701"/>
+          </a:xfrm>
+          <a:prstGeom prst="rect">
+            <a:avLst/>
+          </a:prstGeom>
+          <a:noFill/>
+          <a:extLst>
+            <a:ext uri="{909E8E84-426E-40DD-AFC4-6F175D3DCCD1}">
+              <a14:hiddenFill xmlns:a14="http://schemas.microsoft.com/office/drawing/2010/main">
+                <a:solidFill>
+                  <a:srgbClr val="FFFFFF"/>
+                </a:solidFill>
+              </a14:hiddenFill>
+            </a:ext>
+          </a:extLst>
+        </p:spPr>
+      </p:pic>
+      <p:pic>
+        <p:nvPicPr>
+          <p:cNvPr id="1028" name="Picture 4" descr="https://mvp.support.microsoft.com/library/images/support/en-US/MVPLogo.gif"/>
+          <p:cNvPicPr>
+            <a:picLocks noChangeAspect="1" noChangeArrowheads="1"/>
+          </p:cNvPicPr>
+          <p:nvPr/>
+        </p:nvPicPr>
+        <p:blipFill>
+          <a:blip r:embed="rId5">
+            <a:extLst>
+              <a:ext uri="{28A0092B-C50C-407E-A947-70E740481C1C}">
+                <a14:useLocalDpi xmlns:a14="http://schemas.microsoft.com/office/drawing/2010/main" val="0"/>
+              </a:ext>
+            </a:extLst>
+          </a:blip>
+          <a:srcRect/>
+          <a:stretch>
+            <a:fillRect/>
+          </a:stretch>
+        </p:blipFill>
+        <p:spPr bwMode="auto">
+          <a:xfrm>
+            <a:off x="7315200" y="3733800"/>
+            <a:ext cx="1095375" cy="1714500"/>
+          </a:xfrm>
+          <a:prstGeom prst="rect">
+            <a:avLst/>
+          </a:prstGeom>
+          <a:noFill/>
+          <a:extLst>
+            <a:ext uri="{909E8E84-426E-40DD-AFC4-6F175D3DCCD1}">
+              <a14:hiddenFill xmlns:a14="http://schemas.microsoft.com/office/drawing/2010/main">
+                <a:solidFill>
+                  <a:srgbClr val="FFFFFF"/>
+                </a:solidFill>
+              </a14:hiddenFill>
+            </a:ext>
+          </a:extLst>
+        </p:spPr>
+      </p:pic>
+      <p:pic>
+        <p:nvPicPr>
+          <p:cNvPr id="1030" name="Picture 6" descr="http://www.headspring.com/images/logo.png"/>
+          <p:cNvPicPr>
+            <a:picLocks noChangeAspect="1" noChangeArrowheads="1"/>
+          </p:cNvPicPr>
+          <p:nvPr/>
+        </p:nvPicPr>
+        <p:blipFill>
+          <a:blip r:embed="rId6">
+            <a:extLst>
+              <a:ext uri="{28A0092B-C50C-407E-A947-70E740481C1C}">
+                <a14:useLocalDpi xmlns:a14="http://schemas.microsoft.com/office/drawing/2010/main" val="0"/>
+              </a:ext>
+            </a:extLst>
+          </a:blip>
+          <a:srcRect/>
+          <a:stretch>
+            <a:fillRect/>
+          </a:stretch>
+        </p:blipFill>
+        <p:spPr bwMode="auto">
+          <a:xfrm>
+            <a:off x="2476500" y="3733800"/>
+            <a:ext cx="3619500" cy="723900"/>
+          </a:xfrm>
+          <a:prstGeom prst="rect">
+            <a:avLst/>
+          </a:prstGeom>
+          <a:noFill/>
+          <a:extLst>
+            <a:ext uri="{909E8E84-426E-40DD-AFC4-6F175D3DCCD1}">
+              <a14:hiddenFill xmlns:a14="http://schemas.microsoft.com/office/drawing/2010/main">
+                <a:solidFill>
+                  <a:srgbClr val="FFFFFF"/>
+                </a:solidFill>
+              </a14:hiddenFill>
+            </a:ext>
+          </a:extLst>
+        </p:spPr>
+      </p:pic>
+      <p:pic>
+        <p:nvPicPr>
+          <p:cNvPr id="1032" name="Picture 8" descr="http://lostechies.com/wp-content/themes/lostechies/images/lostechies_logo.png"/>
+          <p:cNvPicPr>
+            <a:picLocks noChangeAspect="1" noChangeArrowheads="1"/>
+          </p:cNvPicPr>
+          <p:nvPr/>
+        </p:nvPicPr>
+        <p:blipFill>
+          <a:blip r:embed="rId7">
+            <a:extLst>
+              <a:ext uri="{28A0092B-C50C-407E-A947-70E740481C1C}">
+                <a14:useLocalDpi xmlns:a14="http://schemas.microsoft.com/office/drawing/2010/main" val="0"/>
+              </a:ext>
+            </a:extLst>
+          </a:blip>
+          <a:srcRect/>
+          <a:stretch>
+            <a:fillRect/>
+          </a:stretch>
+        </p:blipFill>
+        <p:spPr bwMode="auto">
+          <a:xfrm>
+            <a:off x="1389645" y="4724400"/>
+            <a:ext cx="6047539" cy="733425"/>
+          </a:xfrm>
+          <a:prstGeom prst="rect">
+            <a:avLst/>
+          </a:prstGeom>
+          <a:noFill/>
+          <a:extLst>
+            <a:ext uri="{909E8E84-426E-40DD-AFC4-6F175D3DCCD1}">
+              <a14:hiddenFill xmlns:a14="http://schemas.microsoft.com/office/drawing/2010/main">
+                <a:solidFill>
+                  <a:srgbClr val="FFFFFF"/>
+                </a:solidFill>
+              </a14:hiddenFill>
+            </a:ext>
+          </a:extLst>
+        </p:spPr>
+      </p:pic>
+      <p:pic>
+        <p:nvPicPr>
+          <p:cNvPr id="1036" name="Picture 12" descr="AutoMapper"/>
+          <p:cNvPicPr>
+            <a:picLocks noChangeAspect="1" noChangeArrowheads="1"/>
+          </p:cNvPicPr>
+          <p:nvPr/>
+        </p:nvPicPr>
+        <p:blipFill>
+          <a:blip r:embed="rId8">
+            <a:extLst>
+              <a:ext uri="{28A0092B-C50C-407E-A947-70E740481C1C}">
+                <a14:useLocalDpi xmlns:a14="http://schemas.microsoft.com/office/drawing/2010/main" val="0"/>
+              </a:ext>
+            </a:extLst>
+          </a:blip>
+          <a:srcRect/>
+          <a:stretch>
+            <a:fillRect/>
+          </a:stretch>
+        </p:blipFill>
+        <p:spPr bwMode="auto">
+          <a:xfrm>
+            <a:off x="2476500" y="5871325"/>
+            <a:ext cx="3733800" cy="382377"/>
+          </a:xfrm>
+          <a:prstGeom prst="rect">
+            <a:avLst/>
+          </a:prstGeom>
+          <a:noFill/>
+          <a:extLst>
+            <a:ext uri="{909E8E84-426E-40DD-AFC4-6F175D3DCCD1}">
+              <a14:hiddenFill xmlns:a14="http://schemas.microsoft.com/office/drawing/2010/main">
+                <a:solidFill>
+                  <a:srgbClr val="FFFFFF"/>
+                </a:solidFill>
+              </a14:hiddenFill>
+            </a:ext>
+          </a:extLst>
+        </p:spPr>
+      </p:pic>
     </p:spTree>
     <p:custDataLst>
       <p:tags r:id="rId1"/>
     </p:custDataLst>
     <p:extLst>
       <p:ext uri="{BB962C8B-B14F-4D97-AF65-F5344CB8AC3E}">
-        <p14:creationId xmlns:p14="http://schemas.microsoft.com/office/powerpoint/2010/main" val="639067701"/>
+        <p14:creationId xmlns:p14="http://schemas.microsoft.com/office/powerpoint/2010/main" val="2414722312"/>
       </p:ext>
     </p:extLst>
   </p:cSld>
   <p:clrMapOvr>
     <a:masterClrMapping/>
   </p:clrMapOvr>
+  <p:timing>
+    <p:tnLst>
+      <p:par>
+        <p:cTn id="1" dur="indefinite" restart="never" nodeType="tmRoot"/>
+      </p:par>
+    </p:tnLst>
+  </p:timing>
 </p:sld>
 </file>
 
@@ -6373,8 +7312,8 @@
           </p:nvPr>
         </p:nvGraphicFramePr>
         <p:xfrm>
-          <a:off x="228600" y="1485900"/>
-          <a:ext cx="8686800" cy="4686300"/>
+          <a:off x="457200" y="1600200"/>
+          <a:ext cx="8229600" cy="4876800"/>
         </p:xfrm>
         <a:graphic>
           <a:graphicData uri="http://schemas.openxmlformats.org/drawingml/2006/diagram">
@@ -6395,6 +7334,13 @@
   <p:clrMapOvr>
     <a:masterClrMapping/>
   </p:clrMapOvr>
+  <p:timing>
+    <p:tnLst>
+      <p:par>
+        <p:cTn id="1" dur="indefinite" restart="never" nodeType="tmRoot"/>
+      </p:par>
+    </p:tnLst>
+  </p:timing>
 </p:sld>
 </file>
 
@@ -6498,6 +7444,13 @@
   <p:clrMapOvr>
     <a:masterClrMapping/>
   </p:clrMapOvr>
+  <p:timing>
+    <p:tnLst>
+      <p:par>
+        <p:cTn id="1" dur="indefinite" restart="never" nodeType="tmRoot"/>
+      </p:par>
+    </p:tnLst>
+  </p:timing>
 </p:sld>
 </file>
 
@@ -6595,6 +7548,13 @@
   <p:clrMapOvr>
     <a:masterClrMapping/>
   </p:clrMapOvr>
+  <p:timing>
+    <p:tnLst>
+      <p:par>
+        <p:cTn id="1" dur="indefinite" restart="never" nodeType="tmRoot"/>
+      </p:par>
+    </p:tnLst>
+  </p:timing>
 </p:sld>
 </file>
 
@@ -6681,6 +7641,13 @@
   <p:clrMapOvr>
     <a:masterClrMapping/>
   </p:clrMapOvr>
+  <p:timing>
+    <p:tnLst>
+      <p:par>
+        <p:cTn id="1" dur="indefinite" restart="never" nodeType="tmRoot"/>
+      </p:par>
+    </p:tnLst>
+  </p:timing>
 </p:sld>
 </file>
 
@@ -6831,6 +7798,13 @@
   <p:clrMapOvr>
     <a:masterClrMapping/>
   </p:clrMapOvr>
+  <p:timing>
+    <p:tnLst>
+      <p:par>
+        <p:cTn id="1" dur="indefinite" restart="never" nodeType="tmRoot"/>
+      </p:par>
+    </p:tnLst>
+  </p:timing>
 </p:sld>
 </file>
 
@@ -6902,11 +7876,7 @@
             </a:pPr>
             <a:r>
               <a:rPr lang="en-US" sz="4400" dirty="0" smtClean="0"/>
-              <a:t>A computer programming </a:t>
-            </a:r>
-            <a:r>
-              <a:rPr lang="en-US" sz="4400" dirty="0" smtClean="0"/>
-              <a:t>language</a:t>
+              <a:t>A computer programming language</a:t>
             </a:r>
           </a:p>
           <a:p>
@@ -6915,15 +7885,7 @@
             </a:pPr>
             <a:r>
               <a:rPr lang="en-US" sz="4400" dirty="0" smtClean="0"/>
-              <a:t>of </a:t>
-            </a:r>
-            <a:r>
-              <a:rPr lang="en-US" sz="4400" dirty="0" smtClean="0"/>
-              <a:t>limited </a:t>
-            </a:r>
-            <a:r>
-              <a:rPr lang="en-US" sz="4400" dirty="0" smtClean="0"/>
-              <a:t>expressiveness</a:t>
+              <a:t>of limited expressiveness</a:t>
             </a:r>
           </a:p>
           <a:p>
@@ -6932,11 +7894,7 @@
             </a:pPr>
             <a:r>
               <a:rPr lang="en-US" sz="4400" dirty="0" smtClean="0"/>
-              <a:t>focused </a:t>
-            </a:r>
-            <a:r>
-              <a:rPr lang="en-US" sz="4400" dirty="0" smtClean="0"/>
-              <a:t>on a particular domain</a:t>
+              <a:t>focused on a particular domain</a:t>
             </a:r>
             <a:endParaRPr lang="en-US" sz="4400" dirty="0"/>
           </a:p>
@@ -6955,6 +7913,13 @@
   <p:clrMapOvr>
     <a:masterClrMapping/>
   </p:clrMapOvr>
+  <p:timing>
+    <p:tnLst>
+      <p:par>
+        <p:cTn id="1" dur="indefinite" restart="never" nodeType="tmRoot"/>
+      </p:par>
+    </p:tnLst>
+  </p:timing>
 </p:sld>
 </file>
 
@@ -7041,6 +8006,13 @@
   <p:clrMapOvr>
     <a:masterClrMapping/>
   </p:clrMapOvr>
+  <p:timing>
+    <p:tnLst>
+      <p:par>
+        <p:cTn id="1" dur="indefinite" restart="never" nodeType="tmRoot"/>
+      </p:par>
+    </p:tnLst>
+  </p:timing>
 </p:sld>
 </file>
 
@@ -7081,11 +8053,7 @@
           <a:p>
             <a:r>
               <a:rPr lang="en-US" dirty="0" smtClean="0"/>
-              <a:t>Internal </a:t>
-            </a:r>
-            <a:r>
-              <a:rPr lang="en-US" dirty="0" smtClean="0"/>
-              <a:t>DSLs</a:t>
+              <a:t>Internal DSLs</a:t>
             </a:r>
             <a:endParaRPr lang="en-US" dirty="0"/>
           </a:p>
@@ -7173,6 +8141,13 @@
   <p:clrMapOvr>
     <a:masterClrMapping/>
   </p:clrMapOvr>
+  <p:timing>
+    <p:tnLst>
+      <p:par>
+        <p:cTn id="1" dur="indefinite" restart="never" nodeType="tmRoot"/>
+      </p:par>
+    </p:tnLst>
+  </p:timing>
 </p:sld>
 </file>
 
@@ -7213,11 +8188,7 @@
           <a:p>
             <a:r>
               <a:rPr lang="en-US" dirty="0" smtClean="0"/>
-              <a:t>External </a:t>
-            </a:r>
-            <a:r>
-              <a:rPr lang="en-US" dirty="0" smtClean="0"/>
-              <a:t>DSLs</a:t>
+              <a:t>External DSLs</a:t>
             </a:r>
             <a:endParaRPr lang="en-US" dirty="0"/>
           </a:p>
@@ -7244,15 +8215,14 @@
               </a:ext>
             </a:extLst>
           </a:blip>
-          <a:srcRect/>
           <a:stretch>
             <a:fillRect/>
           </a:stretch>
         </p:blipFill>
         <p:spPr bwMode="auto">
           <a:xfrm>
-            <a:off x="386285" y="1543335"/>
-            <a:ext cx="8371429" cy="4571429"/>
+            <a:off x="457200" y="1791610"/>
+            <a:ext cx="8229600" cy="4493979"/>
           </a:xfrm>
           <a:prstGeom prst="rect">
             <a:avLst/>
@@ -7305,6 +8275,13 @@
   <p:clrMapOvr>
     <a:masterClrMapping/>
   </p:clrMapOvr>
+  <p:timing>
+    <p:tnLst>
+      <p:par>
+        <p:cTn id="1" dur="indefinite" restart="never" nodeType="tmRoot"/>
+      </p:par>
+    </p:tnLst>
+  </p:timing>
 </p:sld>
 </file>
 
@@ -7626,6 +8603,13 @@
   <p:clrMapOvr>
     <a:masterClrMapping/>
   </p:clrMapOvr>
+  <p:timing>
+    <p:tnLst>
+      <p:par>
+        <p:cTn id="1" dur="indefinite" restart="never" nodeType="tmRoot"/>
+      </p:par>
+    </p:tnLst>
+  </p:timing>
 </p:sld>
 </file>
 
@@ -7955,6 +8939,13 @@
   <p:clrMapOvr>
     <a:masterClrMapping/>
   </p:clrMapOvr>
+  <p:timing>
+    <p:tnLst>
+      <p:par>
+        <p:cTn id="1" dur="indefinite" restart="never" nodeType="tmRoot"/>
+      </p:par>
+    </p:tnLst>
+  </p:timing>
 </p:sld>
 </file>
 
@@ -8072,6 +9063,13 @@
   <p:clrMapOvr>
     <a:masterClrMapping/>
   </p:clrMapOvr>
+  <p:timing>
+    <p:tnLst>
+      <p:par>
+        <p:cTn id="1" dur="indefinite" restart="never" nodeType="tmRoot"/>
+      </p:par>
+    </p:tnLst>
+  </p:timing>
 </p:sld>
 </file>
 
@@ -8162,246 +9160,253 @@
   <p:clrMapOvr>
     <a:masterClrMapping/>
   </p:clrMapOvr>
+  <p:timing>
+    <p:tnLst>
+      <p:par>
+        <p:cTn id="1" dur="indefinite" restart="never" nodeType="tmRoot"/>
+      </p:par>
+    </p:tnLst>
+  </p:timing>
 </p:sld>
 </file>
 
 <file path=ppt/tags/tag1.xml><?xml version="1.0" encoding="utf-8"?>
 <p:tagLst xmlns:a="http://schemas.openxmlformats.org/drawingml/2006/main" xmlns:r="http://schemas.openxmlformats.org/officeDocument/2006/relationships" xmlns:p="http://schemas.openxmlformats.org/presentationml/2006/main">
-  <p:tag name="DVSHAPEID" val="8ZBzoooSZSbFnA4GzEGg2U"/>
+  <p:tag name="DVSHAPEID" val="3PeF0pfZpjxb4E6eXY8RTT"/>
 </p:tagLst>
 </file>
 
 <file path=ppt/tags/tag10.xml><?xml version="1.0" encoding="utf-8"?>
 <p:tagLst xmlns:a="http://schemas.openxmlformats.org/drawingml/2006/main" xmlns:r="http://schemas.openxmlformats.org/officeDocument/2006/relationships" xmlns:p="http://schemas.openxmlformats.org/presentationml/2006/main">
-  <p:tag name="DVSHAPEID" val="GY648tUwEg1TWHsQaFPxR7"/>
+  <p:tag name="DVSHAPEID" val="z4LoIctk0mYSUZbbRn9ct8"/>
 </p:tagLst>
 </file>
 
 <file path=ppt/tags/tag11.xml><?xml version="1.0" encoding="utf-8"?>
 <p:tagLst xmlns:a="http://schemas.openxmlformats.org/drawingml/2006/main" xmlns:r="http://schemas.openxmlformats.org/officeDocument/2006/relationships" xmlns:p="http://schemas.openxmlformats.org/presentationml/2006/main">
-  <p:tag name="DVSHAPEID" val="VLh5EqG6iIDxhLBaahrYC0"/>
+  <p:tag name="DVSHAPEID" val="ZyMwWG1KoyrshURfdC5ER9"/>
 </p:tagLst>
 </file>
 
 <file path=ppt/tags/tag12.xml><?xml version="1.0" encoding="utf-8"?>
 <p:tagLst xmlns:a="http://schemas.openxmlformats.org/drawingml/2006/main" xmlns:r="http://schemas.openxmlformats.org/officeDocument/2006/relationships" xmlns:p="http://schemas.openxmlformats.org/presentationml/2006/main">
-  <p:tag name="DVSHAPEID" val="R8KUFraOvCjy2kN2PuQxYj"/>
+  <p:tag name="DVSHAPEID" val="ZkVC4axKyuuq4dBcfMjgXp"/>
 </p:tagLst>
 </file>
 
 <file path=ppt/tags/tag13.xml><?xml version="1.0" encoding="utf-8"?>
 <p:tagLst xmlns:a="http://schemas.openxmlformats.org/drawingml/2006/main" xmlns:r="http://schemas.openxmlformats.org/officeDocument/2006/relationships" xmlns:p="http://schemas.openxmlformats.org/presentationml/2006/main">
-  <p:tag name="DVSHAPEID" val="gppHf0vy6SuUU9kJLeWtd1"/>
+  <p:tag name="DVSHAPEID" val="qsHgjBax6OhQysAjCQdD0X"/>
 </p:tagLst>
 </file>
 
 <file path=ppt/tags/tag14.xml><?xml version="1.0" encoding="utf-8"?>
 <p:tagLst xmlns:a="http://schemas.openxmlformats.org/drawingml/2006/main" xmlns:r="http://schemas.openxmlformats.org/officeDocument/2006/relationships" xmlns:p="http://schemas.openxmlformats.org/presentationml/2006/main">
-  <p:tag name="DVSHAPEID" val="dJIgm7sW741yRkuXc9jXvq"/>
+  <p:tag name="DVSHAPEID" val="XQQED1mikBbATtVNQVA0nF"/>
 </p:tagLst>
 </file>
 
 <file path=ppt/tags/tag15.xml><?xml version="1.0" encoding="utf-8"?>
 <p:tagLst xmlns:a="http://schemas.openxmlformats.org/drawingml/2006/main" xmlns:r="http://schemas.openxmlformats.org/officeDocument/2006/relationships" xmlns:p="http://schemas.openxmlformats.org/presentationml/2006/main">
-  <p:tag name="DVSHAPEID" val="37qDH5JBBv5ecGYYEn5aLq"/>
+  <p:tag name="DVSHAPEID" val="9dF9BVat3jptuQqFY8aNtG"/>
 </p:tagLst>
 </file>
 
 <file path=ppt/tags/tag16.xml><?xml version="1.0" encoding="utf-8"?>
 <p:tagLst xmlns:a="http://schemas.openxmlformats.org/drawingml/2006/main" xmlns:r="http://schemas.openxmlformats.org/officeDocument/2006/relationships" xmlns:p="http://schemas.openxmlformats.org/presentationml/2006/main">
-  <p:tag name="DVSHAPEID" val="Slh0fN2MafvMFAQIqmdvtw"/>
+  <p:tag name="DVSHAPEID" val="EYz7oOZh3ZziHCYuqr8RxR"/>
 </p:tagLst>
 </file>
 
 <file path=ppt/tags/tag17.xml><?xml version="1.0" encoding="utf-8"?>
 <p:tagLst xmlns:a="http://schemas.openxmlformats.org/drawingml/2006/main" xmlns:r="http://schemas.openxmlformats.org/officeDocument/2006/relationships" xmlns:p="http://schemas.openxmlformats.org/presentationml/2006/main">
-  <p:tag name="DVSHAPEID" val="sC8NZdvWRlFDf4mHPWzOkP"/>
+  <p:tag name="DVSHAPEID" val="bqZ4nbXrQAbtyHzuwltLgp"/>
 </p:tagLst>
 </file>
 
 <file path=ppt/tags/tag18.xml><?xml version="1.0" encoding="utf-8"?>
 <p:tagLst xmlns:a="http://schemas.openxmlformats.org/drawingml/2006/main" xmlns:r="http://schemas.openxmlformats.org/officeDocument/2006/relationships" xmlns:p="http://schemas.openxmlformats.org/presentationml/2006/main">
-  <p:tag name="DVSHAPEID" val="Jp1o8VXJWfWmSERrOOhdoa"/>
+  <p:tag name="DVSHAPEID" val="Tc9NGtIIFC8MM97krOkB9Z"/>
 </p:tagLst>
 </file>
 
 <file path=ppt/tags/tag19.xml><?xml version="1.0" encoding="utf-8"?>
 <p:tagLst xmlns:a="http://schemas.openxmlformats.org/drawingml/2006/main" xmlns:r="http://schemas.openxmlformats.org/officeDocument/2006/relationships" xmlns:p="http://schemas.openxmlformats.org/presentationml/2006/main">
-  <p:tag name="DVSHAPEID" val="61lLmIxhWEbCTJMA5AZ8oq"/>
+  <p:tag name="DVSHAPEID" val="6e3hUVUNnMBLwNVzutJ7Uy"/>
 </p:tagLst>
 </file>
 
 <file path=ppt/tags/tag2.xml><?xml version="1.0" encoding="utf-8"?>
 <p:tagLst xmlns:a="http://schemas.openxmlformats.org/drawingml/2006/main" xmlns:r="http://schemas.openxmlformats.org/officeDocument/2006/relationships" xmlns:p="http://schemas.openxmlformats.org/presentationml/2006/main">
-  <p:tag name="DVSHAPEID" val="emeM8KS4RAypXbElSzXkf8"/>
+  <p:tag name="DVSHAPEID" val="IcRcSHxF9KLXD8CoBkQECk"/>
 </p:tagLst>
 </file>
 
 <file path=ppt/tags/tag20.xml><?xml version="1.0" encoding="utf-8"?>
 <p:tagLst xmlns:a="http://schemas.openxmlformats.org/drawingml/2006/main" xmlns:r="http://schemas.openxmlformats.org/officeDocument/2006/relationships" xmlns:p="http://schemas.openxmlformats.org/presentationml/2006/main">
-  <p:tag name="DVSHAPEID" val="HTcHQo8Kx7ryi02myecFii"/>
+  <p:tag name="DVSHAPEID" val="lLUqmcTFqEgU5VJpyNORel"/>
 </p:tagLst>
 </file>
 
 <file path=ppt/tags/tag21.xml><?xml version="1.0" encoding="utf-8"?>
 <p:tagLst xmlns:a="http://schemas.openxmlformats.org/drawingml/2006/main" xmlns:r="http://schemas.openxmlformats.org/officeDocument/2006/relationships" xmlns:p="http://schemas.openxmlformats.org/presentationml/2006/main">
-  <p:tag name="DVSHAPEID" val="agL7FdIHegMGkszFR89c74"/>
+  <p:tag name="DVSHAPEID" val="b1CkpRjRS14xSimuyITHlX"/>
 </p:tagLst>
 </file>
 
 <file path=ppt/tags/tag22.xml><?xml version="1.0" encoding="utf-8"?>
 <p:tagLst xmlns:a="http://schemas.openxmlformats.org/drawingml/2006/main" xmlns:r="http://schemas.openxmlformats.org/officeDocument/2006/relationships" xmlns:p="http://schemas.openxmlformats.org/presentationml/2006/main">
-  <p:tag name="DVSECTIONID" val="vlWvKF9PT2aBNB0sdzAcoo"/>
+  <p:tag name="DVSHAPEID" val="vBHZQ4UWj3kZATN1N2lzLe"/>
 </p:tagLst>
 </file>
 
 <file path=ppt/tags/tag23.xml><?xml version="1.0" encoding="utf-8"?>
 <p:tagLst xmlns:a="http://schemas.openxmlformats.org/drawingml/2006/main" xmlns:r="http://schemas.openxmlformats.org/officeDocument/2006/relationships" xmlns:p="http://schemas.openxmlformats.org/presentationml/2006/main">
-  <p:tag name="DVSHAPEID" val="MKb7lB3xNWUa35FiKMh9pz"/>
+  <p:tag name="DVSHAPEID" val="Qx2r24e5YxZdw1Cp1fWWI1"/>
 </p:tagLst>
 </file>
 
 <file path=ppt/tags/tag24.xml><?xml version="1.0" encoding="utf-8"?>
 <p:tagLst xmlns:a="http://schemas.openxmlformats.org/drawingml/2006/main" xmlns:r="http://schemas.openxmlformats.org/officeDocument/2006/relationships" xmlns:p="http://schemas.openxmlformats.org/presentationml/2006/main">
-  <p:tag name="DVSHAPEID" val="3bJsONWqLO2q9I3AWxw6Bj"/>
+  <p:tag name="DVSHAPEID" val="dTHtGxURlMbgLaXo1QId4M"/>
 </p:tagLst>
 </file>
 
 <file path=ppt/tags/tag25.xml><?xml version="1.0" encoding="utf-8"?>
+<p:tagLst xmlns:a="http://schemas.openxmlformats.org/drawingml/2006/main" xmlns:r="http://schemas.openxmlformats.org/officeDocument/2006/relationships" xmlns:p="http://schemas.openxmlformats.org/presentationml/2006/main">
+  <p:tag name="DVSHAPEID" val="ZnmMoo06DPwPj8KzoHb7bd"/>
+</p:tagLst>
+</file>
+
+<file path=ppt/tags/tag26.xml><?xml version="1.0" encoding="utf-8"?>
+<p:tagLst xmlns:a="http://schemas.openxmlformats.org/drawingml/2006/main" xmlns:r="http://schemas.openxmlformats.org/officeDocument/2006/relationships" xmlns:p="http://schemas.openxmlformats.org/presentationml/2006/main">
+  <p:tag name="DVSHAPEID" val="2fgsrCd5euWqUj6U8wQf9m"/>
+</p:tagLst>
+</file>
+
+<file path=ppt/tags/tag27.xml><?xml version="1.0" encoding="utf-8"?>
+<p:tagLst xmlns:a="http://schemas.openxmlformats.org/drawingml/2006/main" xmlns:r="http://schemas.openxmlformats.org/officeDocument/2006/relationships" xmlns:p="http://schemas.openxmlformats.org/presentationml/2006/main">
+  <p:tag name="DVSHAPEID" val="KWROEss02XBLl7wWWnTxB1"/>
+</p:tagLst>
+</file>
+
+<file path=ppt/tags/tag28.xml><?xml version="1.0" encoding="utf-8"?>
+<p:tagLst xmlns:a="http://schemas.openxmlformats.org/drawingml/2006/main" xmlns:r="http://schemas.openxmlformats.org/officeDocument/2006/relationships" xmlns:p="http://schemas.openxmlformats.org/presentationml/2006/main">
+  <p:tag name="DVSHAPEID" val="SSeqstyEgW4FvjBDYLDdsY"/>
+</p:tagLst>
+</file>
+
+<file path=ppt/tags/tag29.xml><?xml version="1.0" encoding="utf-8"?>
+<p:tagLst xmlns:a="http://schemas.openxmlformats.org/drawingml/2006/main" xmlns:r="http://schemas.openxmlformats.org/officeDocument/2006/relationships" xmlns:p="http://schemas.openxmlformats.org/presentationml/2006/main">
+  <p:tag name="DVSHAPEID" val="P8YZncztmCKI3YAdZYsnGF"/>
+</p:tagLst>
+</file>
+
+<file path=ppt/tags/tag3.xml><?xml version="1.0" encoding="utf-8"?>
+<p:tagLst xmlns:a="http://schemas.openxmlformats.org/drawingml/2006/main" xmlns:r="http://schemas.openxmlformats.org/officeDocument/2006/relationships" xmlns:p="http://schemas.openxmlformats.org/presentationml/2006/main">
+  <p:tag name="DVSHAPEID" val="nyqJJ7TVybia62ONwysKaM"/>
+</p:tagLst>
+</file>
+
+<file path=ppt/tags/tag30.xml><?xml version="1.0" encoding="utf-8"?>
+<p:tagLst xmlns:a="http://schemas.openxmlformats.org/drawingml/2006/main" xmlns:r="http://schemas.openxmlformats.org/officeDocument/2006/relationships" xmlns:p="http://schemas.openxmlformats.org/presentationml/2006/main">
+  <p:tag name="DVSHAPEID" val="HFBcljo7TnzT36st5m4NAs"/>
+</p:tagLst>
+</file>
+
+<file path=ppt/tags/tag31.xml><?xml version="1.0" encoding="utf-8"?>
+<p:tagLst xmlns:a="http://schemas.openxmlformats.org/drawingml/2006/main" xmlns:r="http://schemas.openxmlformats.org/officeDocument/2006/relationships" xmlns:p="http://schemas.openxmlformats.org/presentationml/2006/main">
+  <p:tag name="DVSECTIONID" val="v9TOBGUz49ouJ9MyqbAfaO"/>
+</p:tagLst>
+</file>
+
+<file path=ppt/tags/tag32.xml><?xml version="1.0" encoding="utf-8"?>
+<p:tagLst xmlns:a="http://schemas.openxmlformats.org/drawingml/2006/main" xmlns:r="http://schemas.openxmlformats.org/officeDocument/2006/relationships" xmlns:p="http://schemas.openxmlformats.org/presentationml/2006/main">
+  <p:tag name="DVSHAPEID" val="uA659GxK01l5RE4S2hskxe"/>
+</p:tagLst>
+</file>
+
+<file path=ppt/tags/tag33.xml><?xml version="1.0" encoding="utf-8"?>
 <p:tagLst xmlns:a="http://schemas.openxmlformats.org/drawingml/2006/main" xmlns:r="http://schemas.openxmlformats.org/officeDocument/2006/relationships" xmlns:p="http://schemas.openxmlformats.org/presentationml/2006/main">
   <p:tag name="DVSECTIONID" val="wmDL6NXaOewuUXnh6QBpt1"/>
 </p:tagLst>
 </file>
 
-<file path=ppt/tags/tag26.xml><?xml version="1.0" encoding="utf-8"?>
+<file path=ppt/tags/tag34.xml><?xml version="1.0" encoding="utf-8"?>
 <p:tagLst xmlns:a="http://schemas.openxmlformats.org/drawingml/2006/main" xmlns:r="http://schemas.openxmlformats.org/officeDocument/2006/relationships" xmlns:p="http://schemas.openxmlformats.org/presentationml/2006/main">
   <p:tag name="DVSHAPEID" val="92nGSZd2E2qcGZoSMfAnb6"/>
 </p:tagLst>
 </file>
 
-<file path=ppt/tags/tag27.xml><?xml version="1.0" encoding="utf-8"?>
+<file path=ppt/tags/tag35.xml><?xml version="1.0" encoding="utf-8"?>
 <p:tagLst xmlns:a="http://schemas.openxmlformats.org/drawingml/2006/main" xmlns:r="http://schemas.openxmlformats.org/officeDocument/2006/relationships" xmlns:p="http://schemas.openxmlformats.org/presentationml/2006/main">
   <p:tag name="DVSHAPEID" val="8DVXfaQJDiYJ2G58VWdIa0"/>
 </p:tagLst>
 </file>
 
-<file path=ppt/tags/tag28.xml><?xml version="1.0" encoding="utf-8"?>
+<file path=ppt/tags/tag36.xml><?xml version="1.0" encoding="utf-8"?>
 <p:tagLst xmlns:a="http://schemas.openxmlformats.org/drawingml/2006/main" xmlns:r="http://schemas.openxmlformats.org/officeDocument/2006/relationships" xmlns:p="http://schemas.openxmlformats.org/presentationml/2006/main">
   <p:tag name="DVSECTIONID" val="AX6eR0JhCqb6OzRYylSIdW"/>
 </p:tagLst>
 </file>
 
-<file path=ppt/tags/tag29.xml><?xml version="1.0" encoding="utf-8"?>
+<file path=ppt/tags/tag37.xml><?xml version="1.0" encoding="utf-8"?>
 <p:tagLst xmlns:a="http://schemas.openxmlformats.org/drawingml/2006/main" xmlns:r="http://schemas.openxmlformats.org/officeDocument/2006/relationships" xmlns:p="http://schemas.openxmlformats.org/presentationml/2006/main">
   <p:tag name="DVSHAPEID" val="0X13c3Lgve83TJLVK3cUo7"/>
 </p:tagLst>
 </file>
 
-<file path=ppt/tags/tag3.xml><?xml version="1.0" encoding="utf-8"?>
-<p:tagLst xmlns:a="http://schemas.openxmlformats.org/drawingml/2006/main" xmlns:r="http://schemas.openxmlformats.org/officeDocument/2006/relationships" xmlns:p="http://schemas.openxmlformats.org/presentationml/2006/main">
-  <p:tag name="DVSHAPEID" val="70JJT4pQPFvdLfkBfE0V1B"/>
-</p:tagLst>
-</file>
-
-<file path=ppt/tags/tag30.xml><?xml version="1.0" encoding="utf-8"?>
+<file path=ppt/tags/tag38.xml><?xml version="1.0" encoding="utf-8"?>
 <p:tagLst xmlns:a="http://schemas.openxmlformats.org/drawingml/2006/main" xmlns:r="http://schemas.openxmlformats.org/officeDocument/2006/relationships" xmlns:p="http://schemas.openxmlformats.org/presentationml/2006/main">
   <p:tag name="DVSHAPEID" val="eXXHMDkEasW7CXVbXMYmMJ"/>
 </p:tagLst>
 </file>
 
-<file path=ppt/tags/tag31.xml><?xml version="1.0" encoding="utf-8"?>
+<file path=ppt/tags/tag39.xml><?xml version="1.0" encoding="utf-8"?>
 <p:tagLst xmlns:a="http://schemas.openxmlformats.org/drawingml/2006/main" xmlns:r="http://schemas.openxmlformats.org/officeDocument/2006/relationships" xmlns:p="http://schemas.openxmlformats.org/presentationml/2006/main">
   <p:tag name="DVSECTIONID" val="cjNbiFpVhHkZZTUgxkrlr9"/>
 </p:tagLst>
 </file>
 
-<file path=ppt/tags/tag32.xml><?xml version="1.0" encoding="utf-8"?>
+<file path=ppt/tags/tag4.xml><?xml version="1.0" encoding="utf-8"?>
+<p:tagLst xmlns:a="http://schemas.openxmlformats.org/drawingml/2006/main" xmlns:r="http://schemas.openxmlformats.org/officeDocument/2006/relationships" xmlns:p="http://schemas.openxmlformats.org/presentationml/2006/main">
+  <p:tag name="DVSHAPEID" val="p71XBznN0egnPiL9YpLecA"/>
+</p:tagLst>
+</file>
+
+<file path=ppt/tags/tag40.xml><?xml version="1.0" encoding="utf-8"?>
 <p:tagLst xmlns:a="http://schemas.openxmlformats.org/drawingml/2006/main" xmlns:r="http://schemas.openxmlformats.org/officeDocument/2006/relationships" xmlns:p="http://schemas.openxmlformats.org/presentationml/2006/main">
   <p:tag name="DVSHAPEID" val="Oq7TcHmPXPnWcY8XSF1QvC"/>
 </p:tagLst>
 </file>
 
-<file path=ppt/tags/tag33.xml><?xml version="1.0" encoding="utf-8"?>
+<file path=ppt/tags/tag41.xml><?xml version="1.0" encoding="utf-8"?>
 <p:tagLst xmlns:a="http://schemas.openxmlformats.org/drawingml/2006/main" xmlns:r="http://schemas.openxmlformats.org/officeDocument/2006/relationships" xmlns:p="http://schemas.openxmlformats.org/presentationml/2006/main">
   <p:tag name="DVSHAPEID" val="cqKSZP9qceZ7qiZGD8eA6T"/>
 </p:tagLst>
 </file>
 
-<file path=ppt/tags/tag34.xml><?xml version="1.0" encoding="utf-8"?>
+<file path=ppt/tags/tag42.xml><?xml version="1.0" encoding="utf-8"?>
 <p:tagLst xmlns:a="http://schemas.openxmlformats.org/drawingml/2006/main" xmlns:r="http://schemas.openxmlformats.org/officeDocument/2006/relationships" xmlns:p="http://schemas.openxmlformats.org/presentationml/2006/main">
   <p:tag name="DVSECTIONID" val="jSNDTGftquJ2BEnqkhVCZB"/>
 </p:tagLst>
 </file>
 
-<file path=ppt/tags/tag35.xml><?xml version="1.0" encoding="utf-8"?>
+<file path=ppt/tags/tag43.xml><?xml version="1.0" encoding="utf-8"?>
 <p:tagLst xmlns:a="http://schemas.openxmlformats.org/drawingml/2006/main" xmlns:r="http://schemas.openxmlformats.org/officeDocument/2006/relationships" xmlns:p="http://schemas.openxmlformats.org/presentationml/2006/main">
   <p:tag name="DVSHAPEID" val="df5ixjqHUzgSn53cxzbb90"/>
 </p:tagLst>
 </file>
 
-<file path=ppt/tags/tag36.xml><?xml version="1.0" encoding="utf-8"?>
+<file path=ppt/tags/tag44.xml><?xml version="1.0" encoding="utf-8"?>
 <p:tagLst xmlns:a="http://schemas.openxmlformats.org/drawingml/2006/main" xmlns:r="http://schemas.openxmlformats.org/officeDocument/2006/relationships" xmlns:p="http://schemas.openxmlformats.org/presentationml/2006/main">
   <p:tag name="DVSHAPEID" val="FUjJBjJ3RFZIRiKGEIrTZW"/>
 </p:tagLst>
 </file>
 
-<file path=ppt/tags/tag37.xml><?xml version="1.0" encoding="utf-8"?>
+<file path=ppt/tags/tag45.xml><?xml version="1.0" encoding="utf-8"?>
 <p:tagLst xmlns:a="http://schemas.openxmlformats.org/drawingml/2006/main" xmlns:r="http://schemas.openxmlformats.org/officeDocument/2006/relationships" xmlns:p="http://schemas.openxmlformats.org/presentationml/2006/main">
   <p:tag name="DVSECTIONID" val="nYQslB3BcKjWuJTSs7xX9O"/>
-</p:tagLst>
-</file>
-
-<file path=ppt/tags/tag38.xml><?xml version="1.0" encoding="utf-8"?>
-<p:tagLst xmlns:a="http://schemas.openxmlformats.org/drawingml/2006/main" xmlns:r="http://schemas.openxmlformats.org/officeDocument/2006/relationships" xmlns:p="http://schemas.openxmlformats.org/presentationml/2006/main">
-  <p:tag name="DVSHAPEID" val="usdizoYKCzLOrTixKhc4di"/>
-</p:tagLst>
-</file>
-
-<file path=ppt/tags/tag39.xml><?xml version="1.0" encoding="utf-8"?>
-<p:tagLst xmlns:a="http://schemas.openxmlformats.org/drawingml/2006/main" xmlns:r="http://schemas.openxmlformats.org/officeDocument/2006/relationships" xmlns:p="http://schemas.openxmlformats.org/presentationml/2006/main">
-  <p:tag name="DVSHAPEID" val="IImPzh25RPtklPWN9KR9j8"/>
-</p:tagLst>
-</file>
-
-<file path=ppt/tags/tag4.xml><?xml version="1.0" encoding="utf-8"?>
-<p:tagLst xmlns:a="http://schemas.openxmlformats.org/drawingml/2006/main" xmlns:r="http://schemas.openxmlformats.org/officeDocument/2006/relationships" xmlns:p="http://schemas.openxmlformats.org/presentationml/2006/main">
-  <p:tag name="DVSHAPEID" val="7YDS1dL7jHF6ed3pQNF0KT"/>
-</p:tagLst>
-</file>
-
-<file path=ppt/tags/tag40.xml><?xml version="1.0" encoding="utf-8"?>
-<p:tagLst xmlns:a="http://schemas.openxmlformats.org/drawingml/2006/main" xmlns:r="http://schemas.openxmlformats.org/officeDocument/2006/relationships" xmlns:p="http://schemas.openxmlformats.org/presentationml/2006/main">
-  <p:tag name="DVSHAPEID" val="7c87zDjacgEcJvWKOGHxIV"/>
-</p:tagLst>
-</file>
-
-<file path=ppt/tags/tag41.xml><?xml version="1.0" encoding="utf-8"?>
-<p:tagLst xmlns:a="http://schemas.openxmlformats.org/drawingml/2006/main" xmlns:r="http://schemas.openxmlformats.org/officeDocument/2006/relationships" xmlns:p="http://schemas.openxmlformats.org/presentationml/2006/main">
-  <p:tag name="DVSHAPEID" val="k7xsAX7rc4ZzAaGrIpLHCd"/>
-</p:tagLst>
-</file>
-
-<file path=ppt/tags/tag42.xml><?xml version="1.0" encoding="utf-8"?>
-<p:tagLst xmlns:a="http://schemas.openxmlformats.org/drawingml/2006/main" xmlns:r="http://schemas.openxmlformats.org/officeDocument/2006/relationships" xmlns:p="http://schemas.openxmlformats.org/presentationml/2006/main">
-  <p:tag name="DVSHAPEID" val="F95rRpVbrLpbR1A62m2L3z"/>
-</p:tagLst>
-</file>
-
-<file path=ppt/tags/tag43.xml><?xml version="1.0" encoding="utf-8"?>
-<p:tagLst xmlns:a="http://schemas.openxmlformats.org/drawingml/2006/main" xmlns:r="http://schemas.openxmlformats.org/officeDocument/2006/relationships" xmlns:p="http://schemas.openxmlformats.org/presentationml/2006/main">
-  <p:tag name="DVSHAPEID" val="caUL3nYiM1i7ron85Hv1Dd"/>
-</p:tagLst>
-</file>
-
-<file path=ppt/tags/tag44.xml><?xml version="1.0" encoding="utf-8"?>
-<p:tagLst xmlns:a="http://schemas.openxmlformats.org/drawingml/2006/main" xmlns:r="http://schemas.openxmlformats.org/officeDocument/2006/relationships" xmlns:p="http://schemas.openxmlformats.org/presentationml/2006/main">
-  <p:tag name="DVSHAPEID" val="9ojFRCnoER95XVx6myc9Zo"/>
-</p:tagLst>
-</file>
-
-<file path=ppt/tags/tag45.xml><?xml version="1.0" encoding="utf-8"?>
-<p:tagLst xmlns:a="http://schemas.openxmlformats.org/drawingml/2006/main" xmlns:r="http://schemas.openxmlformats.org/officeDocument/2006/relationships" xmlns:p="http://schemas.openxmlformats.org/presentationml/2006/main">
-  <p:tag name="DVSECTIONID" val="d4qBFGJvJMfi0d14iIXMjH"/>
 </p:tagLst>
 </file>
 
@@ -8431,7 +9436,7 @@
 
 <file path=ppt/tags/tag5.xml><?xml version="1.0" encoding="utf-8"?>
 <p:tagLst xmlns:a="http://schemas.openxmlformats.org/drawingml/2006/main" xmlns:r="http://schemas.openxmlformats.org/officeDocument/2006/relationships" xmlns:p="http://schemas.openxmlformats.org/presentationml/2006/main">
-  <p:tag name="DVSHAPEID" val="TJqo0hjjjk6wSL602b4HmN"/>
+  <p:tag name="DVSHAPEID" val="Et1AzNOicRaB9jILwjyKa3"/>
 </p:tagLst>
 </file>
 
@@ -8455,162 +9460,210 @@
 
 <file path=ppt/tags/tag53.xml><?xml version="1.0" encoding="utf-8"?>
 <p:tagLst xmlns:a="http://schemas.openxmlformats.org/drawingml/2006/main" xmlns:r="http://schemas.openxmlformats.org/officeDocument/2006/relationships" xmlns:p="http://schemas.openxmlformats.org/presentationml/2006/main">
+  <p:tag name="DVSECTIONID" val="d4qBFGJvJMfi0d14iIXMjH"/>
+</p:tagLst>
+</file>
+
+<file path=ppt/tags/tag54.xml><?xml version="1.0" encoding="utf-8"?>
+<p:tagLst xmlns:a="http://schemas.openxmlformats.org/drawingml/2006/main" xmlns:r="http://schemas.openxmlformats.org/officeDocument/2006/relationships" xmlns:p="http://schemas.openxmlformats.org/presentationml/2006/main">
+  <p:tag name="DVSHAPEID" val="usdizoYKCzLOrTixKhc4di"/>
+</p:tagLst>
+</file>
+
+<file path=ppt/tags/tag55.xml><?xml version="1.0" encoding="utf-8"?>
+<p:tagLst xmlns:a="http://schemas.openxmlformats.org/drawingml/2006/main" xmlns:r="http://schemas.openxmlformats.org/officeDocument/2006/relationships" xmlns:p="http://schemas.openxmlformats.org/presentationml/2006/main">
+  <p:tag name="DVSHAPEID" val="IImPzh25RPtklPWN9KR9j8"/>
+</p:tagLst>
+</file>
+
+<file path=ppt/tags/tag56.xml><?xml version="1.0" encoding="utf-8"?>
+<p:tagLst xmlns:a="http://schemas.openxmlformats.org/drawingml/2006/main" xmlns:r="http://schemas.openxmlformats.org/officeDocument/2006/relationships" xmlns:p="http://schemas.openxmlformats.org/presentationml/2006/main">
+  <p:tag name="DVSHAPEID" val="7c87zDjacgEcJvWKOGHxIV"/>
+</p:tagLst>
+</file>
+
+<file path=ppt/tags/tag57.xml><?xml version="1.0" encoding="utf-8"?>
+<p:tagLst xmlns:a="http://schemas.openxmlformats.org/drawingml/2006/main" xmlns:r="http://schemas.openxmlformats.org/officeDocument/2006/relationships" xmlns:p="http://schemas.openxmlformats.org/presentationml/2006/main">
+  <p:tag name="DVSHAPEID" val="k7xsAX7rc4ZzAaGrIpLHCd"/>
+</p:tagLst>
+</file>
+
+<file path=ppt/tags/tag58.xml><?xml version="1.0" encoding="utf-8"?>
+<p:tagLst xmlns:a="http://schemas.openxmlformats.org/drawingml/2006/main" xmlns:r="http://schemas.openxmlformats.org/officeDocument/2006/relationships" xmlns:p="http://schemas.openxmlformats.org/presentationml/2006/main">
+  <p:tag name="DVSHAPEID" val="F95rRpVbrLpbR1A62m2L3z"/>
+</p:tagLst>
+</file>
+
+<file path=ppt/tags/tag59.xml><?xml version="1.0" encoding="utf-8"?>
+<p:tagLst xmlns:a="http://schemas.openxmlformats.org/drawingml/2006/main" xmlns:r="http://schemas.openxmlformats.org/officeDocument/2006/relationships" xmlns:p="http://schemas.openxmlformats.org/presentationml/2006/main">
+  <p:tag name="DVSHAPEID" val="caUL3nYiM1i7ron85Hv1Dd"/>
+</p:tagLst>
+</file>
+
+<file path=ppt/tags/tag6.xml><?xml version="1.0" encoding="utf-8"?>
+<p:tagLst xmlns:a="http://schemas.openxmlformats.org/drawingml/2006/main" xmlns:r="http://schemas.openxmlformats.org/officeDocument/2006/relationships" xmlns:p="http://schemas.openxmlformats.org/presentationml/2006/main">
+  <p:tag name="DVSHAPEID" val="TJdv1nA2YWAPsyW1ZAZI2o"/>
+</p:tagLst>
+</file>
+
+<file path=ppt/tags/tag60.xml><?xml version="1.0" encoding="utf-8"?>
+<p:tagLst xmlns:a="http://schemas.openxmlformats.org/drawingml/2006/main" xmlns:r="http://schemas.openxmlformats.org/officeDocument/2006/relationships" xmlns:p="http://schemas.openxmlformats.org/presentationml/2006/main">
+  <p:tag name="DVSHAPEID" val="9ojFRCnoER95XVx6myc9Zo"/>
+</p:tagLst>
+</file>
+
+<file path=ppt/tags/tag61.xml><?xml version="1.0" encoding="utf-8"?>
+<p:tagLst xmlns:a="http://schemas.openxmlformats.org/drawingml/2006/main" xmlns:r="http://schemas.openxmlformats.org/officeDocument/2006/relationships" xmlns:p="http://schemas.openxmlformats.org/presentationml/2006/main">
   <p:tag name="DVSECTIONID" val="v6L8nrStgGOtbevo2Gu4Em"/>
 </p:tagLst>
 </file>
 
-<file path=ppt/tags/tag54.xml><?xml version="1.0" encoding="utf-8"?>
+<file path=ppt/tags/tag62.xml><?xml version="1.0" encoding="utf-8"?>
 <p:tagLst xmlns:a="http://schemas.openxmlformats.org/drawingml/2006/main" xmlns:r="http://schemas.openxmlformats.org/officeDocument/2006/relationships" xmlns:p="http://schemas.openxmlformats.org/presentationml/2006/main">
   <p:tag name="DVSHAPEID" val="TKAcJThkf1WY0vrovmVomq"/>
 </p:tagLst>
 </file>
 
-<file path=ppt/tags/tag55.xml><?xml version="1.0" encoding="utf-8"?>
+<file path=ppt/tags/tag63.xml><?xml version="1.0" encoding="utf-8"?>
 <p:tagLst xmlns:a="http://schemas.openxmlformats.org/drawingml/2006/main" xmlns:r="http://schemas.openxmlformats.org/officeDocument/2006/relationships" xmlns:p="http://schemas.openxmlformats.org/presentationml/2006/main">
   <p:tag name="DVSHAPEID" val="XlqrBZlXOteLvz4ESt6kC8"/>
 </p:tagLst>
 </file>
 
-<file path=ppt/tags/tag56.xml><?xml version="1.0" encoding="utf-8"?>
+<file path=ppt/tags/tag64.xml><?xml version="1.0" encoding="utf-8"?>
 <p:tagLst xmlns:a="http://schemas.openxmlformats.org/drawingml/2006/main" xmlns:r="http://schemas.openxmlformats.org/officeDocument/2006/relationships" xmlns:p="http://schemas.openxmlformats.org/presentationml/2006/main">
   <p:tag name="DVSECTIONID" val="7UaRiSLiyb2sOPuBo5huce"/>
 </p:tagLst>
 </file>
 
-<file path=ppt/tags/tag57.xml><?xml version="1.0" encoding="utf-8"?>
+<file path=ppt/tags/tag65.xml><?xml version="1.0" encoding="utf-8"?>
 <p:tagLst xmlns:a="http://schemas.openxmlformats.org/drawingml/2006/main" xmlns:r="http://schemas.openxmlformats.org/officeDocument/2006/relationships" xmlns:p="http://schemas.openxmlformats.org/presentationml/2006/main">
   <p:tag name="DVSHAPEID" val="TKAcJThkf1WY0vrovmVomq"/>
 </p:tagLst>
 </file>
 
-<file path=ppt/tags/tag58.xml><?xml version="1.0" encoding="utf-8"?>
+<file path=ppt/tags/tag66.xml><?xml version="1.0" encoding="utf-8"?>
 <p:tagLst xmlns:a="http://schemas.openxmlformats.org/drawingml/2006/main" xmlns:r="http://schemas.openxmlformats.org/officeDocument/2006/relationships" xmlns:p="http://schemas.openxmlformats.org/presentationml/2006/main">
   <p:tag name="DVSHAPEID" val="XlqrBZlXOteLvz4ESt6kC8"/>
 </p:tagLst>
 </file>
 
-<file path=ppt/tags/tag59.xml><?xml version="1.0" encoding="utf-8"?>
+<file path=ppt/tags/tag67.xml><?xml version="1.0" encoding="utf-8"?>
 <p:tagLst xmlns:a="http://schemas.openxmlformats.org/drawingml/2006/main" xmlns:r="http://schemas.openxmlformats.org/officeDocument/2006/relationships" xmlns:p="http://schemas.openxmlformats.org/presentationml/2006/main">
   <p:tag name="DVSECTIONID" val="odsBUytQ30KztJGdeBJJtC"/>
 </p:tagLst>
 </file>
 
-<file path=ppt/tags/tag6.xml><?xml version="1.0" encoding="utf-8"?>
-<p:tagLst xmlns:a="http://schemas.openxmlformats.org/drawingml/2006/main" xmlns:r="http://schemas.openxmlformats.org/officeDocument/2006/relationships" xmlns:p="http://schemas.openxmlformats.org/presentationml/2006/main">
-  <p:tag name="DVSHAPEID" val="yE06yQOcg0Qe4UsCcuO0ol"/>
-</p:tagLst>
-</file>
-
-<file path=ppt/tags/tag60.xml><?xml version="1.0" encoding="utf-8"?>
+<file path=ppt/tags/tag68.xml><?xml version="1.0" encoding="utf-8"?>
 <p:tagLst xmlns:a="http://schemas.openxmlformats.org/drawingml/2006/main" xmlns:r="http://schemas.openxmlformats.org/officeDocument/2006/relationships" xmlns:p="http://schemas.openxmlformats.org/presentationml/2006/main">
   <p:tag name="DVSHAPEID" val="8YU1EY2QeA1sMeLhihZics"/>
 </p:tagLst>
 </file>
 
-<file path=ppt/tags/tag61.xml><?xml version="1.0" encoding="utf-8"?>
+<file path=ppt/tags/tag69.xml><?xml version="1.0" encoding="utf-8"?>
 <p:tagLst xmlns:a="http://schemas.openxmlformats.org/drawingml/2006/main" xmlns:r="http://schemas.openxmlformats.org/officeDocument/2006/relationships" xmlns:p="http://schemas.openxmlformats.org/presentationml/2006/main">
   <p:tag name="DVSHAPEID" val="Jf0SjRtrh2OPcswzlmUYfE"/>
 </p:tagLst>
 </file>
 
-<file path=ppt/tags/tag62.xml><?xml version="1.0" encoding="utf-8"?>
+<file path=ppt/tags/tag7.xml><?xml version="1.0" encoding="utf-8"?>
+<p:tagLst xmlns:a="http://schemas.openxmlformats.org/drawingml/2006/main" xmlns:r="http://schemas.openxmlformats.org/officeDocument/2006/relationships" xmlns:p="http://schemas.openxmlformats.org/presentationml/2006/main">
+  <p:tag name="DVSHAPEID" val="cd9sqcTsFrpBzin4LqI9Te"/>
+</p:tagLst>
+</file>
+
+<file path=ppt/tags/tag70.xml><?xml version="1.0" encoding="utf-8"?>
 <p:tagLst xmlns:a="http://schemas.openxmlformats.org/drawingml/2006/main" xmlns:r="http://schemas.openxmlformats.org/officeDocument/2006/relationships" xmlns:p="http://schemas.openxmlformats.org/presentationml/2006/main">
   <p:tag name="DVSECTIONID" val="80yEm34Qt599IyGLxjZqCN"/>
 </p:tagLst>
 </file>
 
-<file path=ppt/tags/tag63.xml><?xml version="1.0" encoding="utf-8"?>
+<file path=ppt/tags/tag71.xml><?xml version="1.0" encoding="utf-8"?>
 <p:tagLst xmlns:a="http://schemas.openxmlformats.org/drawingml/2006/main" xmlns:r="http://schemas.openxmlformats.org/officeDocument/2006/relationships" xmlns:p="http://schemas.openxmlformats.org/presentationml/2006/main">
   <p:tag name="DVSHAPEID" val="J3MQTAbPkkVGeF1LFbnMjY"/>
 </p:tagLst>
 </file>
 
-<file path=ppt/tags/tag64.xml><?xml version="1.0" encoding="utf-8"?>
+<file path=ppt/tags/tag72.xml><?xml version="1.0" encoding="utf-8"?>
 <p:tagLst xmlns:a="http://schemas.openxmlformats.org/drawingml/2006/main" xmlns:r="http://schemas.openxmlformats.org/officeDocument/2006/relationships" xmlns:p="http://schemas.openxmlformats.org/presentationml/2006/main">
   <p:tag name="DVSHAPEID" val="DX1iLIWCned5vW5sXSgrIu"/>
 </p:tagLst>
 </file>
 
-<file path=ppt/tags/tag65.xml><?xml version="1.0" encoding="utf-8"?>
+<file path=ppt/tags/tag73.xml><?xml version="1.0" encoding="utf-8"?>
 <p:tagLst xmlns:a="http://schemas.openxmlformats.org/drawingml/2006/main" xmlns:r="http://schemas.openxmlformats.org/officeDocument/2006/relationships" xmlns:p="http://schemas.openxmlformats.org/presentationml/2006/main">
   <p:tag name="DVSECTIONID" val="JCKMHPrTlVSL4r3fbpMdxE"/>
 </p:tagLst>
 </file>
 
-<file path=ppt/tags/tag66.xml><?xml version="1.0" encoding="utf-8"?>
+<file path=ppt/tags/tag74.xml><?xml version="1.0" encoding="utf-8"?>
 <p:tagLst xmlns:a="http://schemas.openxmlformats.org/drawingml/2006/main" xmlns:r="http://schemas.openxmlformats.org/officeDocument/2006/relationships" xmlns:p="http://schemas.openxmlformats.org/presentationml/2006/main">
   <p:tag name="DVSHAPEID" val="TwdQyzHIAtkLpPPAPsSHWG"/>
 </p:tagLst>
 </file>
 
-<file path=ppt/tags/tag67.xml><?xml version="1.0" encoding="utf-8"?>
+<file path=ppt/tags/tag75.xml><?xml version="1.0" encoding="utf-8"?>
 <p:tagLst xmlns:a="http://schemas.openxmlformats.org/drawingml/2006/main" xmlns:r="http://schemas.openxmlformats.org/officeDocument/2006/relationships" xmlns:p="http://schemas.openxmlformats.org/presentationml/2006/main">
   <p:tag name="DVSHAPEID" val="t9a4FcdvvRg93u5UamVFEJ"/>
 </p:tagLst>
 </file>
 
-<file path=ppt/tags/tag68.xml><?xml version="1.0" encoding="utf-8"?>
+<file path=ppt/tags/tag76.xml><?xml version="1.0" encoding="utf-8"?>
 <p:tagLst xmlns:a="http://schemas.openxmlformats.org/drawingml/2006/main" xmlns:r="http://schemas.openxmlformats.org/officeDocument/2006/relationships" xmlns:p="http://schemas.openxmlformats.org/presentationml/2006/main">
   <p:tag name="DVSECTIONID" val="pk18xt4pJ3ZkgVTAmepAKe"/>
 </p:tagLst>
 </file>
 
-<file path=ppt/tags/tag69.xml><?xml version="1.0" encoding="utf-8"?>
+<file path=ppt/tags/tag77.xml><?xml version="1.0" encoding="utf-8"?>
 <p:tagLst xmlns:a="http://schemas.openxmlformats.org/drawingml/2006/main" xmlns:r="http://schemas.openxmlformats.org/officeDocument/2006/relationships" xmlns:p="http://schemas.openxmlformats.org/presentationml/2006/main">
   <p:tag name="DVSHAPEID" val="LKxgDn2Nz0yc34GtTvu5Xs"/>
 </p:tagLst>
 </file>
 
-<file path=ppt/tags/tag7.xml><?xml version="1.0" encoding="utf-8"?>
-<p:tagLst xmlns:a="http://schemas.openxmlformats.org/drawingml/2006/main" xmlns:r="http://schemas.openxmlformats.org/officeDocument/2006/relationships" xmlns:p="http://schemas.openxmlformats.org/presentationml/2006/main">
-  <p:tag name="DVSHAPEID" val="ZHkijPLtW3w6bLnTJsv636"/>
-</p:tagLst>
-</file>
-
-<file path=ppt/tags/tag70.xml><?xml version="1.0" encoding="utf-8"?>
+<file path=ppt/tags/tag78.xml><?xml version="1.0" encoding="utf-8"?>
 <p:tagLst xmlns:a="http://schemas.openxmlformats.org/drawingml/2006/main" xmlns:r="http://schemas.openxmlformats.org/officeDocument/2006/relationships" xmlns:p="http://schemas.openxmlformats.org/presentationml/2006/main">
   <p:tag name="DVSHAPEID" val="ugLkuViwMg2JnqxpzQsIif"/>
 </p:tagLst>
 </file>
 
-<file path=ppt/tags/tag71.xml><?xml version="1.0" encoding="utf-8"?>
+<file path=ppt/tags/tag79.xml><?xml version="1.0" encoding="utf-8"?>
 <p:tagLst xmlns:a="http://schemas.openxmlformats.org/drawingml/2006/main" xmlns:r="http://schemas.openxmlformats.org/officeDocument/2006/relationships" xmlns:p="http://schemas.openxmlformats.org/presentationml/2006/main">
   <p:tag name="DVSECTIONID" val="gWteIh8zDpg4cqLyiYOVbP"/>
 </p:tagLst>
 </file>
 
-<file path=ppt/tags/tag72.xml><?xml version="1.0" encoding="utf-8"?>
+<file path=ppt/tags/tag8.xml><?xml version="1.0" encoding="utf-8"?>
+<p:tagLst xmlns:a="http://schemas.openxmlformats.org/drawingml/2006/main" xmlns:r="http://schemas.openxmlformats.org/officeDocument/2006/relationships" xmlns:p="http://schemas.openxmlformats.org/presentationml/2006/main">
+  <p:tag name="DVSHAPEID" val="1jQaPujYLs1vwZmzXn9wg8"/>
+</p:tagLst>
+</file>
+
+<file path=ppt/tags/tag80.xml><?xml version="1.0" encoding="utf-8"?>
 <p:tagLst xmlns:a="http://schemas.openxmlformats.org/drawingml/2006/main" xmlns:r="http://schemas.openxmlformats.org/officeDocument/2006/relationships" xmlns:p="http://schemas.openxmlformats.org/presentationml/2006/main">
   <p:tag name="DVSHAPEID" val="AQr1dGsqayMifhuiS6v3eh"/>
 </p:tagLst>
 </file>
 
-<file path=ppt/tags/tag73.xml><?xml version="1.0" encoding="utf-8"?>
+<file path=ppt/tags/tag81.xml><?xml version="1.0" encoding="utf-8"?>
 <p:tagLst xmlns:a="http://schemas.openxmlformats.org/drawingml/2006/main" xmlns:r="http://schemas.openxmlformats.org/officeDocument/2006/relationships" xmlns:p="http://schemas.openxmlformats.org/presentationml/2006/main">
   <p:tag name="DVSHAPEID" val="akGfWuVECfafFVTtIC3l6u"/>
 </p:tagLst>
 </file>
 
-<file path=ppt/tags/tag74.xml><?xml version="1.0" encoding="utf-8"?>
+<file path=ppt/tags/tag82.xml><?xml version="1.0" encoding="utf-8"?>
 <p:tagLst xmlns:a="http://schemas.openxmlformats.org/drawingml/2006/main" xmlns:r="http://schemas.openxmlformats.org/officeDocument/2006/relationships" xmlns:p="http://schemas.openxmlformats.org/presentationml/2006/main">
   <p:tag name="DVSHAPEID" val="W5bgVhXmdf0jG6kYKYuvVx"/>
 </p:tagLst>
 </file>
 
-<file path=ppt/tags/tag8.xml><?xml version="1.0" encoding="utf-8"?>
-<p:tagLst xmlns:a="http://schemas.openxmlformats.org/drawingml/2006/main" xmlns:r="http://schemas.openxmlformats.org/officeDocument/2006/relationships" xmlns:p="http://schemas.openxmlformats.org/presentationml/2006/main">
-  <p:tag name="DVSHAPEID" val="GEGbxpYATmpcFjLfxYrM4M"/>
-</p:tagLst>
-</file>
-
 <file path=ppt/tags/tag9.xml><?xml version="1.0" encoding="utf-8"?>
 <p:tagLst xmlns:a="http://schemas.openxmlformats.org/drawingml/2006/main" xmlns:r="http://schemas.openxmlformats.org/officeDocument/2006/relationships" xmlns:p="http://schemas.openxmlformats.org/presentationml/2006/main">
-  <p:tag name="DVSHAPEID" val="HYJHeiKlvhhT1GB7hlul9a"/>
+  <p:tag name="DVSHAPEID" val="pRYDDVOyZSvYcPCgmo8HGX"/>
 </p:tagLst>
 </file>
 
 <file path=ppt/theme/theme1.xml><?xml version="1.0" encoding="utf-8"?>
-<a:theme xmlns:a="http://schemas.openxmlformats.org/drawingml/2006/main" name="Headspring2">
+<a:theme xmlns:a="http://schemas.openxmlformats.org/drawingml/2006/main" name="Headspring Design Template Clean">
   <a:themeElements>
     <a:clrScheme name="Office">
       <a:dk1>
@@ -8684,6 +9737,7 @@
         <a:font script="Mong" typeface="Mongolian Baiti"/>
         <a:font script="Viet" typeface="Times New Roman"/>
         <a:font script="Uigh" typeface="Microsoft Uighur"/>
+        <a:font script="Geor" typeface="Sylfaen"/>
       </a:majorFont>
       <a:minorFont>
         <a:latin typeface="Calibri"/>
@@ -8718,6 +9772,7 @@
         <a:font script="Mong" typeface="Mongolian Baiti"/>
         <a:font script="Viet" typeface="Arial"/>
         <a:font script="Uigh" typeface="Microsoft Uighur"/>
+        <a:font script="Geor" typeface="Sylfaen"/>
       </a:minorFont>
     </a:fontScheme>
     <a:fmtScheme name="Office">
@@ -8752,20 +9807,16 @@
           <a:gsLst>
             <a:gs pos="0">
               <a:schemeClr val="phClr">
-                <a:shade val="51000"/>
-                <a:satMod val="130000"/>
-              </a:schemeClr>
-            </a:gs>
-            <a:gs pos="80000">
-              <a:schemeClr val="phClr">
-                <a:shade val="93000"/>
+                <a:tint val="100000"/>
+                <a:shade val="100000"/>
                 <a:satMod val="130000"/>
               </a:schemeClr>
             </a:gs>
             <a:gs pos="100000">
               <a:schemeClr val="phClr">
-                <a:shade val="94000"/>
-                <a:satMod val="135000"/>
+                <a:tint val="50000"/>
+                <a:shade val="100000"/>
+                <a:satMod val="350000"/>
               </a:schemeClr>
             </a:gs>
           </a:gsLst>
@@ -8887,7 +9938,46 @@
       </a:bgFillStyleLst>
     </a:fmtScheme>
   </a:themeElements>
-  <a:objectDefaults/>
+  <a:objectDefaults>
+    <a:spDef>
+      <a:spPr/>
+      <a:bodyPr/>
+      <a:lstStyle/>
+      <a:style>
+        <a:lnRef idx="1">
+          <a:schemeClr val="accent1"/>
+        </a:lnRef>
+        <a:fillRef idx="3">
+          <a:schemeClr val="accent1"/>
+        </a:fillRef>
+        <a:effectRef idx="2">
+          <a:schemeClr val="accent1"/>
+        </a:effectRef>
+        <a:fontRef idx="minor">
+          <a:schemeClr val="lt1"/>
+        </a:fontRef>
+      </a:style>
+    </a:spDef>
+    <a:lnDef>
+      <a:spPr/>
+      <a:bodyPr/>
+      <a:lstStyle/>
+      <a:style>
+        <a:lnRef idx="2">
+          <a:schemeClr val="accent1"/>
+        </a:lnRef>
+        <a:fillRef idx="0">
+          <a:schemeClr val="accent1"/>
+        </a:fillRef>
+        <a:effectRef idx="1">
+          <a:schemeClr val="accent1"/>
+        </a:effectRef>
+        <a:fontRef idx="minor">
+          <a:schemeClr val="tx1"/>
+        </a:fontRef>
+      </a:style>
+    </a:lnDef>
+  </a:objectDefaults>
   <a:extraClrSchemeLst/>
 </a:theme>
 </file>

</xml_diff>